<commit_message>
revisi sempro - prototype
</commit_message>
<xml_diff>
--- a/berkas/ppt muham.pptx
+++ b/berkas/ppt muham.pptx
@@ -8449,7 +8449,7 @@
               </a:lnSpc>
             </a:pPr>
             <a:r>
-              <a:rPr lang="" altLang="en-US" sz="1800" b="0" strike="noStrike" spc="-1">
+              <a:rPr lang="en-US" altLang="en-US" sz="1800" b="0" strike="noStrike" spc="-1">
                 <a:solidFill>
                   <a:srgbClr val="000000"/>
                 </a:solidFill>
@@ -8462,7 +8462,7 @@
               </a:rPr>
               <a:t>Server Sent Events</a:t>
             </a:r>
-            <a:endParaRPr lang="" altLang="en-US" sz="1800" b="0" strike="noStrike" spc="-1">
+            <a:endParaRPr lang="en-US" altLang="en-US" sz="1800" b="0" strike="noStrike" spc="-1">
               <a:solidFill>
                 <a:srgbClr val="000000"/>
               </a:solidFill>
@@ -8517,7 +8517,7 @@
               <a:buNone/>
             </a:pPr>
             <a:r>
-              <a:rPr lang="" altLang="en-US" sz="1200" b="0" strike="noStrike" spc="-1">
+              <a:rPr lang="en-US" altLang="en-US" sz="1200" b="0" strike="noStrike" spc="-1">
                 <a:solidFill>
                   <a:srgbClr val="000000"/>
                 </a:solidFill>
@@ -8532,7 +8532,7 @@
               <a:t>Server Sent Events merupakan proses pengiriman data (</a:t>
             </a:r>
             <a:r>
-              <a:rPr lang="" altLang="en-US" sz="1200" b="0" i="1" strike="noStrike" spc="-1">
+              <a:rPr lang="en-US" altLang="en-US" sz="1200" b="0" i="1" strike="noStrike" spc="-1">
                 <a:solidFill>
                   <a:srgbClr val="000000"/>
                 </a:solidFill>
@@ -8547,7 +8547,7 @@
               <a:t>events</a:t>
             </a:r>
             <a:r>
-              <a:rPr lang="" altLang="en-US" sz="1200" b="0" strike="noStrike" spc="-1">
+              <a:rPr lang="en-US" altLang="en-US" sz="1200" b="0" strike="noStrike" spc="-1">
                 <a:solidFill>
                   <a:srgbClr val="000000"/>
                 </a:solidFill>
@@ -8561,7 +8561,7 @@
               </a:rPr>
               <a:t>) melalui protokol HTTP dengan menggunakan header “Content-Type: text/event-stream” sehingga memungkinkan komunikasi satu arah dari server menuju client secara terus-menerus.</a:t>
             </a:r>
-            <a:endParaRPr lang="" altLang="en-US" sz="1200" b="0" strike="noStrike" spc="-1">
+            <a:endParaRPr lang="en-US" altLang="en-US" sz="1200" b="0" strike="noStrike" spc="-1">
               <a:solidFill>
                 <a:srgbClr val="000000"/>
               </a:solidFill>
@@ -8582,7 +8582,7 @@
               <a:buNone/>
             </a:pPr>
             <a:r>
-              <a:rPr lang="" altLang="en-US" sz="1200" b="0" strike="noStrike" spc="-1">
+              <a:rPr lang="en-US" altLang="en-US" sz="1200" b="0" strike="noStrike" spc="-1">
                 <a:solidFill>
                   <a:srgbClr val="000000"/>
                 </a:solidFill>
@@ -8596,7 +8596,7 @@
               </a:rPr>
               <a:t>Dalam penerapannya di HTTP/1.1, Chrome serta Mozilla hanya mampu memiliki 6 koneksi (stream) dalam satu browser.</a:t>
             </a:r>
-            <a:endParaRPr lang="" altLang="en-US" sz="1200" b="0" strike="noStrike" spc="-1">
+            <a:endParaRPr lang="en-US" altLang="en-US" sz="1200" b="0" strike="noStrike" spc="-1">
               <a:solidFill>
                 <a:srgbClr val="000000"/>
               </a:solidFill>
@@ -9972,7 +9972,7 @@
               </a:lnSpc>
             </a:pPr>
             <a:r>
-              <a:rPr lang="" altLang="en-US" sz="1800" b="0" strike="noStrike" spc="-1">
+              <a:rPr lang="en-US" altLang="en-US" sz="1800" b="0" strike="noStrike" spc="-1">
                 <a:solidFill>
                   <a:srgbClr val="000000"/>
                 </a:solidFill>
@@ -9985,7 +9985,7 @@
               </a:rPr>
               <a:t>Websocket</a:t>
             </a:r>
-            <a:endParaRPr lang="" altLang="en-US" sz="1800" b="0" strike="noStrike" spc="-1">
+            <a:endParaRPr lang="en-US" altLang="en-US" sz="1800" b="0" strike="noStrike" spc="-1">
               <a:solidFill>
                 <a:srgbClr val="000000"/>
               </a:solidFill>
@@ -10041,7 +10041,7 @@
               <a:buChar char="•"/>
             </a:pPr>
             <a:r>
-              <a:rPr lang="" altLang="en-US" sz="1200" b="0" strike="noStrike" spc="-1">
+              <a:rPr lang="en-US" altLang="en-US" sz="1200" b="0" strike="noStrike" spc="-1">
                 <a:solidFill>
                   <a:srgbClr val="000000"/>
                 </a:solidFill>
@@ -10056,7 +10056,7 @@
               <a:t>Websocket adalah protokol yang menyediakan komunikasi </a:t>
             </a:r>
             <a:r>
-              <a:rPr lang="" altLang="en-US" sz="1200" b="0" i="1" strike="noStrike" spc="-1">
+              <a:rPr lang="en-US" altLang="en-US" sz="1200" b="0" i="1" strike="noStrike" spc="-1">
                 <a:solidFill>
                   <a:srgbClr val="000000"/>
                 </a:solidFill>
@@ -10071,7 +10071,7 @@
               <a:t>full-duplex</a:t>
             </a:r>
             <a:r>
-              <a:rPr lang="" altLang="en-US" sz="1200" b="0" strike="noStrike" spc="-1">
+              <a:rPr lang="en-US" altLang="en-US" sz="1200" b="0" strike="noStrike" spc="-1">
                 <a:solidFill>
                   <a:srgbClr val="000000"/>
                 </a:solidFill>
@@ -10085,7 +10085,7 @@
               </a:rPr>
               <a:t> melalui satu jalur TCP dalam satu socket.</a:t>
             </a:r>
-            <a:endParaRPr lang="" altLang="en-US" sz="1200" b="0" strike="noStrike" spc="-1">
+            <a:endParaRPr lang="en-US" altLang="en-US" sz="1200" b="0" strike="noStrike" spc="-1">
               <a:solidFill>
                 <a:srgbClr val="000000"/>
               </a:solidFill>
@@ -10107,7 +10107,7 @@
               <a:buChar char="•"/>
             </a:pPr>
             <a:r>
-              <a:rPr lang="" altLang="en-US" sz="1200" b="0" strike="noStrike" spc="-1">
+              <a:rPr lang="en-US" altLang="en-US" sz="1200" b="0" strike="noStrike" spc="-1">
                 <a:solidFill>
                   <a:srgbClr val="000000"/>
                 </a:solidFill>
@@ -10121,7 +10121,7 @@
               </a:rPr>
               <a:t>Untuk menggunakan Websocket, haruslah terlebih dahulu dilakukan upgrade HTTP.</a:t>
             </a:r>
-            <a:endParaRPr lang="" altLang="en-US" sz="1200" b="0" strike="noStrike" spc="-1">
+            <a:endParaRPr lang="en-US" altLang="en-US" sz="1200" b="0" strike="noStrike" spc="-1">
               <a:solidFill>
                 <a:srgbClr val="000000"/>
               </a:solidFill>
@@ -10143,7 +10143,7 @@
               <a:buChar char="•"/>
             </a:pPr>
             <a:r>
-              <a:rPr lang="" altLang="en-US" sz="1200" b="0" strike="noStrike" spc="-1">
+              <a:rPr lang="en-US" altLang="en-US" sz="1200" b="0" strike="noStrike" spc="-1">
                 <a:solidFill>
                   <a:srgbClr val="000000"/>
                 </a:solidFill>
@@ -10158,7 +10158,7 @@
               <a:t>Berbeda dengan </a:t>
             </a:r>
             <a:r>
-              <a:rPr lang="" altLang="en-US" sz="1200" b="0" i="1" strike="noStrike" spc="-1">
+              <a:rPr lang="en-US" altLang="en-US" sz="1200" b="0" i="1" strike="noStrike" spc="-1">
                 <a:solidFill>
                   <a:srgbClr val="000000"/>
                 </a:solidFill>
@@ -10173,7 +10173,7 @@
               <a:t>Server Sent Events</a:t>
             </a:r>
             <a:r>
-              <a:rPr lang="" altLang="en-US" sz="1200" b="0" strike="noStrike" spc="-1">
+              <a:rPr lang="en-US" altLang="en-US" sz="1200" b="0" strike="noStrike" spc="-1">
                 <a:solidFill>
                   <a:srgbClr val="000000"/>
                 </a:solidFill>
@@ -10188,7 +10188,7 @@
               <a:t>, setelah </a:t>
             </a:r>
             <a:r>
-              <a:rPr lang="" altLang="en-US" sz="1200" b="0" i="1" strike="noStrike" spc="-1">
+              <a:rPr lang="en-US" altLang="en-US" sz="1200" b="0" i="1" strike="noStrike" spc="-1">
                 <a:solidFill>
                   <a:srgbClr val="000000"/>
                 </a:solidFill>
@@ -10203,7 +10203,7 @@
               <a:t>server </a:t>
             </a:r>
             <a:r>
-              <a:rPr lang="" altLang="en-US" sz="1200" b="0" strike="noStrike" spc="-1">
+              <a:rPr lang="en-US" altLang="en-US" sz="1200" b="0" strike="noStrike" spc="-1">
                 <a:solidFill>
                   <a:srgbClr val="000000"/>
                 </a:solidFill>
@@ -10218,7 +10218,7 @@
               <a:t>mati lalu hidup lagi, client tidak mampu melakukan </a:t>
             </a:r>
             <a:r>
-              <a:rPr lang="" altLang="en-US" sz="1200" b="0" i="1" strike="noStrike" spc="-1">
+              <a:rPr lang="en-US" altLang="en-US" sz="1200" b="0" i="1" strike="noStrike" spc="-1">
                 <a:solidFill>
                   <a:srgbClr val="000000"/>
                 </a:solidFill>
@@ -10233,7 +10233,7 @@
               <a:t>reconnection</a:t>
             </a:r>
             <a:r>
-              <a:rPr lang="" altLang="en-US" sz="1200" b="0" strike="noStrike" spc="-1">
+              <a:rPr lang="en-US" altLang="en-US" sz="1200" b="0" strike="noStrike" spc="-1">
                 <a:solidFill>
                   <a:srgbClr val="000000"/>
                 </a:solidFill>
@@ -10247,7 +10247,7 @@
               </a:rPr>
               <a:t> kecuali dengan library tambahan.</a:t>
             </a:r>
-            <a:endParaRPr lang="" altLang="en-US" sz="1200" b="0" strike="noStrike" spc="-1">
+            <a:endParaRPr lang="en-US" altLang="en-US" sz="1200" b="0" strike="noStrike" spc="-1">
               <a:solidFill>
                 <a:srgbClr val="000000"/>
               </a:solidFill>
@@ -11380,10 +11380,10 @@
           </a:bodyPr>
           <a:p>
             <a:r>
-              <a:rPr lang="" altLang="en-US" sz="900"/>
+              <a:rPr lang="en-US" altLang="en-US" sz="900"/>
               <a:t>sumber: https://caniuse.com</a:t>
             </a:r>
-            <a:endParaRPr lang="" altLang="en-US" sz="900"/>
+            <a:endParaRPr lang="en-US" altLang="en-US" sz="900"/>
           </a:p>
         </p:txBody>
       </p:sp>
@@ -11903,7 +11903,7 @@
               <a:t> CPU yang terus </a:t>
             </a:r>
             <a:r>
-              <a:rPr lang="" altLang="en-GB" sz="1200" b="0" strike="noStrike" spc="-1">
+              <a:rPr lang="en-US" altLang="en-GB" sz="1200" b="0" strike="noStrike" spc="-1">
                 <a:solidFill>
                   <a:srgbClr val="000000"/>
                 </a:solidFill>
@@ -11917,7 +11917,7 @@
               </a:rPr>
               <a:t>meningkat</a:t>
             </a:r>
-            <a:endParaRPr lang="" altLang="en-GB" sz="1200" b="0" strike="noStrike" spc="-1">
+            <a:endParaRPr lang="en-US" altLang="en-GB" sz="1200" b="0" strike="noStrike" spc="-1">
               <a:solidFill>
                 <a:srgbClr val="000000"/>
               </a:solidFill>
@@ -12405,114 +12405,7 @@
   <p:timing>
     <p:tnLst>
       <p:par>
-        <p:cTn id="1" dur="indefinite" restart="never" nodeType="tmRoot">
-          <p:childTnLst>
-            <p:seq concurrent="1" nextAc="seek">
-              <p:cTn id="2" dur="indefinite" nodeType="mainSeq">
-                <p:childTnLst>
-                  <p:par>
-                    <p:cTn id="3" fill="hold">
-                      <p:stCondLst>
-                        <p:cond delay="indefinite"/>
-                      </p:stCondLst>
-                      <p:childTnLst>
-                        <p:par>
-                          <p:cTn id="4" fill="hold">
-                            <p:stCondLst>
-                              <p:cond delay="0"/>
-                            </p:stCondLst>
-                            <p:childTnLst>
-                              <p:par>
-                                <p:cTn id="5" fill="hold" nodeType="clickEffect">
-                                  <p:stCondLst>
-                                    <p:cond delay="0"/>
-                                  </p:stCondLst>
-                                  <p:childTnLst>
-                                    <p:animEffect transition="in" filter="fade">
-                                      <p:cBhvr additive="repl">
-                                        <p:cTn id="6" dur="500"/>
-                                        <p:tgtEl>
-                                          <p:spTgt spid="166"/>
-                                        </p:tgtEl>
-                                      </p:cBhvr>
-                                    </p:animEffect>
-                                  </p:childTnLst>
-                                </p:cTn>
-                              </p:par>
-                            </p:childTnLst>
-                          </p:cTn>
-                        </p:par>
-                      </p:childTnLst>
-                    </p:cTn>
-                  </p:par>
-                  <p:par>
-                    <p:cTn id="7" fill="hold">
-                      <p:stCondLst>
-                        <p:cond delay="indefinite"/>
-                      </p:stCondLst>
-                      <p:childTnLst>
-                        <p:par>
-                          <p:cTn id="8" fill="hold">
-                            <p:stCondLst>
-                              <p:cond delay="0"/>
-                            </p:stCondLst>
-                            <p:childTnLst>
-                              <p:par>
-                                <p:cTn id="9" presetID="22" presetClass="entr" presetSubtype="8" fill="hold" nodeType="clickEffect">
-                                  <p:stCondLst>
-                                    <p:cond delay="0"/>
-                                  </p:stCondLst>
-                                  <p:childTnLst>
-                                    <p:set>
-                                      <p:cBhvr>
-                                        <p:cTn id="10" dur="1" fill="hold">
-                                          <p:stCondLst>
-                                            <p:cond delay="0"/>
-                                          </p:stCondLst>
-                                        </p:cTn>
-                                        <p:tgtEl/>
-                                        <p:attrNameLst>
-                                          <p:attrName>style.visibility</p:attrName>
-                                        </p:attrNameLst>
-                                      </p:cBhvr>
-                                      <p:to>
-                                        <p:strVal val="visible"/>
-                                      </p:to>
-                                    </p:set>
-                                    <p:animEffect transition="in" filter="wipe(left)">
-                                      <p:cBhvr additive="repl">
-                                        <p:cTn id="11" dur="500"/>
-                                        <p:tgtEl/>
-                                      </p:cBhvr>
-                                    </p:animEffect>
-                                  </p:childTnLst>
-                                </p:cTn>
-                              </p:par>
-                            </p:childTnLst>
-                          </p:cTn>
-                        </p:par>
-                      </p:childTnLst>
-                    </p:cTn>
-                  </p:par>
-                </p:childTnLst>
-              </p:cTn>
-              <p:prevCondLst>
-                <p:cond evt="onPrev" delay="0">
-                  <p:tgtEl>
-                    <p:sldTgt/>
-                  </p:tgtEl>
-                </p:cond>
-              </p:prevCondLst>
-              <p:nextCondLst>
-                <p:cond evt="onNext" delay="0">
-                  <p:tgtEl>
-                    <p:sldTgt/>
-                  </p:tgtEl>
-                </p:cond>
-              </p:nextCondLst>
-            </p:seq>
-          </p:childTnLst>
-        </p:cTn>
+        <p:cTn id="1" dur="indefinite" restart="never" nodeType="tmRoot"/>
       </p:par>
     </p:tnLst>
   </p:timing>
@@ -12893,7 +12786,7 @@
               <a:t> serta dilakukan pengujian </a:t>
             </a:r>
             <a:r>
-              <a:rPr lang="" altLang="en-US" sz="1200" b="0" i="1" strike="noStrike" spc="-1">
+              <a:rPr lang="en-US" altLang="en-US" sz="1200" b="0" i="1" strike="noStrike" spc="-1">
                 <a:solidFill>
                   <a:srgbClr val="000000"/>
                 </a:solidFill>
@@ -12938,7 +12831,7 @@
               <a:t> melalui ns-3 (simulator). Pengambilan data dilakukan dengan cara mengirimkan </a:t>
             </a:r>
             <a:r>
-              <a:rPr lang="" altLang="en-US" sz="1200" b="0" strike="noStrike" spc="-1">
+              <a:rPr lang="en-US" altLang="en-US" sz="1200" b="0" strike="noStrike" spc="-1">
                 <a:solidFill>
                   <a:srgbClr val="000000"/>
                 </a:solidFill>
@@ -12968,7 +12861,7 @@
               <a:t> yang </a:t>
             </a:r>
             <a:r>
-              <a:rPr lang="" altLang="en-US" sz="1200" b="0" strike="noStrike" spc="-1">
+              <a:rPr lang="en-US" altLang="en-US" sz="1200" b="0" strike="noStrike" spc="-1">
                 <a:solidFill>
                   <a:srgbClr val="000000"/>
                 </a:solidFill>
@@ -13484,114 +13377,7 @@
   <p:timing>
     <p:tnLst>
       <p:par>
-        <p:cTn id="1" dur="indefinite" restart="never" nodeType="tmRoot">
-          <p:childTnLst>
-            <p:seq concurrent="1" nextAc="seek">
-              <p:cTn id="2" dur="indefinite" nodeType="mainSeq">
-                <p:childTnLst>
-                  <p:par>
-                    <p:cTn id="3" fill="hold">
-                      <p:stCondLst>
-                        <p:cond delay="indefinite"/>
-                      </p:stCondLst>
-                      <p:childTnLst>
-                        <p:par>
-                          <p:cTn id="4" fill="hold">
-                            <p:stCondLst>
-                              <p:cond delay="0"/>
-                            </p:stCondLst>
-                            <p:childTnLst>
-                              <p:par>
-                                <p:cTn id="5" fill="hold" nodeType="clickEffect">
-                                  <p:stCondLst>
-                                    <p:cond delay="0"/>
-                                  </p:stCondLst>
-                                  <p:childTnLst>
-                                    <p:animEffect transition="in" filter="fade">
-                                      <p:cBhvr additive="repl">
-                                        <p:cTn id="6" dur="500"/>
-                                        <p:tgtEl>
-                                          <p:spTgt spid="176"/>
-                                        </p:tgtEl>
-                                      </p:cBhvr>
-                                    </p:animEffect>
-                                  </p:childTnLst>
-                                </p:cTn>
-                              </p:par>
-                            </p:childTnLst>
-                          </p:cTn>
-                        </p:par>
-                      </p:childTnLst>
-                    </p:cTn>
-                  </p:par>
-                  <p:par>
-                    <p:cTn id="7" fill="hold">
-                      <p:stCondLst>
-                        <p:cond delay="indefinite"/>
-                      </p:stCondLst>
-                      <p:childTnLst>
-                        <p:par>
-                          <p:cTn id="8" fill="hold">
-                            <p:stCondLst>
-                              <p:cond delay="0"/>
-                            </p:stCondLst>
-                            <p:childTnLst>
-                              <p:par>
-                                <p:cTn id="9" presetID="22" presetClass="entr" presetSubtype="8" fill="hold" nodeType="clickEffect">
-                                  <p:stCondLst>
-                                    <p:cond delay="0"/>
-                                  </p:stCondLst>
-                                  <p:childTnLst>
-                                    <p:set>
-                                      <p:cBhvr>
-                                        <p:cTn id="10" dur="1" fill="hold">
-                                          <p:stCondLst>
-                                            <p:cond delay="0"/>
-                                          </p:stCondLst>
-                                        </p:cTn>
-                                        <p:tgtEl/>
-                                        <p:attrNameLst>
-                                          <p:attrName>style.visibility</p:attrName>
-                                        </p:attrNameLst>
-                                      </p:cBhvr>
-                                      <p:to>
-                                        <p:strVal val="visible"/>
-                                      </p:to>
-                                    </p:set>
-                                    <p:animEffect transition="in" filter="wipe(left)">
-                                      <p:cBhvr additive="repl">
-                                        <p:cTn id="11" dur="500"/>
-                                        <p:tgtEl/>
-                                      </p:cBhvr>
-                                    </p:animEffect>
-                                  </p:childTnLst>
-                                </p:cTn>
-                              </p:par>
-                            </p:childTnLst>
-                          </p:cTn>
-                        </p:par>
-                      </p:childTnLst>
-                    </p:cTn>
-                  </p:par>
-                </p:childTnLst>
-              </p:cTn>
-              <p:prevCondLst>
-                <p:cond evt="onPrev" delay="0">
-                  <p:tgtEl>
-                    <p:sldTgt/>
-                  </p:tgtEl>
-                </p:cond>
-              </p:prevCondLst>
-              <p:nextCondLst>
-                <p:cond evt="onNext" delay="0">
-                  <p:tgtEl>
-                    <p:sldTgt/>
-                  </p:tgtEl>
-                </p:cond>
-              </p:nextCondLst>
-            </p:seq>
-          </p:childTnLst>
-        </p:cTn>
+        <p:cTn id="1" dur="indefinite" restart="never" nodeType="tmRoot"/>
       </p:par>
     </p:tnLst>
   </p:timing>
@@ -13942,7 +13728,7 @@
               <a:t>Di dalam penelitian tersebut, dilakukan analisis perba</a:t>
             </a:r>
             <a:r>
-              <a:rPr lang="" altLang="en-US" sz="1200" b="0" strike="noStrike" spc="-1">
+              <a:rPr lang="en-US" altLang="en-US" sz="1200" b="0" strike="noStrike" spc="-1">
                 <a:solidFill>
                   <a:srgbClr val="000000"/>
                 </a:solidFill>
@@ -13972,7 +13758,7 @@
               <a:t>dingan delay </a:t>
             </a:r>
             <a:r>
-              <a:rPr lang="" altLang="en-US" sz="1200" b="0" strike="noStrike" spc="-1">
+              <a:rPr lang="en-US" altLang="en-US" sz="1200" b="0" strike="noStrike" spc="-1">
                 <a:solidFill>
                   <a:srgbClr val="000000"/>
                 </a:solidFill>
@@ -13999,40 +13785,10 @@
                 <a:latin typeface="Caviar Dreams"/>
                 <a:ea typeface="DejaVu Sans" panose="020B0603030804020204"/>
               </a:rPr>
-              <a:t> besar resource CPU yang digunakan oleh teknologi SSE maupun Websocket dengan </a:t>
-            </a:r>
-            <a:r>
-              <a:rPr lang="" sz="1200" b="0" strike="noStrike" spc="-1">
-                <a:solidFill>
-                  <a:srgbClr val="000000"/>
-                </a:solidFill>
-                <a:uFill>
-                  <a:solidFill>
-                    <a:srgbClr val="FFFFFF"/>
-                  </a:solidFill>
-                </a:uFill>
-                <a:latin typeface="Caviar Dreams"/>
-                <a:ea typeface="DejaVu Sans" panose="020B0603030804020204"/>
-              </a:rPr>
-              <a:t>server </a:t>
-            </a:r>
-            <a:r>
-              <a:rPr lang="en-US" sz="1200" b="0" strike="noStrike" spc="-1">
-                <a:solidFill>
-                  <a:srgbClr val="000000"/>
-                </a:solidFill>
-                <a:uFill>
-                  <a:solidFill>
-                    <a:srgbClr val="FFFFFF"/>
-                  </a:solidFill>
-                </a:uFill>
-                <a:latin typeface="Caviar Dreams"/>
-                <a:ea typeface="DejaVu Sans" panose="020B0603030804020204"/>
-              </a:rPr>
-              <a:t>yang  dijalankan menggunakan bahasa python</a:t>
-            </a:r>
-            <a:r>
-              <a:rPr lang="" altLang="en-US" sz="1200" b="0" strike="noStrike" spc="-1">
+              <a:t> besar resource CPU yang digunakan oleh teknologi SSE maupun Websocket dengan server yang  dijalankan menggunakan bahasa python</a:t>
+            </a:r>
+            <a:r>
+              <a:rPr lang="en-US" altLang="en-US" sz="1200" b="0" strike="noStrike" spc="-1">
                 <a:solidFill>
                   <a:srgbClr val="000000"/>
                 </a:solidFill>
@@ -14548,114 +14304,7 @@
   <p:timing>
     <p:tnLst>
       <p:par>
-        <p:cTn id="1" dur="indefinite" restart="never" nodeType="tmRoot">
-          <p:childTnLst>
-            <p:seq concurrent="1" nextAc="seek">
-              <p:cTn id="2" dur="indefinite" nodeType="mainSeq">
-                <p:childTnLst>
-                  <p:par>
-                    <p:cTn id="3" fill="hold">
-                      <p:stCondLst>
-                        <p:cond delay="indefinite"/>
-                      </p:stCondLst>
-                      <p:childTnLst>
-                        <p:par>
-                          <p:cTn id="4" fill="hold">
-                            <p:stCondLst>
-                              <p:cond delay="0"/>
-                            </p:stCondLst>
-                            <p:childTnLst>
-                              <p:par>
-                                <p:cTn id="5" fill="hold" nodeType="clickEffect">
-                                  <p:stCondLst>
-                                    <p:cond delay="0"/>
-                                  </p:stCondLst>
-                                  <p:childTnLst>
-                                    <p:animEffect transition="in" filter="fade">
-                                      <p:cBhvr additive="repl">
-                                        <p:cTn id="6" dur="500"/>
-                                        <p:tgtEl>
-                                          <p:spTgt spid="186"/>
-                                        </p:tgtEl>
-                                      </p:cBhvr>
-                                    </p:animEffect>
-                                  </p:childTnLst>
-                                </p:cTn>
-                              </p:par>
-                            </p:childTnLst>
-                          </p:cTn>
-                        </p:par>
-                      </p:childTnLst>
-                    </p:cTn>
-                  </p:par>
-                  <p:par>
-                    <p:cTn id="7" fill="hold">
-                      <p:stCondLst>
-                        <p:cond delay="indefinite"/>
-                      </p:stCondLst>
-                      <p:childTnLst>
-                        <p:par>
-                          <p:cTn id="8" fill="hold">
-                            <p:stCondLst>
-                              <p:cond delay="0"/>
-                            </p:stCondLst>
-                            <p:childTnLst>
-                              <p:par>
-                                <p:cTn id="9" presetID="22" presetClass="entr" presetSubtype="8" fill="hold" nodeType="clickEffect">
-                                  <p:stCondLst>
-                                    <p:cond delay="0"/>
-                                  </p:stCondLst>
-                                  <p:childTnLst>
-                                    <p:set>
-                                      <p:cBhvr>
-                                        <p:cTn id="10" dur="1" fill="hold">
-                                          <p:stCondLst>
-                                            <p:cond delay="0"/>
-                                          </p:stCondLst>
-                                        </p:cTn>
-                                        <p:tgtEl/>
-                                        <p:attrNameLst>
-                                          <p:attrName>style.visibility</p:attrName>
-                                        </p:attrNameLst>
-                                      </p:cBhvr>
-                                      <p:to>
-                                        <p:strVal val="visible"/>
-                                      </p:to>
-                                    </p:set>
-                                    <p:animEffect transition="in" filter="wipe(left)">
-                                      <p:cBhvr additive="repl">
-                                        <p:cTn id="11" dur="500"/>
-                                        <p:tgtEl/>
-                                      </p:cBhvr>
-                                    </p:animEffect>
-                                  </p:childTnLst>
-                                </p:cTn>
-                              </p:par>
-                            </p:childTnLst>
-                          </p:cTn>
-                        </p:par>
-                      </p:childTnLst>
-                    </p:cTn>
-                  </p:par>
-                </p:childTnLst>
-              </p:cTn>
-              <p:prevCondLst>
-                <p:cond evt="onPrev" delay="0">
-                  <p:tgtEl>
-                    <p:sldTgt/>
-                  </p:tgtEl>
-                </p:cond>
-              </p:prevCondLst>
-              <p:nextCondLst>
-                <p:cond evt="onNext" delay="0">
-                  <p:tgtEl>
-                    <p:sldTgt/>
-                  </p:tgtEl>
-                </p:cond>
-              </p:nextCondLst>
-            </p:seq>
-          </p:childTnLst>
-        </p:cTn>
+        <p:cTn id="1" dur="indefinite" restart="never" nodeType="tmRoot"/>
       </p:par>
     </p:tnLst>
   </p:timing>
@@ -15492,114 +15141,7 @@
   <p:timing>
     <p:tnLst>
       <p:par>
-        <p:cTn id="1" dur="indefinite" restart="never" nodeType="tmRoot">
-          <p:childTnLst>
-            <p:seq concurrent="1" nextAc="seek">
-              <p:cTn id="2" dur="indefinite" nodeType="mainSeq">
-                <p:childTnLst>
-                  <p:par>
-                    <p:cTn id="3" fill="hold">
-                      <p:stCondLst>
-                        <p:cond delay="indefinite"/>
-                      </p:stCondLst>
-                      <p:childTnLst>
-                        <p:par>
-                          <p:cTn id="4" fill="hold">
-                            <p:stCondLst>
-                              <p:cond delay="0"/>
-                            </p:stCondLst>
-                            <p:childTnLst>
-                              <p:par>
-                                <p:cTn id="5" fill="hold" nodeType="clickEffect">
-                                  <p:stCondLst>
-                                    <p:cond delay="0"/>
-                                  </p:stCondLst>
-                                  <p:childTnLst>
-                                    <p:animEffect transition="in" filter="fade">
-                                      <p:cBhvr additive="repl">
-                                        <p:cTn id="6" dur="500"/>
-                                        <p:tgtEl>
-                                          <p:spTgt spid="196"/>
-                                        </p:tgtEl>
-                                      </p:cBhvr>
-                                    </p:animEffect>
-                                  </p:childTnLst>
-                                </p:cTn>
-                              </p:par>
-                            </p:childTnLst>
-                          </p:cTn>
-                        </p:par>
-                      </p:childTnLst>
-                    </p:cTn>
-                  </p:par>
-                  <p:par>
-                    <p:cTn id="7" fill="hold">
-                      <p:stCondLst>
-                        <p:cond delay="indefinite"/>
-                      </p:stCondLst>
-                      <p:childTnLst>
-                        <p:par>
-                          <p:cTn id="8" fill="hold">
-                            <p:stCondLst>
-                              <p:cond delay="0"/>
-                            </p:stCondLst>
-                            <p:childTnLst>
-                              <p:par>
-                                <p:cTn id="9" presetID="22" presetClass="entr" presetSubtype="8" fill="hold" nodeType="clickEffect">
-                                  <p:stCondLst>
-                                    <p:cond delay="0"/>
-                                  </p:stCondLst>
-                                  <p:childTnLst>
-                                    <p:set>
-                                      <p:cBhvr>
-                                        <p:cTn id="10" dur="1" fill="hold">
-                                          <p:stCondLst>
-                                            <p:cond delay="0"/>
-                                          </p:stCondLst>
-                                        </p:cTn>
-                                        <p:tgtEl/>
-                                        <p:attrNameLst>
-                                          <p:attrName>style.visibility</p:attrName>
-                                        </p:attrNameLst>
-                                      </p:cBhvr>
-                                      <p:to>
-                                        <p:strVal val="visible"/>
-                                      </p:to>
-                                    </p:set>
-                                    <p:animEffect transition="in" filter="wipe(left)">
-                                      <p:cBhvr additive="repl">
-                                        <p:cTn id="11" dur="500"/>
-                                        <p:tgtEl/>
-                                      </p:cBhvr>
-                                    </p:animEffect>
-                                  </p:childTnLst>
-                                </p:cTn>
-                              </p:par>
-                            </p:childTnLst>
-                          </p:cTn>
-                        </p:par>
-                      </p:childTnLst>
-                    </p:cTn>
-                  </p:par>
-                </p:childTnLst>
-              </p:cTn>
-              <p:prevCondLst>
-                <p:cond evt="onPrev" delay="0">
-                  <p:tgtEl>
-                    <p:sldTgt/>
-                  </p:tgtEl>
-                </p:cond>
-              </p:prevCondLst>
-              <p:nextCondLst>
-                <p:cond evt="onNext" delay="0">
-                  <p:tgtEl>
-                    <p:sldTgt/>
-                  </p:tgtEl>
-                </p:cond>
-              </p:nextCondLst>
-            </p:seq>
-          </p:childTnLst>
-        </p:cTn>
+        <p:cTn id="1" dur="indefinite" restart="never" nodeType="tmRoot"/>
       </p:par>
     </p:tnLst>
   </p:timing>
@@ -16436,114 +15978,7 @@
   <p:timing>
     <p:tnLst>
       <p:par>
-        <p:cTn id="1" dur="indefinite" restart="never" nodeType="tmRoot">
-          <p:childTnLst>
-            <p:seq concurrent="1" nextAc="seek">
-              <p:cTn id="2" dur="indefinite" nodeType="mainSeq">
-                <p:childTnLst>
-                  <p:par>
-                    <p:cTn id="3" fill="hold">
-                      <p:stCondLst>
-                        <p:cond delay="indefinite"/>
-                      </p:stCondLst>
-                      <p:childTnLst>
-                        <p:par>
-                          <p:cTn id="4" fill="hold">
-                            <p:stCondLst>
-                              <p:cond delay="0"/>
-                            </p:stCondLst>
-                            <p:childTnLst>
-                              <p:par>
-                                <p:cTn id="5" fill="hold" nodeType="clickEffect">
-                                  <p:stCondLst>
-                                    <p:cond delay="0"/>
-                                  </p:stCondLst>
-                                  <p:childTnLst>
-                                    <p:animEffect transition="in" filter="fade">
-                                      <p:cBhvr additive="repl">
-                                        <p:cTn id="6" dur="500"/>
-                                        <p:tgtEl>
-                                          <p:spTgt spid="206"/>
-                                        </p:tgtEl>
-                                      </p:cBhvr>
-                                    </p:animEffect>
-                                  </p:childTnLst>
-                                </p:cTn>
-                              </p:par>
-                            </p:childTnLst>
-                          </p:cTn>
-                        </p:par>
-                      </p:childTnLst>
-                    </p:cTn>
-                  </p:par>
-                  <p:par>
-                    <p:cTn id="7" fill="hold">
-                      <p:stCondLst>
-                        <p:cond delay="indefinite"/>
-                      </p:stCondLst>
-                      <p:childTnLst>
-                        <p:par>
-                          <p:cTn id="8" fill="hold">
-                            <p:stCondLst>
-                              <p:cond delay="0"/>
-                            </p:stCondLst>
-                            <p:childTnLst>
-                              <p:par>
-                                <p:cTn id="9" presetID="22" presetClass="entr" presetSubtype="8" fill="hold" nodeType="clickEffect">
-                                  <p:stCondLst>
-                                    <p:cond delay="0"/>
-                                  </p:stCondLst>
-                                  <p:childTnLst>
-                                    <p:set>
-                                      <p:cBhvr>
-                                        <p:cTn id="10" dur="1" fill="hold">
-                                          <p:stCondLst>
-                                            <p:cond delay="0"/>
-                                          </p:stCondLst>
-                                        </p:cTn>
-                                        <p:tgtEl/>
-                                        <p:attrNameLst>
-                                          <p:attrName>style.visibility</p:attrName>
-                                        </p:attrNameLst>
-                                      </p:cBhvr>
-                                      <p:to>
-                                        <p:strVal val="visible"/>
-                                      </p:to>
-                                    </p:set>
-                                    <p:animEffect transition="in" filter="wipe(left)">
-                                      <p:cBhvr additive="repl">
-                                        <p:cTn id="11" dur="500"/>
-                                        <p:tgtEl/>
-                                      </p:cBhvr>
-                                    </p:animEffect>
-                                  </p:childTnLst>
-                                </p:cTn>
-                              </p:par>
-                            </p:childTnLst>
-                          </p:cTn>
-                        </p:par>
-                      </p:childTnLst>
-                    </p:cTn>
-                  </p:par>
-                </p:childTnLst>
-              </p:cTn>
-              <p:prevCondLst>
-                <p:cond evt="onPrev" delay="0">
-                  <p:tgtEl>
-                    <p:sldTgt/>
-                  </p:tgtEl>
-                </p:cond>
-              </p:prevCondLst>
-              <p:nextCondLst>
-                <p:cond evt="onNext" delay="0">
-                  <p:tgtEl>
-                    <p:sldTgt/>
-                  </p:tgtEl>
-                </p:cond>
-              </p:nextCondLst>
-            </p:seq>
-          </p:childTnLst>
-        </p:cTn>
+        <p:cTn id="1" dur="indefinite" restart="never" nodeType="tmRoot"/>
       </p:par>
     </p:tnLst>
   </p:timing>
@@ -18677,7 +18112,7 @@
               <a:t>Berdasarkan kajian dari Tinjauan Pustaka, dapat dibuat hipotesis bahwa Server Sent Event</a:t>
             </a:r>
             <a:r>
-              <a:rPr lang="" altLang="en-US" sz="1600" b="0" strike="noStrike" spc="-1">
+              <a:rPr lang="en-US" altLang="en-US" sz="1600" b="0" strike="noStrike" spc="-1">
                 <a:solidFill>
                   <a:srgbClr val="000000"/>
                 </a:solidFill>
@@ -18707,7 +18142,7 @@
               <a:t> HTTP/2 </a:t>
             </a:r>
             <a:r>
-              <a:rPr lang="" altLang="en-US" sz="1600" b="0" strike="noStrike" spc="-1">
+              <a:rPr lang="en-US" altLang="en-US" sz="1600" b="0" strike="noStrike" spc="-1">
                 <a:solidFill>
                   <a:srgbClr val="000000"/>
                 </a:solidFill>
@@ -18737,7 +18172,7 @@
               <a:t>memiliki </a:t>
             </a:r>
             <a:r>
-              <a:rPr lang="" altLang="en-US" sz="1600" b="0" strike="noStrike" spc="-1">
+              <a:rPr lang="en-US" altLang="en-US" sz="1600" b="0" strike="noStrike" spc="-1">
                 <a:solidFill>
                   <a:srgbClr val="000000"/>
                 </a:solidFill>
@@ -18751,7 +18186,7 @@
               </a:rPr>
               <a:t>response time lebih kecil daripada Server Sent Events HTTP/1.1</a:t>
             </a:r>
-            <a:endParaRPr lang="" altLang="en-US" sz="1800" b="0" strike="noStrike" spc="-1">
+            <a:endParaRPr lang="en-US" altLang="en-US" sz="1800" b="0" strike="noStrike" spc="-1">
               <a:solidFill>
                 <a:srgbClr val="000000"/>
               </a:solidFill>
@@ -18776,65 +18211,7 @@
   <p:timing>
     <p:tnLst>
       <p:par>
-        <p:cTn id="1" dur="indefinite" restart="never" nodeType="tmRoot">
-          <p:childTnLst>
-            <p:seq concurrent="1" nextAc="seek">
-              <p:cTn id="2" dur="indefinite" nodeType="mainSeq">
-                <p:childTnLst>
-                  <p:par>
-                    <p:cTn id="3" fill="hold">
-                      <p:stCondLst>
-                        <p:cond delay="indefinite"/>
-                      </p:stCondLst>
-                      <p:childTnLst>
-                        <p:par>
-                          <p:cTn id="4" fill="hold">
-                            <p:stCondLst>
-                              <p:cond delay="0"/>
-                            </p:stCondLst>
-                            <p:childTnLst>
-                              <p:par>
-                                <p:cTn id="5" fill="hold" nodeType="clickEffect">
-                                  <p:stCondLst>
-                                    <p:cond delay="0"/>
-                                  </p:stCondLst>
-                                  <p:childTnLst>
-                                    <p:animEffect transition="in" filter="fade">
-                                      <p:cBhvr additive="repl">
-                                        <p:cTn id="6" dur="500"/>
-                                        <p:tgtEl>
-                                          <p:spTgt spid="215"/>
-                                        </p:tgtEl>
-                                      </p:cBhvr>
-                                    </p:animEffect>
-                                  </p:childTnLst>
-                                </p:cTn>
-                              </p:par>
-                            </p:childTnLst>
-                          </p:cTn>
-                        </p:par>
-                      </p:childTnLst>
-                    </p:cTn>
-                  </p:par>
-                </p:childTnLst>
-              </p:cTn>
-              <p:prevCondLst>
-                <p:cond evt="onPrev" delay="0">
-                  <p:tgtEl>
-                    <p:sldTgt/>
-                  </p:tgtEl>
-                </p:cond>
-              </p:prevCondLst>
-              <p:nextCondLst>
-                <p:cond evt="onNext" delay="0">
-                  <p:tgtEl>
-                    <p:sldTgt/>
-                  </p:tgtEl>
-                </p:cond>
-              </p:nextCondLst>
-            </p:seq>
-          </p:childTnLst>
-        </p:cTn>
+        <p:cTn id="1" dur="indefinite" restart="never" nodeType="tmRoot"/>
       </p:par>
     </p:tnLst>
   </p:timing>
@@ -20763,7 +20140,7 @@
                             </p:stCondLst>
                             <p:childTnLst>
                               <p:par>
-                                <p:cTn id="5" presetID="10" presetClass="entr" presetSubtype="0" fill="hold" nodeType="afterEffect">
+                                <p:cTn id="5" presetID="22" presetClass="entr" presetSubtype="8" fill="hold" nodeType="afterEffect">
                                   <p:stCondLst>
                                     <p:cond delay="0"/>
                                   </p:stCondLst>
@@ -20771,95 +20148,6 @@
                                     <p:set>
                                       <p:cBhvr>
                                         <p:cTn id="6" dur="1" fill="hold">
-                                          <p:stCondLst>
-                                            <p:cond delay="0"/>
-                                          </p:stCondLst>
-                                        </p:cTn>
-                                        <p:tgtEl/>
-                                        <p:attrNameLst>
-                                          <p:attrName>style.visibility</p:attrName>
-                                        </p:attrNameLst>
-                                      </p:cBhvr>
-                                      <p:to>
-                                        <p:strVal val="visible"/>
-                                      </p:to>
-                                    </p:set>
-                                    <p:animEffect transition="in" filter="fade">
-                                      <p:cBhvr additive="repl">
-                                        <p:cTn id="7" dur="250"/>
-                                        <p:tgtEl/>
-                                      </p:cBhvr>
-                                    </p:animEffect>
-                                  </p:childTnLst>
-                                </p:cTn>
-                              </p:par>
-                            </p:childTnLst>
-                          </p:cTn>
-                        </p:par>
-                      </p:childTnLst>
-                    </p:cTn>
-                  </p:par>
-                  <p:par>
-                    <p:cTn id="8" fill="hold">
-                      <p:stCondLst>
-                        <p:cond delay="indefinite"/>
-                      </p:stCondLst>
-                      <p:childTnLst>
-                        <p:par>
-                          <p:cTn id="9" fill="hold">
-                            <p:stCondLst>
-                              <p:cond delay="0"/>
-                            </p:stCondLst>
-                            <p:childTnLst>
-                              <p:par>
-                                <p:cTn id="10" presetID="22" presetClass="entr" presetSubtype="8" fill="hold" nodeType="clickEffect">
-                                  <p:stCondLst>
-                                    <p:cond delay="0"/>
-                                  </p:stCondLst>
-                                  <p:childTnLst>
-                                    <p:set>
-                                      <p:cBhvr>
-                                        <p:cTn id="11" dur="1" fill="hold">
-                                          <p:stCondLst>
-                                            <p:cond delay="0"/>
-                                          </p:stCondLst>
-                                        </p:cTn>
-                                        <p:tgtEl/>
-                                        <p:attrNameLst>
-                                          <p:attrName>style.visibility</p:attrName>
-                                        </p:attrNameLst>
-                                      </p:cBhvr>
-                                      <p:to>
-                                        <p:strVal val="visible"/>
-                                      </p:to>
-                                    </p:set>
-                                    <p:animEffect transition="in" filter="wipe(left)">
-                                      <p:cBhvr additive="repl">
-                                        <p:cTn id="12" dur="500"/>
-                                        <p:tgtEl/>
-                                      </p:cBhvr>
-                                    </p:animEffect>
-                                  </p:childTnLst>
-                                </p:cTn>
-                              </p:par>
-                            </p:childTnLst>
-                          </p:cTn>
-                        </p:par>
-                        <p:par>
-                          <p:cTn id="13" fill="hold">
-                            <p:stCondLst>
-                              <p:cond delay="500"/>
-                            </p:stCondLst>
-                            <p:childTnLst>
-                              <p:par>
-                                <p:cTn id="14" presetID="22" presetClass="entr" presetSubtype="8" fill="hold" nodeType="afterEffect">
-                                  <p:stCondLst>
-                                    <p:cond delay="0"/>
-                                  </p:stCondLst>
-                                  <p:childTnLst>
-                                    <p:set>
-                                      <p:cBhvr>
-                                        <p:cTn id="15" dur="1" fill="hold">
                                           <p:stCondLst>
                                             <p:cond delay="0"/>
                                           </p:stCondLst>
@@ -20877,7 +20165,7 @@
                                     </p:set>
                                     <p:animEffect transition="in" filter="wipe(left)">
                                       <p:cBhvr additive="repl">
-                                        <p:cTn id="16" dur="500"/>
+                                        <p:cTn id="7" dur="500"/>
                                         <p:tgtEl>
                                           <p:spTgt spid="224"/>
                                         </p:tgtEl>
@@ -20890,60 +20178,20 @@
                           </p:cTn>
                         </p:par>
                         <p:par>
-                          <p:cTn id="17" fill="hold">
+                          <p:cTn id="8" fill="hold">
                             <p:stCondLst>
-                              <p:cond delay="1000"/>
+                              <p:cond delay="500"/>
                             </p:stCondLst>
                             <p:childTnLst>
                               <p:par>
-                                <p:cTn id="18" presetID="22" presetClass="entr" presetSubtype="8" fill="hold" nodeType="afterEffect">
+                                <p:cTn id="9" presetID="22" presetClass="entr" presetSubtype="8" fill="hold" nodeType="afterEffect">
                                   <p:stCondLst>
                                     <p:cond delay="0"/>
                                   </p:stCondLst>
                                   <p:childTnLst>
                                     <p:set>
                                       <p:cBhvr>
-                                        <p:cTn id="19" dur="1" fill="hold">
-                                          <p:stCondLst>
-                                            <p:cond delay="0"/>
-                                          </p:stCondLst>
-                                        </p:cTn>
-                                        <p:tgtEl/>
-                                        <p:attrNameLst>
-                                          <p:attrName>style.visibility</p:attrName>
-                                        </p:attrNameLst>
-                                      </p:cBhvr>
-                                      <p:to>
-                                        <p:strVal val="visible"/>
-                                      </p:to>
-                                    </p:set>
-                                    <p:animEffect transition="in" filter="wipe(left)">
-                                      <p:cBhvr additive="repl">
-                                        <p:cTn id="20" dur="500"/>
-                                        <p:tgtEl/>
-                                      </p:cBhvr>
-                                    </p:animEffect>
-                                  </p:childTnLst>
-                                </p:cTn>
-                              </p:par>
-                            </p:childTnLst>
-                          </p:cTn>
-                        </p:par>
-                        <p:par>
-                          <p:cTn id="21" fill="hold">
-                            <p:stCondLst>
-                              <p:cond delay="1500"/>
-                            </p:stCondLst>
-                            <p:childTnLst>
-                              <p:par>
-                                <p:cTn id="22" presetID="22" presetClass="entr" presetSubtype="8" fill="hold" nodeType="afterEffect">
-                                  <p:stCondLst>
-                                    <p:cond delay="0"/>
-                                  </p:stCondLst>
-                                  <p:childTnLst>
-                                    <p:set>
-                                      <p:cBhvr>
-                                        <p:cTn id="23" dur="1" fill="hold">
+                                        <p:cTn id="10" dur="1" fill="hold">
                                           <p:stCondLst>
                                             <p:cond delay="0"/>
                                           </p:stCondLst>
@@ -20965,7 +20213,7 @@
                                     </p:set>
                                     <p:animEffect transition="in" filter="wipe(left)">
                                       <p:cBhvr additive="repl">
-                                        <p:cTn id="24" dur="500"/>
+                                        <p:cTn id="11" dur="500"/>
                                         <p:tgtEl>
                                           <p:spTgt spid="226">
                                             <p:txEl>
@@ -20982,60 +20230,20 @@
                           </p:cTn>
                         </p:par>
                         <p:par>
-                          <p:cTn id="25" fill="hold">
+                          <p:cTn id="12" fill="hold">
                             <p:stCondLst>
-                              <p:cond delay="2000"/>
+                              <p:cond delay="1000"/>
                             </p:stCondLst>
                             <p:childTnLst>
                               <p:par>
-                                <p:cTn id="26" presetID="22" presetClass="entr" presetSubtype="8" fill="hold" nodeType="afterEffect">
+                                <p:cTn id="13" presetID="22" presetClass="entr" presetSubtype="8" fill="hold" nodeType="afterEffect">
                                   <p:stCondLst>
                                     <p:cond delay="0"/>
                                   </p:stCondLst>
                                   <p:childTnLst>
                                     <p:set>
                                       <p:cBhvr>
-                                        <p:cTn id="27" dur="1" fill="hold">
-                                          <p:stCondLst>
-                                            <p:cond delay="0"/>
-                                          </p:stCondLst>
-                                        </p:cTn>
-                                        <p:tgtEl/>
-                                        <p:attrNameLst>
-                                          <p:attrName>style.visibility</p:attrName>
-                                        </p:attrNameLst>
-                                      </p:cBhvr>
-                                      <p:to>
-                                        <p:strVal val="visible"/>
-                                      </p:to>
-                                    </p:set>
-                                    <p:animEffect transition="in" filter="wipe(left)">
-                                      <p:cBhvr additive="repl">
-                                        <p:cTn id="28" dur="500"/>
-                                        <p:tgtEl/>
-                                      </p:cBhvr>
-                                    </p:animEffect>
-                                  </p:childTnLst>
-                                </p:cTn>
-                              </p:par>
-                            </p:childTnLst>
-                          </p:cTn>
-                        </p:par>
-                        <p:par>
-                          <p:cTn id="29" fill="hold">
-                            <p:stCondLst>
-                              <p:cond delay="2500"/>
-                            </p:stCondLst>
-                            <p:childTnLst>
-                              <p:par>
-                                <p:cTn id="30" presetID="22" presetClass="entr" presetSubtype="8" fill="hold" nodeType="afterEffect">
-                                  <p:stCondLst>
-                                    <p:cond delay="0"/>
-                                  </p:stCondLst>
-                                  <p:childTnLst>
-                                    <p:set>
-                                      <p:cBhvr>
-                                        <p:cTn id="31" dur="1" fill="hold">
+                                        <p:cTn id="14" dur="1" fill="hold">
                                           <p:stCondLst>
                                             <p:cond delay="0"/>
                                           </p:stCondLst>
@@ -21057,7 +20265,7 @@
                                     </p:set>
                                     <p:animEffect transition="in" filter="wipe(left)">
                                       <p:cBhvr additive="repl">
-                                        <p:cTn id="32" dur="500"/>
+                                        <p:cTn id="15" dur="500"/>
                                         <p:tgtEl>
                                           <p:spTgt spid="227">
                                             <p:txEl>
@@ -21074,60 +20282,20 @@
                           </p:cTn>
                         </p:par>
                         <p:par>
-                          <p:cTn id="33" fill="hold">
+                          <p:cTn id="16" fill="hold">
                             <p:stCondLst>
-                              <p:cond delay="3000"/>
+                              <p:cond delay="1500"/>
                             </p:stCondLst>
                             <p:childTnLst>
                               <p:par>
-                                <p:cTn id="34" presetID="22" presetClass="entr" presetSubtype="8" fill="hold" nodeType="afterEffect">
+                                <p:cTn id="17" presetID="22" presetClass="entr" presetSubtype="8" fill="hold" nodeType="afterEffect">
                                   <p:stCondLst>
                                     <p:cond delay="0"/>
                                   </p:stCondLst>
                                   <p:childTnLst>
                                     <p:set>
                                       <p:cBhvr>
-                                        <p:cTn id="35" dur="1" fill="hold">
-                                          <p:stCondLst>
-                                            <p:cond delay="0"/>
-                                          </p:stCondLst>
-                                        </p:cTn>
-                                        <p:tgtEl/>
-                                        <p:attrNameLst>
-                                          <p:attrName>style.visibility</p:attrName>
-                                        </p:attrNameLst>
-                                      </p:cBhvr>
-                                      <p:to>
-                                        <p:strVal val="visible"/>
-                                      </p:to>
-                                    </p:set>
-                                    <p:animEffect transition="in" filter="wipe(left)">
-                                      <p:cBhvr additive="repl">
-                                        <p:cTn id="36" dur="500"/>
-                                        <p:tgtEl/>
-                                      </p:cBhvr>
-                                    </p:animEffect>
-                                  </p:childTnLst>
-                                </p:cTn>
-                              </p:par>
-                            </p:childTnLst>
-                          </p:cTn>
-                        </p:par>
-                        <p:par>
-                          <p:cTn id="37" fill="hold">
-                            <p:stCondLst>
-                              <p:cond delay="3500"/>
-                            </p:stCondLst>
-                            <p:childTnLst>
-                              <p:par>
-                                <p:cTn id="38" presetID="22" presetClass="entr" presetSubtype="8" fill="hold" nodeType="afterEffect">
-                                  <p:stCondLst>
-                                    <p:cond delay="0"/>
-                                  </p:stCondLst>
-                                  <p:childTnLst>
-                                    <p:set>
-                                      <p:cBhvr>
-                                        <p:cTn id="39" dur="1" fill="hold">
+                                        <p:cTn id="18" dur="1" fill="hold">
                                           <p:stCondLst>
                                             <p:cond delay="0"/>
                                           </p:stCondLst>
@@ -21149,7 +20317,7 @@
                                     </p:set>
                                     <p:animEffect transition="in" filter="wipe(left)">
                                       <p:cBhvr additive="repl">
-                                        <p:cTn id="40" dur="500"/>
+                                        <p:cTn id="19" dur="500"/>
                                         <p:tgtEl>
                                           <p:spTgt spid="228">
                                             <p:txEl>
@@ -21166,60 +20334,20 @@
                           </p:cTn>
                         </p:par>
                         <p:par>
-                          <p:cTn id="41" fill="hold">
+                          <p:cTn id="20" fill="hold">
                             <p:stCondLst>
-                              <p:cond delay="4000"/>
+                              <p:cond delay="2000"/>
                             </p:stCondLst>
                             <p:childTnLst>
                               <p:par>
-                                <p:cTn id="42" presetID="22" presetClass="entr" presetSubtype="8" fill="hold" nodeType="afterEffect">
+                                <p:cTn id="21" presetID="22" presetClass="entr" presetSubtype="8" fill="hold" nodeType="afterEffect">
                                   <p:stCondLst>
                                     <p:cond delay="0"/>
                                   </p:stCondLst>
                                   <p:childTnLst>
                                     <p:set>
                                       <p:cBhvr>
-                                        <p:cTn id="43" dur="1" fill="hold">
-                                          <p:stCondLst>
-                                            <p:cond delay="0"/>
-                                          </p:stCondLst>
-                                        </p:cTn>
-                                        <p:tgtEl/>
-                                        <p:attrNameLst>
-                                          <p:attrName>style.visibility</p:attrName>
-                                        </p:attrNameLst>
-                                      </p:cBhvr>
-                                      <p:to>
-                                        <p:strVal val="visible"/>
-                                      </p:to>
-                                    </p:set>
-                                    <p:animEffect transition="in" filter="wipe(left)">
-                                      <p:cBhvr additive="repl">
-                                        <p:cTn id="44" dur="500"/>
-                                        <p:tgtEl/>
-                                      </p:cBhvr>
-                                    </p:animEffect>
-                                  </p:childTnLst>
-                                </p:cTn>
-                              </p:par>
-                            </p:childTnLst>
-                          </p:cTn>
-                        </p:par>
-                        <p:par>
-                          <p:cTn id="45" fill="hold">
-                            <p:stCondLst>
-                              <p:cond delay="4500"/>
-                            </p:stCondLst>
-                            <p:childTnLst>
-                              <p:par>
-                                <p:cTn id="46" presetID="22" presetClass="entr" presetSubtype="8" fill="hold" nodeType="afterEffect">
-                                  <p:stCondLst>
-                                    <p:cond delay="0"/>
-                                  </p:stCondLst>
-                                  <p:childTnLst>
-                                    <p:set>
-                                      <p:cBhvr>
-                                        <p:cTn id="47" dur="1" fill="hold">
+                                        <p:cTn id="22" dur="1" fill="hold">
                                           <p:stCondLst>
                                             <p:cond delay="0"/>
                                           </p:stCondLst>
@@ -21241,7 +20369,7 @@
                                     </p:set>
                                     <p:animEffect transition="in" filter="wipe(left)">
                                       <p:cBhvr additive="repl">
-                                        <p:cTn id="48" dur="500"/>
+                                        <p:cTn id="23" dur="500"/>
                                         <p:tgtEl>
                                           <p:spTgt spid="232">
                                             <p:txEl>
@@ -21258,60 +20386,20 @@
                           </p:cTn>
                         </p:par>
                         <p:par>
-                          <p:cTn id="49" fill="hold">
+                          <p:cTn id="24" fill="hold">
                             <p:stCondLst>
-                              <p:cond delay="5000"/>
+                              <p:cond delay="2500"/>
                             </p:stCondLst>
                             <p:childTnLst>
                               <p:par>
-                                <p:cTn id="50" presetID="22" presetClass="entr" presetSubtype="8" fill="hold" nodeType="afterEffect">
+                                <p:cTn id="25" presetID="22" presetClass="entr" presetSubtype="8" fill="hold" nodeType="afterEffect">
                                   <p:stCondLst>
                                     <p:cond delay="0"/>
                                   </p:stCondLst>
                                   <p:childTnLst>
                                     <p:set>
                                       <p:cBhvr>
-                                        <p:cTn id="51" dur="1" fill="hold">
-                                          <p:stCondLst>
-                                            <p:cond delay="0"/>
-                                          </p:stCondLst>
-                                        </p:cTn>
-                                        <p:tgtEl/>
-                                        <p:attrNameLst>
-                                          <p:attrName>style.visibility</p:attrName>
-                                        </p:attrNameLst>
-                                      </p:cBhvr>
-                                      <p:to>
-                                        <p:strVal val="visible"/>
-                                      </p:to>
-                                    </p:set>
-                                    <p:animEffect transition="in" filter="wipe(left)">
-                                      <p:cBhvr additive="repl">
-                                        <p:cTn id="52" dur="500"/>
-                                        <p:tgtEl/>
-                                      </p:cBhvr>
-                                    </p:animEffect>
-                                  </p:childTnLst>
-                                </p:cTn>
-                              </p:par>
-                            </p:childTnLst>
-                          </p:cTn>
-                        </p:par>
-                        <p:par>
-                          <p:cTn id="53" fill="hold">
-                            <p:stCondLst>
-                              <p:cond delay="5500"/>
-                            </p:stCondLst>
-                            <p:childTnLst>
-                              <p:par>
-                                <p:cTn id="54" presetID="22" presetClass="entr" presetSubtype="8" fill="hold" nodeType="afterEffect">
-                                  <p:stCondLst>
-                                    <p:cond delay="0"/>
-                                  </p:stCondLst>
-                                  <p:childTnLst>
-                                    <p:set>
-                                      <p:cBhvr>
-                                        <p:cTn id="55" dur="1" fill="hold">
+                                        <p:cTn id="26" dur="1" fill="hold">
                                           <p:stCondLst>
                                             <p:cond delay="0"/>
                                           </p:stCondLst>
@@ -21333,7 +20421,7 @@
                                     </p:set>
                                     <p:animEffect transition="in" filter="wipe(left)">
                                       <p:cBhvr additive="repl">
-                                        <p:cTn id="56" dur="500"/>
+                                        <p:cTn id="27" dur="500"/>
                                         <p:tgtEl>
                                           <p:spTgt spid="229">
                                             <p:txEl>
@@ -21349,70 +20437,21 @@
                             </p:childTnLst>
                           </p:cTn>
                         </p:par>
-                      </p:childTnLst>
-                    </p:cTn>
-                  </p:par>
-                  <p:par>
-                    <p:cTn id="57" fill="hold">
-                      <p:stCondLst>
-                        <p:cond delay="indefinite"/>
-                      </p:stCondLst>
-                      <p:childTnLst>
                         <p:par>
-                          <p:cTn id="58" fill="hold">
+                          <p:cTn id="28" fill="hold">
                             <p:stCondLst>
-                              <p:cond delay="0"/>
+                              <p:cond delay="3000"/>
                             </p:stCondLst>
                             <p:childTnLst>
                               <p:par>
-                                <p:cTn id="59" presetID="22" presetClass="entr" presetSubtype="8" fill="hold" nodeType="clickEffect">
+                                <p:cTn id="29" presetID="22" presetClass="entr" presetSubtype="8" fill="hold" nodeType="afterEffect">
                                   <p:stCondLst>
                                     <p:cond delay="0"/>
                                   </p:stCondLst>
                                   <p:childTnLst>
                                     <p:set>
                                       <p:cBhvr>
-                                        <p:cTn id="60" dur="1" fill="hold">
-                                          <p:stCondLst>
-                                            <p:cond delay="0"/>
-                                          </p:stCondLst>
-                                        </p:cTn>
-                                        <p:tgtEl/>
-                                        <p:attrNameLst>
-                                          <p:attrName>style.visibility</p:attrName>
-                                        </p:attrNameLst>
-                                      </p:cBhvr>
-                                      <p:to>
-                                        <p:strVal val="visible"/>
-                                      </p:to>
-                                    </p:set>
-                                    <p:animEffect transition="in" filter="wipe(left)">
-                                      <p:cBhvr additive="repl">
-                                        <p:cTn id="61" dur="500"/>
-                                        <p:tgtEl/>
-                                      </p:cBhvr>
-                                    </p:animEffect>
-                                  </p:childTnLst>
-                                </p:cTn>
-                              </p:par>
-                            </p:childTnLst>
-                          </p:cTn>
-                        </p:par>
-                        <p:par>
-                          <p:cTn id="62" fill="hold">
-                            <p:stCondLst>
-                              <p:cond delay="500"/>
-                            </p:stCondLst>
-                            <p:childTnLst>
-                              <p:par>
-                                <p:cTn id="63" presetID="22" presetClass="entr" presetSubtype="8" fill="hold" nodeType="afterEffect">
-                                  <p:stCondLst>
-                                    <p:cond delay="0"/>
-                                  </p:stCondLst>
-                                  <p:childTnLst>
-                                    <p:set>
-                                      <p:cBhvr>
-                                        <p:cTn id="64" dur="1" fill="hold">
+                                        <p:cTn id="30" dur="1" fill="hold">
                                           <p:stCondLst>
                                             <p:cond delay="0"/>
                                           </p:stCondLst>
@@ -21430,7 +20469,7 @@
                                     </p:set>
                                     <p:animEffect transition="in" filter="wipe(left)">
                                       <p:cBhvr additive="repl">
-                                        <p:cTn id="65" dur="500"/>
+                                        <p:cTn id="31" dur="500"/>
                                         <p:tgtEl>
                                           <p:spTgt spid="225"/>
                                         </p:tgtEl>
@@ -21443,100 +20482,20 @@
                           </p:cTn>
                         </p:par>
                         <p:par>
-                          <p:cTn id="66" fill="hold">
+                          <p:cTn id="32" fill="hold">
                             <p:stCondLst>
-                              <p:cond delay="1000"/>
+                              <p:cond delay="3500"/>
                             </p:stCondLst>
                             <p:childTnLst>
                               <p:par>
-                                <p:cTn id="67" presetID="22" presetClass="entr" presetSubtype="8" fill="hold" nodeType="afterEffect">
+                                <p:cTn id="33" presetID="22" presetClass="entr" presetSubtype="8" fill="hold" nodeType="afterEffect">
                                   <p:stCondLst>
                                     <p:cond delay="0"/>
                                   </p:stCondLst>
                                   <p:childTnLst>
                                     <p:set>
                                       <p:cBhvr>
-                                        <p:cTn id="68" dur="1" fill="hold">
-                                          <p:stCondLst>
-                                            <p:cond delay="0"/>
-                                          </p:stCondLst>
-                                        </p:cTn>
-                                        <p:tgtEl/>
-                                        <p:attrNameLst>
-                                          <p:attrName>style.visibility</p:attrName>
-                                        </p:attrNameLst>
-                                      </p:cBhvr>
-                                      <p:to>
-                                        <p:strVal val="visible"/>
-                                      </p:to>
-                                    </p:set>
-                                    <p:animEffect transition="in" filter="wipe(left)">
-                                      <p:cBhvr additive="repl">
-                                        <p:cTn id="69" dur="500"/>
-                                        <p:tgtEl/>
-                                      </p:cBhvr>
-                                    </p:animEffect>
-                                  </p:childTnLst>
-                                </p:cTn>
-                              </p:par>
-                            </p:childTnLst>
-                          </p:cTn>
-                        </p:par>
-                        <p:par>
-                          <p:cTn id="70" fill="hold">
-                            <p:stCondLst>
-                              <p:cond delay="1500"/>
-                            </p:stCondLst>
-                            <p:childTnLst>
-                              <p:par>
-                                <p:cTn id="71" presetID="22" presetClass="entr" presetSubtype="8" fill="hold" nodeType="afterEffect">
-                                  <p:stCondLst>
-                                    <p:cond delay="0"/>
-                                  </p:stCondLst>
-                                  <p:childTnLst>
-                                    <p:set>
-                                      <p:cBhvr>
-                                        <p:cTn id="72" dur="1" fill="hold">
-                                          <p:stCondLst>
-                                            <p:cond delay="0"/>
-                                          </p:stCondLst>
-                                        </p:cTn>
-                                        <p:tgtEl/>
-                                        <p:attrNameLst>
-                                          <p:attrName>style.visibility</p:attrName>
-                                        </p:attrNameLst>
-                                      </p:cBhvr>
-                                      <p:to>
-                                        <p:strVal val="visible"/>
-                                      </p:to>
-                                    </p:set>
-                                    <p:animEffect transition="in" filter="wipe(left)">
-                                      <p:cBhvr additive="repl">
-                                        <p:cTn id="73" dur="500"/>
-                                        <p:tgtEl/>
-                                      </p:cBhvr>
-                                    </p:animEffect>
-                                  </p:childTnLst>
-                                </p:cTn>
-                              </p:par>
-                            </p:childTnLst>
-                          </p:cTn>
-                        </p:par>
-                        <p:par>
-                          <p:cTn id="74" fill="hold">
-                            <p:stCondLst>
-                              <p:cond delay="2000"/>
-                            </p:stCondLst>
-                            <p:childTnLst>
-                              <p:par>
-                                <p:cTn id="75" presetID="22" presetClass="entr" presetSubtype="8" fill="hold" nodeType="afterEffect">
-                                  <p:stCondLst>
-                                    <p:cond delay="0"/>
-                                  </p:stCondLst>
-                                  <p:childTnLst>
-                                    <p:set>
-                                      <p:cBhvr>
-                                        <p:cTn id="76" dur="1" fill="hold">
+                                        <p:cTn id="34" dur="1" fill="hold">
                                           <p:stCondLst>
                                             <p:cond delay="0"/>
                                           </p:stCondLst>
@@ -21558,7 +20517,7 @@
                                     </p:set>
                                     <p:animEffect transition="in" filter="wipe(left)">
                                       <p:cBhvr additive="repl">
-                                        <p:cTn id="77" dur="500"/>
+                                        <p:cTn id="35" dur="500"/>
                                         <p:tgtEl>
                                           <p:spTgt spid="230">
                                             <p:txEl>
@@ -21575,60 +20534,20 @@
                           </p:cTn>
                         </p:par>
                         <p:par>
-                          <p:cTn id="78" fill="hold">
+                          <p:cTn id="36" fill="hold">
                             <p:stCondLst>
-                              <p:cond delay="2500"/>
+                              <p:cond delay="4000"/>
                             </p:stCondLst>
                             <p:childTnLst>
                               <p:par>
-                                <p:cTn id="79" presetID="22" presetClass="entr" presetSubtype="8" fill="hold" nodeType="afterEffect">
+                                <p:cTn id="37" presetID="22" presetClass="entr" presetSubtype="8" fill="hold" nodeType="afterEffect">
                                   <p:stCondLst>
                                     <p:cond delay="0"/>
                                   </p:stCondLst>
                                   <p:childTnLst>
                                     <p:set>
                                       <p:cBhvr>
-                                        <p:cTn id="80" dur="1" fill="hold">
-                                          <p:stCondLst>
-                                            <p:cond delay="0"/>
-                                          </p:stCondLst>
-                                        </p:cTn>
-                                        <p:tgtEl/>
-                                        <p:attrNameLst>
-                                          <p:attrName>style.visibility</p:attrName>
-                                        </p:attrNameLst>
-                                      </p:cBhvr>
-                                      <p:to>
-                                        <p:strVal val="visible"/>
-                                      </p:to>
-                                    </p:set>
-                                    <p:animEffect transition="in" filter="wipe(left)">
-                                      <p:cBhvr additive="repl">
-                                        <p:cTn id="81" dur="500"/>
-                                        <p:tgtEl/>
-                                      </p:cBhvr>
-                                    </p:animEffect>
-                                  </p:childTnLst>
-                                </p:cTn>
-                              </p:par>
-                            </p:childTnLst>
-                          </p:cTn>
-                        </p:par>
-                        <p:par>
-                          <p:cTn id="82" fill="hold">
-                            <p:stCondLst>
-                              <p:cond delay="3000"/>
-                            </p:stCondLst>
-                            <p:childTnLst>
-                              <p:par>
-                                <p:cTn id="83" presetID="22" presetClass="entr" presetSubtype="8" fill="hold" nodeType="afterEffect">
-                                  <p:stCondLst>
-                                    <p:cond delay="0"/>
-                                  </p:stCondLst>
-                                  <p:childTnLst>
-                                    <p:set>
-                                      <p:cBhvr>
-                                        <p:cTn id="84" dur="1" fill="hold">
+                                        <p:cTn id="38" dur="1" fill="hold">
                                           <p:stCondLst>
                                             <p:cond delay="0"/>
                                           </p:stCondLst>
@@ -21650,7 +20569,7 @@
                                     </p:set>
                                     <p:animEffect transition="in" filter="wipe(left)">
                                       <p:cBhvr additive="repl">
-                                        <p:cTn id="85" dur="500"/>
+                                        <p:cTn id="39" dur="500"/>
                                         <p:tgtEl>
                                           <p:spTgt spid="231">
                                             <p:txEl>
@@ -21667,60 +20586,20 @@
                           </p:cTn>
                         </p:par>
                         <p:par>
-                          <p:cTn id="86" fill="hold">
+                          <p:cTn id="40" fill="hold">
                             <p:stCondLst>
-                              <p:cond delay="3500"/>
+                              <p:cond delay="4500"/>
                             </p:stCondLst>
                             <p:childTnLst>
                               <p:par>
-                                <p:cTn id="87" presetID="22" presetClass="entr" presetSubtype="8" fill="hold" nodeType="afterEffect">
+                                <p:cTn id="41" presetID="22" presetClass="entr" presetSubtype="8" fill="hold" nodeType="afterEffect">
                                   <p:stCondLst>
                                     <p:cond delay="0"/>
                                   </p:stCondLst>
                                   <p:childTnLst>
                                     <p:set>
                                       <p:cBhvr>
-                                        <p:cTn id="88" dur="1" fill="hold">
-                                          <p:stCondLst>
-                                            <p:cond delay="0"/>
-                                          </p:stCondLst>
-                                        </p:cTn>
-                                        <p:tgtEl/>
-                                        <p:attrNameLst>
-                                          <p:attrName>style.visibility</p:attrName>
-                                        </p:attrNameLst>
-                                      </p:cBhvr>
-                                      <p:to>
-                                        <p:strVal val="visible"/>
-                                      </p:to>
-                                    </p:set>
-                                    <p:animEffect transition="in" filter="wipe(left)">
-                                      <p:cBhvr additive="repl">
-                                        <p:cTn id="89" dur="500"/>
-                                        <p:tgtEl/>
-                                      </p:cBhvr>
-                                    </p:animEffect>
-                                  </p:childTnLst>
-                                </p:cTn>
-                              </p:par>
-                            </p:childTnLst>
-                          </p:cTn>
-                        </p:par>
-                        <p:par>
-                          <p:cTn id="90" fill="hold">
-                            <p:stCondLst>
-                              <p:cond delay="4000"/>
-                            </p:stCondLst>
-                            <p:childTnLst>
-                              <p:par>
-                                <p:cTn id="91" presetID="22" presetClass="entr" presetSubtype="8" fill="hold" nodeType="afterEffect">
-                                  <p:stCondLst>
-                                    <p:cond delay="0"/>
-                                  </p:stCondLst>
-                                  <p:childTnLst>
-                                    <p:set>
-                                      <p:cBhvr>
-                                        <p:cTn id="92" dur="1" fill="hold">
+                                        <p:cTn id="42" dur="1" fill="hold">
                                           <p:stCondLst>
                                             <p:cond delay="0"/>
                                           </p:stCondLst>
@@ -21742,7 +20621,7 @@
                                     </p:set>
                                     <p:animEffect transition="in" filter="wipe(left)">
                                       <p:cBhvr additive="repl">
-                                        <p:cTn id="93" dur="500"/>
+                                        <p:cTn id="43" dur="500"/>
                                         <p:tgtEl>
                                           <p:spTgt spid="233">
                                             <p:txEl>
@@ -21759,20 +20638,20 @@
                           </p:cTn>
                         </p:par>
                         <p:par>
-                          <p:cTn id="94" fill="hold">
+                          <p:cTn id="44" fill="hold">
                             <p:stCondLst>
-                              <p:cond delay="4500"/>
+                              <p:cond delay="5000"/>
                             </p:stCondLst>
                             <p:childTnLst>
                               <p:par>
-                                <p:cTn id="95" presetID="22" presetClass="entr" presetSubtype="8" fill="hold" nodeType="afterEffect">
+                                <p:cTn id="45" presetID="22" presetClass="entr" presetSubtype="8" fill="hold" nodeType="afterEffect">
                                   <p:stCondLst>
                                     <p:cond delay="0"/>
                                   </p:stCondLst>
                                   <p:childTnLst>
                                     <p:set>
                                       <p:cBhvr>
-                                        <p:cTn id="96" dur="1" fill="hold">
+                                        <p:cTn id="46" dur="1" fill="hold">
                                           <p:stCondLst>
                                             <p:cond delay="0"/>
                                           </p:stCondLst>
@@ -21794,7 +20673,7 @@
                                     </p:set>
                                     <p:animEffect transition="in" filter="wipe(left)">
                                       <p:cBhvr additive="repl">
-                                        <p:cTn id="97" dur="500"/>
+                                        <p:cTn id="47" dur="500"/>
                                         <p:tgtEl>
                                           <p:spTgt spid="234">
                                             <p:txEl>
@@ -21811,135 +20690,20 @@
                           </p:cTn>
                         </p:par>
                         <p:par>
-                          <p:cTn id="98" fill="hold">
+                          <p:cTn id="48" fill="hold">
                             <p:stCondLst>
-                              <p:cond delay="5000"/>
+                              <p:cond delay="5500"/>
                             </p:stCondLst>
                             <p:childTnLst>
                               <p:par>
-                                <p:cTn id="99" presetID="22" presetClass="entr" presetSubtype="8" fill="hold" nodeType="afterEffect">
+                                <p:cTn id="49" presetID="22" presetClass="entr" presetSubtype="8" fill="hold" nodeType="afterEffect">
                                   <p:stCondLst>
                                     <p:cond delay="0"/>
                                   </p:stCondLst>
                                   <p:childTnLst>
                                     <p:set>
                                       <p:cBhvr>
-                                        <p:cTn id="100" dur="1" fill="hold">
-                                          <p:stCondLst>
-                                            <p:cond delay="0"/>
-                                          </p:stCondLst>
-                                        </p:cTn>
-                                        <p:tgtEl/>
-                                        <p:attrNameLst>
-                                          <p:attrName>style.visibility</p:attrName>
-                                        </p:attrNameLst>
-                                      </p:cBhvr>
-                                      <p:to>
-                                        <p:strVal val="visible"/>
-                                      </p:to>
-                                    </p:set>
-                                    <p:animEffect transition="in" filter="wipe(left)">
-                                      <p:cBhvr additive="repl">
-                                        <p:cTn id="101" dur="500"/>
-                                        <p:tgtEl/>
-                                      </p:cBhvr>
-                                    </p:animEffect>
-                                  </p:childTnLst>
-                                </p:cTn>
-                              </p:par>
-                            </p:childTnLst>
-                          </p:cTn>
-                        </p:par>
-                        <p:par>
-                          <p:cTn id="102" fill="hold">
-                            <p:stCondLst>
-                              <p:cond delay="5500"/>
-                            </p:stCondLst>
-                            <p:childTnLst>
-                              <p:par>
-                                <p:cTn id="103" presetID="22" presetClass="entr" presetSubtype="8" fill="hold" nodeType="afterEffect">
-                                  <p:stCondLst>
-                                    <p:cond delay="0"/>
-                                  </p:stCondLst>
-                                  <p:childTnLst>
-                                    <p:set>
-                                      <p:cBhvr>
-                                        <p:cTn id="104" dur="1" fill="hold">
-                                          <p:stCondLst>
-                                            <p:cond delay="0"/>
-                                          </p:stCondLst>
-                                        </p:cTn>
-                                        <p:tgtEl/>
-                                        <p:attrNameLst>
-                                          <p:attrName>style.visibility</p:attrName>
-                                        </p:attrNameLst>
-                                      </p:cBhvr>
-                                      <p:to>
-                                        <p:strVal val="visible"/>
-                                      </p:to>
-                                    </p:set>
-                                    <p:animEffect transition="in" filter="wipe(left)">
-                                      <p:cBhvr additive="repl">
-                                        <p:cTn id="105" dur="500"/>
-                                        <p:tgtEl/>
-                                      </p:cBhvr>
-                                    </p:animEffect>
-                                  </p:childTnLst>
-                                </p:cTn>
-                              </p:par>
-                            </p:childTnLst>
-                          </p:cTn>
-                        </p:par>
-                      </p:childTnLst>
-                    </p:cTn>
-                  </p:par>
-                  <p:par>
-                    <p:cTn id="106" fill="hold">
-                      <p:stCondLst>
-                        <p:cond delay="indefinite"/>
-                      </p:stCondLst>
-                      <p:childTnLst>
-                        <p:par>
-                          <p:cTn id="107" fill="hold">
-                            <p:stCondLst>
-                              <p:cond delay="0"/>
-                            </p:stCondLst>
-                            <p:childTnLst>
-                              <p:par>
-                                <p:cTn id="108" fill="hold" nodeType="clickEffect">
-                                  <p:stCondLst>
-                                    <p:cond delay="0"/>
-                                  </p:stCondLst>
-                                  <p:childTnLst>
-                                    <p:animEffect transition="in" filter="fade">
-                                      <p:cBhvr additive="repl">
-                                        <p:cTn id="109" dur="500"/>
-                                        <p:tgtEl>
-                                          <p:spTgt spid="239"/>
-                                        </p:tgtEl>
-                                      </p:cBhvr>
-                                    </p:animEffect>
-                                  </p:childTnLst>
-                                </p:cTn>
-                              </p:par>
-                            </p:childTnLst>
-                          </p:cTn>
-                        </p:par>
-                        <p:par>
-                          <p:cTn id="110" fill="hold">
-                            <p:stCondLst>
-                              <p:cond delay="500"/>
-                            </p:stCondLst>
-                            <p:childTnLst>
-                              <p:par>
-                                <p:cTn id="111" presetID="22" presetClass="entr" presetSubtype="8" fill="hold" nodeType="afterEffect">
-                                  <p:stCondLst>
-                                    <p:cond delay="0"/>
-                                  </p:stCondLst>
-                                  <p:childTnLst>
-                                    <p:set>
-                                      <p:cBhvr>
-                                        <p:cTn id="112" dur="1" fill="hold">
+                                        <p:cTn id="50" dur="1" fill="hold">
                                           <p:stCondLst>
                                             <p:cond delay="0"/>
                                           </p:stCondLst>
@@ -21961,7 +20725,7 @@
                                     </p:set>
                                     <p:animEffect transition="in" filter="wipe(left)">
                                       <p:cBhvr additive="repl">
-                                        <p:cTn id="113" dur="500"/>
+                                        <p:cTn id="51" dur="500"/>
                                         <p:tgtEl>
                                           <p:spTgt spid="241">
                                             <p:txEl>
@@ -21969,46 +20733,6 @@
                                             </p:txEl>
                                           </p:spTgt>
                                         </p:tgtEl>
-                                      </p:cBhvr>
-                                    </p:animEffect>
-                                  </p:childTnLst>
-                                </p:cTn>
-                              </p:par>
-                            </p:childTnLst>
-                          </p:cTn>
-                        </p:par>
-                        <p:par>
-                          <p:cTn id="114" fill="hold">
-                            <p:stCondLst>
-                              <p:cond delay="1000"/>
-                            </p:stCondLst>
-                            <p:childTnLst>
-                              <p:par>
-                                <p:cTn id="115" presetID="22" presetClass="entr" presetSubtype="8" fill="hold" nodeType="afterEffect">
-                                  <p:stCondLst>
-                                    <p:cond delay="0"/>
-                                  </p:stCondLst>
-                                  <p:childTnLst>
-                                    <p:set>
-                                      <p:cBhvr>
-                                        <p:cTn id="116" dur="1" fill="hold">
-                                          <p:stCondLst>
-                                            <p:cond delay="0"/>
-                                          </p:stCondLst>
-                                        </p:cTn>
-                                        <p:tgtEl/>
-                                        <p:attrNameLst>
-                                          <p:attrName>style.visibility</p:attrName>
-                                        </p:attrNameLst>
-                                      </p:cBhvr>
-                                      <p:to>
-                                        <p:strVal val="visible"/>
-                                      </p:to>
-                                    </p:set>
-                                    <p:animEffect transition="in" filter="wipe(left)">
-                                      <p:cBhvr additive="repl">
-                                        <p:cTn id="117" dur="500"/>
-                                        <p:tgtEl/>
                                       </p:cBhvr>
                                     </p:animEffect>
                                   </p:childTnLst>
@@ -22337,37 +21061,7 @@
                 <a:latin typeface="Caviar Dreams"/>
                 <a:ea typeface="Open Sans Extrabold"/>
               </a:rPr>
-              <a:t>(</a:t>
-            </a:r>
-            <a:r>
-              <a:rPr lang="" altLang="en-US" sz="1600" b="1" strike="noStrike" spc="-1">
-                <a:solidFill>
-                  <a:srgbClr val="111C76"/>
-                </a:solidFill>
-                <a:uFill>
-                  <a:solidFill>
-                    <a:srgbClr val="FFFFFF"/>
-                  </a:solidFill>
-                </a:uFill>
-                <a:latin typeface="Caviar Dreams"/>
-                <a:ea typeface="Open Sans Extrabold"/>
-              </a:rPr>
-              <a:t>physical</a:t>
-            </a:r>
-            <a:r>
-              <a:rPr lang="en-US" altLang="en-US" sz="1600" b="1" strike="noStrike" spc="-1">
-                <a:solidFill>
-                  <a:srgbClr val="111C76"/>
-                </a:solidFill>
-                <a:uFill>
-                  <a:solidFill>
-                    <a:srgbClr val="FFFFFF"/>
-                  </a:solidFill>
-                </a:uFill>
-                <a:latin typeface="Caviar Dreams"/>
-                <a:ea typeface="Open Sans Extrabold"/>
-              </a:rPr>
-              <a:t>)</a:t>
+              <a:t>(physical)</a:t>
             </a:r>
             <a:endParaRPr lang="en-US" altLang="en-US" sz="1600" b="1" strike="noStrike" spc="-1">
               <a:solidFill>
@@ -23168,7 +21862,7 @@
               </a:lnSpc>
             </a:pPr>
             <a:r>
-              <a:rPr lang="" altLang="en-US" sz="1600" b="1" strike="noStrike" spc="-1">
+              <a:rPr lang="en-US" altLang="en-US" sz="1600" b="1" strike="noStrike" spc="-1">
                 <a:solidFill>
                   <a:srgbClr val="111C76"/>
                 </a:solidFill>
@@ -23182,7 +21876,7 @@
               </a:rPr>
               <a:t>(logical)</a:t>
             </a:r>
-            <a:endParaRPr lang="" altLang="en-US" sz="1600" b="1" strike="noStrike" spc="-1">
+            <a:endParaRPr lang="en-US" altLang="en-US" sz="1600" b="1" strike="noStrike" spc="-1">
               <a:solidFill>
                 <a:srgbClr val="111C76"/>
               </a:solidFill>
@@ -23695,117 +22389,7 @@
   <p:timing>
     <p:tnLst>
       <p:par>
-        <p:cTn id="1" dur="indefinite" restart="never" nodeType="tmRoot">
-          <p:childTnLst>
-            <p:seq concurrent="1" nextAc="seek">
-              <p:cTn id="2" dur="indefinite" nodeType="mainSeq">
-                <p:childTnLst>
-                  <p:par>
-                    <p:cTn id="3" fill="hold">
-                      <p:stCondLst>
-                        <p:cond delay="indefinite"/>
-                        <p:cond evt="onBegin" delay="0">
-                          <p:tn val="2"/>
-                        </p:cond>
-                      </p:stCondLst>
-                      <p:childTnLst>
-                        <p:par>
-                          <p:cTn id="4" fill="hold">
-                            <p:stCondLst>
-                              <p:cond delay="0"/>
-                            </p:stCondLst>
-                            <p:childTnLst>
-                              <p:par>
-                                <p:cTn id="5" presetID="10" presetClass="entr" presetSubtype="0" fill="hold" nodeType="afterEffect">
-                                  <p:stCondLst>
-                                    <p:cond delay="0"/>
-                                  </p:stCondLst>
-                                  <p:childTnLst>
-                                    <p:set>
-                                      <p:cBhvr>
-                                        <p:cTn id="6" dur="1" fill="hold">
-                                          <p:stCondLst>
-                                            <p:cond delay="0"/>
-                                          </p:stCondLst>
-                                        </p:cTn>
-                                        <p:tgtEl/>
-                                        <p:attrNameLst>
-                                          <p:attrName>style.visibility</p:attrName>
-                                        </p:attrNameLst>
-                                      </p:cBhvr>
-                                      <p:to>
-                                        <p:strVal val="visible"/>
-                                      </p:to>
-                                    </p:set>
-                                    <p:animEffect transition="in" filter="fade">
-                                      <p:cBhvr additive="repl">
-                                        <p:cTn id="7" dur="250"/>
-                                        <p:tgtEl/>
-                                      </p:cBhvr>
-                                    </p:animEffect>
-                                  </p:childTnLst>
-                                </p:cTn>
-                              </p:par>
-                            </p:childTnLst>
-                          </p:cTn>
-                        </p:par>
-                      </p:childTnLst>
-                    </p:cTn>
-                  </p:par>
-                  <p:par>
-                    <p:cTn id="8" fill="hold">
-                      <p:stCondLst>
-                        <p:cond delay="indefinite"/>
-                      </p:stCondLst>
-                      <p:childTnLst>
-                        <p:par>
-                          <p:cTn id="9" fill="hold">
-                            <p:stCondLst>
-                              <p:cond delay="0"/>
-                            </p:stCondLst>
-                            <p:childTnLst>
-                              <p:par>
-                                <p:cTn id="10" fill="hold" nodeType="clickEffect">
-                                  <p:stCondLst>
-                                    <p:cond delay="0"/>
-                                  </p:stCondLst>
-                                  <p:childTnLst>
-                                    <p:animEffect transition="in" filter="fade">
-                                      <p:cBhvr additive="repl">
-                                        <p:cTn id="11" dur="500"/>
-                                        <p:tgtEl>
-                                          <p:spTgt spid="264"/>
-                                        </p:tgtEl>
-                                      </p:cBhvr>
-                                    </p:animEffect>
-                                  </p:childTnLst>
-                                </p:cTn>
-                              </p:par>
-                            </p:childTnLst>
-                          </p:cTn>
-                        </p:par>
-                      </p:childTnLst>
-                    </p:cTn>
-                  </p:par>
-                </p:childTnLst>
-              </p:cTn>
-              <p:prevCondLst>
-                <p:cond evt="onPrev" delay="0">
-                  <p:tgtEl>
-                    <p:sldTgt/>
-                  </p:tgtEl>
-                </p:cond>
-              </p:prevCondLst>
-              <p:nextCondLst>
-                <p:cond evt="onNext" delay="0">
-                  <p:tgtEl>
-                    <p:sldTgt/>
-                  </p:tgtEl>
-                </p:cond>
-              </p:nextCondLst>
-            </p:seq>
-          </p:childTnLst>
-        </p:cTn>
+        <p:cTn id="1" dur="indefinite" restart="never" nodeType="tmRoot"/>
       </p:par>
     </p:tnLst>
   </p:timing>
@@ -24006,7 +22590,7 @@
               </a:lnSpc>
             </a:pPr>
             <a:r>
-              <a:rPr lang="" altLang="en-US" sz="1600" b="1" strike="noStrike" spc="-1">
+              <a:rPr lang="en-US" altLang="en-US" sz="1600" b="1" strike="noStrike" spc="-1">
                 <a:solidFill>
                   <a:srgbClr val="111C76"/>
                 </a:solidFill>
@@ -24020,7 +22604,7 @@
               </a:rPr>
               <a:t>Pengujian</a:t>
             </a:r>
-            <a:endParaRPr lang="" altLang="en-US" sz="1800" b="0" strike="noStrike" spc="-1">
+            <a:endParaRPr lang="en-US" altLang="en-US" sz="1800" b="0" strike="noStrike" spc="-1">
               <a:solidFill>
                 <a:srgbClr val="000000"/>
               </a:solidFill>
@@ -24076,7 +22660,7 @@
               <a:buChar char="•"/>
             </a:pPr>
             <a:r>
-              <a:rPr lang="" altLang="en-US" sz="1400" b="0" strike="noStrike" spc="-1">
+              <a:rPr lang="en-US" altLang="en-US" sz="1400" b="0" strike="noStrike" spc="-1">
                 <a:solidFill>
                   <a:srgbClr val="111C76"/>
                 </a:solidFill>
@@ -24091,7 +22675,7 @@
               <a:t>Pengujian Response Time dilakukan dengan menghitung </a:t>
             </a:r>
             <a:r>
-              <a:rPr lang="" altLang="en-US" sz="1400" b="0" i="1" strike="noStrike" spc="-1">
+              <a:rPr lang="en-US" altLang="en-US" sz="1400" b="0" i="1" strike="noStrike" spc="-1">
                 <a:solidFill>
                   <a:srgbClr val="111C76"/>
                 </a:solidFill>
@@ -24106,7 +22690,7 @@
               <a:t>response time</a:t>
             </a:r>
             <a:r>
-              <a:rPr lang="" altLang="en-US" sz="1400" b="0" strike="noStrike" spc="-1">
+              <a:rPr lang="en-US" altLang="en-US" sz="1400" b="0" strike="noStrike" spc="-1">
                 <a:solidFill>
                   <a:srgbClr val="111C76"/>
                 </a:solidFill>
@@ -24120,7 +22704,7 @@
               </a:rPr>
               <a:t> setelah dilakukannya pengiriman perintah dari website sampai mendapatkan status arduino terbaru</a:t>
             </a:r>
-            <a:endParaRPr lang="" altLang="en-US" sz="1400" b="0" strike="noStrike" spc="-1">
+            <a:endParaRPr lang="en-US" altLang="en-US" sz="1400" b="0" strike="noStrike" spc="-1">
               <a:solidFill>
                 <a:srgbClr val="111C76"/>
               </a:solidFill>
@@ -24141,7 +22725,7 @@
               <a:buFont typeface="Arial" panose="020B0604020202020204" pitchFamily="34" charset="0"/>
               <a:buChar char="•"/>
             </a:pPr>
-            <a:endParaRPr lang="" altLang="en-US" sz="1400" b="0" strike="noStrike" spc="-1">
+            <a:endParaRPr lang="en-US" altLang="en-US" sz="1400" b="0" strike="noStrike" spc="-1">
               <a:solidFill>
                 <a:srgbClr val="000000"/>
               </a:solidFill>
@@ -24175,10 +22759,10 @@
                 <a:ea typeface="DejaVu Sans" panose="020B0603030804020204"/>
                 <a:sym typeface="+mn-ea"/>
               </a:rPr>
-              <a:t>Pengujian </a:t>
-            </a:r>
-            <a:r>
-              <a:rPr lang="" altLang="en-US" sz="1400" spc="-1">
+              <a:t>Pengujian Multiplexing dilakukan dengan menghitung </a:t>
+            </a:r>
+            <a:r>
+              <a:rPr lang="en-US" altLang="en-US" sz="1400" i="1" spc="-1">
                 <a:solidFill>
                   <a:srgbClr val="111C76"/>
                 </a:solidFill>
@@ -24191,10 +22775,10 @@
                 <a:ea typeface="DejaVu Sans" panose="020B0603030804020204"/>
                 <a:sym typeface="+mn-ea"/>
               </a:rPr>
-              <a:t>Multiplexing</a:t>
-            </a:r>
-            <a:r>
-              <a:rPr lang="" altLang="en-US" sz="1400" spc="-1">
+              <a:t>response time</a:t>
+            </a:r>
+            <a:r>
+              <a:rPr lang="en-US" altLang="en-US" sz="1400" spc="-1">
                 <a:solidFill>
                   <a:srgbClr val="111C76"/>
                 </a:solidFill>
@@ -24207,87 +22791,7 @@
                 <a:ea typeface="DejaVu Sans" panose="020B0603030804020204"/>
                 <a:sym typeface="+mn-ea"/>
               </a:rPr>
-              <a:t> </a:t>
-            </a:r>
-            <a:r>
-              <a:rPr lang="en-US" altLang="en-US" sz="1400" spc="-1">
-                <a:solidFill>
-                  <a:srgbClr val="111C76"/>
-                </a:solidFill>
-                <a:uFill>
-                  <a:solidFill>
-                    <a:srgbClr val="FFFFFF"/>
-                  </a:solidFill>
-                </a:uFill>
-                <a:latin typeface="Caviar Dreams"/>
-                <a:ea typeface="DejaVu Sans" panose="020B0603030804020204"/>
-                <a:sym typeface="+mn-ea"/>
-              </a:rPr>
-              <a:t>dilakukan dengan menghitung </a:t>
-            </a:r>
-            <a:r>
-              <a:rPr lang="en-US" altLang="en-US" sz="1400" i="1" spc="-1">
-                <a:solidFill>
-                  <a:srgbClr val="111C76"/>
-                </a:solidFill>
-                <a:uFill>
-                  <a:solidFill>
-                    <a:srgbClr val="FFFFFF"/>
-                  </a:solidFill>
-                </a:uFill>
-                <a:latin typeface="Caviar Dreams"/>
-                <a:ea typeface="DejaVu Sans" panose="020B0603030804020204"/>
-                <a:sym typeface="+mn-ea"/>
-              </a:rPr>
-              <a:t>response time</a:t>
-            </a:r>
-            <a:r>
-              <a:rPr lang="en-US" altLang="en-US" sz="1400" spc="-1">
-                <a:solidFill>
-                  <a:srgbClr val="111C76"/>
-                </a:solidFill>
-                <a:uFill>
-                  <a:solidFill>
-                    <a:srgbClr val="FFFFFF"/>
-                  </a:solidFill>
-                </a:uFill>
-                <a:latin typeface="Caviar Dreams"/>
-                <a:ea typeface="DejaVu Sans" panose="020B0603030804020204"/>
-                <a:sym typeface="+mn-ea"/>
-              </a:rPr>
-              <a:t> setelah dilakukannya pengiriman perintah dari website sampai mendapatkan status arduino terbaru </a:t>
-            </a:r>
-            <a:r>
-              <a:rPr lang="en-US" altLang="en-US" sz="1400" spc="-1">
-                <a:solidFill>
-                  <a:srgbClr val="111C76"/>
-                </a:solidFill>
-                <a:uFill>
-                  <a:solidFill>
-                    <a:srgbClr val="FFFFFF"/>
-                  </a:solidFill>
-                </a:uFill>
-                <a:latin typeface="Caviar Dreams"/>
-                <a:ea typeface="DejaVu Sans" panose="020B0603030804020204"/>
-                <a:sym typeface="+mn-ea"/>
-              </a:rPr>
-              <a:t>dengan rentang waktu </a:t>
-            </a:r>
-            <a:r>
-              <a:rPr lang="" altLang="en-US" sz="1400" spc="-1">
-                <a:solidFill>
-                  <a:srgbClr val="111C76"/>
-                </a:solidFill>
-                <a:uFill>
-                  <a:solidFill>
-                    <a:srgbClr val="FFFFFF"/>
-                  </a:solidFill>
-                </a:uFill>
-                <a:latin typeface="Caviar Dreams"/>
-                <a:ea typeface="DejaVu Sans" panose="020B0603030804020204"/>
-                <a:sym typeface="+mn-ea"/>
-              </a:rPr>
-              <a:t>yang semakin pendek, namun pengujian ini terkendala dengan tingkat processing arduino yang rendah</a:t>
+              <a:t> setelah dilakukannya pengiriman perintah dari website sampai mendapatkan status arduino terbaru dengan rentang waktu yang semakin pendek, namun pengujian ini terkendala dengan tingkat processing arduino yang rendah</a:t>
             </a:r>
             <a:endParaRPr lang="en-US" altLang="en-US" sz="1400" b="0" strike="noStrike" spc="-1">
               <a:solidFill>
@@ -24307,7 +22811,7 @@
                 <a:spcPct val="130000"/>
               </a:lnSpc>
             </a:pPr>
-            <a:endParaRPr lang="" altLang="en-US" sz="1400" b="0" strike="noStrike" spc="-1">
+            <a:endParaRPr lang="en-US" altLang="en-US" sz="1400" b="0" strike="noStrike" spc="-1">
               <a:solidFill>
                 <a:srgbClr val="000000"/>
               </a:solidFill>
@@ -25440,7 +23944,7 @@
               <a:t> adalah SSE HTTP/1.1, SSE HTTP/2 dan Websocket. Untuk data yang diambil berupa perbandingan </a:t>
             </a:r>
             <a:r>
-              <a:rPr lang="" altLang="en-US" sz="1400" b="0" i="1" strike="noStrike" spc="-1">
+              <a:rPr lang="en-US" altLang="en-US" sz="1400" b="0" i="1" strike="noStrike" spc="-1">
                 <a:solidFill>
                   <a:srgbClr val="111C76"/>
                 </a:solidFill>
@@ -25990,6 +24494,9 @@
                     <p:cTn id="3" fill="hold">
                       <p:stCondLst>
                         <p:cond delay="indefinite"/>
+                        <p:cond evt="onBegin" delay="0">
+                          <p:tn val="2"/>
+                        </p:cond>
                       </p:stCondLst>
                       <p:childTnLst>
                         <p:par>
@@ -25999,7 +24506,7 @@
                             </p:stCondLst>
                             <p:childTnLst>
                               <p:par>
-                                <p:cTn id="5" presetID="22" presetClass="entr" presetSubtype="1" fill="hold" nodeType="clickEffect">
+                                <p:cTn id="5" presetID="47" presetClass="entr" presetSubtype="0" fill="hold" nodeType="afterEffect">
                                   <p:stCondLst>
                                     <p:cond delay="0"/>
                                   </p:stCondLst>
@@ -26007,46 +24514,6 @@
                                     <p:set>
                                       <p:cBhvr>
                                         <p:cTn id="6" dur="1" fill="hold">
-                                          <p:stCondLst>
-                                            <p:cond delay="0"/>
-                                          </p:stCondLst>
-                                        </p:cTn>
-                                        <p:tgtEl/>
-                                        <p:attrNameLst>
-                                          <p:attrName>style.visibility</p:attrName>
-                                        </p:attrNameLst>
-                                      </p:cBhvr>
-                                      <p:to>
-                                        <p:strVal val="visible"/>
-                                      </p:to>
-                                    </p:set>
-                                    <p:animEffect transition="in" filter="wipe(up)">
-                                      <p:cBhvr additive="repl">
-                                        <p:cTn id="7" dur="500"/>
-                                        <p:tgtEl/>
-                                      </p:cBhvr>
-                                    </p:animEffect>
-                                  </p:childTnLst>
-                                </p:cTn>
-                              </p:par>
-                            </p:childTnLst>
-                          </p:cTn>
-                        </p:par>
-                        <p:par>
-                          <p:cTn id="8" fill="hold">
-                            <p:stCondLst>
-                              <p:cond delay="500"/>
-                            </p:stCondLst>
-                            <p:childTnLst>
-                              <p:par>
-                                <p:cTn id="9" presetID="47" presetClass="entr" presetSubtype="0" fill="hold" nodeType="afterEffect">
-                                  <p:stCondLst>
-                                    <p:cond delay="0"/>
-                                  </p:stCondLst>
-                                  <p:childTnLst>
-                                    <p:set>
-                                      <p:cBhvr>
-                                        <p:cTn id="10" dur="1" fill="hold">
                                           <p:stCondLst>
                                             <p:cond delay="0"/>
                                           </p:stCondLst>
@@ -26068,7 +24535,7 @@
                                     </p:set>
                                     <p:animEffect transition="in" filter="fade">
                                       <p:cBhvr additive="repl">
-                                        <p:cTn id="11" dur="1000"/>
+                                        <p:cTn id="7" dur="1000"/>
                                         <p:tgtEl>
                                           <p:spTgt spid="270">
                                             <p:txEl>
@@ -26080,7 +24547,7 @@
                                     </p:animEffect>
                                     <p:anim calcmode="lin" valueType="num">
                                       <p:cBhvr additive="repl">
-                                        <p:cTn id="12" dur="1000" fill="hold"/>
+                                        <p:cTn id="8" dur="1000" fill="hold"/>
                                         <p:tgtEl>
                                           <p:spTgt spid="270">
                                             <p:txEl>
@@ -26107,7 +24574,7 @@
                                     </p:anim>
                                     <p:anim calcmode="lin" valueType="num">
                                       <p:cBhvr additive="repl">
-                                        <p:cTn id="13" dur="1000" fill="hold"/>
+                                        <p:cTn id="9" dur="1000" fill="hold"/>
                                         <p:tgtEl>
                                           <p:spTgt spid="270">
                                             <p:txEl>
@@ -26132,41 +24599,6 @@
                                         </p:tav>
                                       </p:tavLst>
                                     </p:anim>
-                                  </p:childTnLst>
-                                </p:cTn>
-                              </p:par>
-                            </p:childTnLst>
-                          </p:cTn>
-                        </p:par>
-                      </p:childTnLst>
-                    </p:cTn>
-                  </p:par>
-                  <p:par>
-                    <p:cTn id="14" fill="hold">
-                      <p:stCondLst>
-                        <p:cond delay="indefinite"/>
-                      </p:stCondLst>
-                      <p:childTnLst>
-                        <p:par>
-                          <p:cTn id="15" fill="hold">
-                            <p:stCondLst>
-                              <p:cond delay="0"/>
-                            </p:stCondLst>
-                            <p:childTnLst>
-                              <p:par>
-                                <p:cTn id="16" fill="hold" nodeType="clickEffect">
-                                  <p:stCondLst>
-                                    <p:cond delay="0"/>
-                                  </p:stCondLst>
-                                  <p:childTnLst>
-                                    <p:animEffect transition="in" filter="fade">
-                                      <p:cBhvr additive="repl">
-                                        <p:cTn id="17" dur="500"/>
-                                        <p:tgtEl>
-                                          <p:spTgt spid="275"/>
-                                        </p:tgtEl>
-                                      </p:cBhvr>
-                                    </p:animEffect>
                                   </p:childTnLst>
                                 </p:cTn>
                               </p:par>
@@ -26884,7 +25316,7 @@
               </a:lnSpc>
             </a:pPr>
             <a:r>
-              <a:rPr lang="" altLang="en-US" sz="800" b="0" strike="noStrike" spc="-1">
+              <a:rPr lang="en-US" altLang="en-US" sz="800" b="0" strike="noStrike" spc="-1">
                 <a:solidFill>
                   <a:srgbClr val="1F497D"/>
                 </a:solidFill>
@@ -26896,24 +25328,9 @@
                 <a:latin typeface="Caviar Dreams"/>
                 <a:ea typeface="DejaVu Sans" panose="020B0603030804020204"/>
               </a:rPr>
-              <a:t>“</a:t>
-            </a:r>
-            <a:r>
-              <a:rPr lang="" altLang="en-US" sz="800" b="0" strike="noStrike" spc="-1">
-                <a:solidFill>
-                  <a:srgbClr val="1F497D"/>
-                </a:solidFill>
-                <a:uFill>
-                  <a:solidFill>
-                    <a:srgbClr val="FFFFFF"/>
-                  </a:solidFill>
-                </a:uFill>
-                <a:latin typeface="Caviar Dreams"/>
-                <a:ea typeface="DejaVu Sans" panose="020B0603030804020204"/>
-              </a:rPr>
-              <a:t>Penerapan HTTP/2 SSE dan Websocket pada Rumah Pintar”</a:t>
-            </a:r>
-            <a:endParaRPr lang="" altLang="en-US" sz="800" b="0" strike="noStrike" spc="-1">
+              <a:t>“Penerapan HTTP/2 SSE dan Websocket pada Rumah Pintar”</a:t>
+            </a:r>
+            <a:endParaRPr lang="en-US" altLang="en-US" sz="800" b="0" strike="noStrike" spc="-1">
               <a:solidFill>
                 <a:srgbClr val="1F497D"/>
               </a:solidFill>
@@ -27102,6 +25519,764 @@
           <a:xfrm>
             <a:off x="4480560" y="1424520"/>
             <a:ext cx="3748680" cy="3349440"/>
+          </a:xfrm>
+          <a:prstGeom prst="rect">
+            <a:avLst/>
+          </a:prstGeom>
+          <a:ln>
+            <a:noFill/>
+          </a:ln>
+        </p:spPr>
+      </p:pic>
+    </p:spTree>
+  </p:cSld>
+  <p:clrMapOvr>
+    <a:masterClrMapping/>
+  </p:clrMapOvr>
+  <p:transition spd="slow">
+    <p:push dir="d"/>
+  </p:transition>
+  <p:timing>
+    <p:tnLst>
+      <p:par>
+        <p:cTn id="1" dur="indefinite" restart="never" nodeType="tmRoot"/>
+      </p:par>
+    </p:tnLst>
+  </p:timing>
+</p:sld>
+</file>
+
+<file path=ppt/slides/slide4.xml><?xml version="1.0" encoding="utf-8"?>
+<p:sld xmlns:a="http://schemas.openxmlformats.org/drawingml/2006/main" xmlns:r="http://schemas.openxmlformats.org/officeDocument/2006/relationships" xmlns:p="http://schemas.openxmlformats.org/presentationml/2006/main">
+  <p:cSld>
+    <p:spTree>
+      <p:nvGrpSpPr>
+        <p:cNvPr id="1" name=""/>
+        <p:cNvGrpSpPr/>
+        <p:nvPr/>
+      </p:nvGrpSpPr>
+      <p:grpSpPr>
+        <a:xfrm>
+          <a:off x="0" y="0"/>
+          <a:ext cx="0" cy="0"/>
+          <a:chOff x="0" y="0"/>
+          <a:chExt cx="0" cy="0"/>
+        </a:xfrm>
+      </p:grpSpPr>
+      <p:sp>
+        <p:nvSpPr>
+          <p:cNvPr id="115" name="CustomShape 1"/>
+          <p:cNvSpPr/>
+          <p:nvPr/>
+        </p:nvSpPr>
+        <p:spPr>
+          <a:xfrm>
+            <a:off x="1250640" y="844560"/>
+            <a:ext cx="1619640" cy="510120"/>
+          </a:xfrm>
+          <a:prstGeom prst="chevron">
+            <a:avLst>
+              <a:gd name="adj" fmla="val 50000"/>
+            </a:avLst>
+          </a:prstGeom>
+          <a:solidFill>
+            <a:srgbClr val="111C76"/>
+          </a:solidFill>
+          <a:ln w="3240">
+            <a:solidFill>
+              <a:schemeClr val="bg1"/>
+            </a:solidFill>
+            <a:round/>
+          </a:ln>
+        </p:spPr>
+        <p:style>
+          <a:lnRef idx="2">
+            <a:schemeClr val="accent1">
+              <a:shade val="50000"/>
+            </a:schemeClr>
+          </a:lnRef>
+          <a:fillRef idx="1">
+            <a:schemeClr val="accent1"/>
+          </a:fillRef>
+          <a:effectRef idx="0">
+            <a:schemeClr val="accent1"/>
+          </a:effectRef>
+          <a:fontRef idx="minor"/>
+        </p:style>
+        <p:txBody>
+          <a:bodyPr lIns="90000" tIns="45000" rIns="90000" bIns="45000" anchor="ctr"/>
+          <a:p>
+            <a:pPr algn="ctr">
+              <a:lnSpc>
+                <a:spcPct val="100000"/>
+              </a:lnSpc>
+            </a:pPr>
+            <a:r>
+              <a:rPr lang="en-US" sz="1100" b="0" strike="noStrike" spc="-1">
+                <a:solidFill>
+                  <a:srgbClr val="FFFFFF"/>
+                </a:solidFill>
+                <a:uFill>
+                  <a:solidFill>
+                    <a:srgbClr val="FFFFFF"/>
+                  </a:solidFill>
+                </a:uFill>
+                <a:latin typeface="Caviar Dreams"/>
+                <a:ea typeface="DejaVu Sans" panose="020B0603030804020204"/>
+              </a:rPr>
+              <a:t>Rumusan Masalah</a:t>
+            </a:r>
+            <a:endParaRPr lang="en-US" sz="1800" b="0" strike="noStrike" spc="-1">
+              <a:solidFill>
+                <a:srgbClr val="000000"/>
+              </a:solidFill>
+              <a:uFill>
+                <a:solidFill>
+                  <a:srgbClr val="FFFFFF"/>
+                </a:solidFill>
+              </a:uFill>
+              <a:latin typeface="Arial" panose="020B0604020202020204"/>
+            </a:endParaRPr>
+          </a:p>
+        </p:txBody>
+      </p:sp>
+      <p:sp>
+        <p:nvSpPr>
+          <p:cNvPr id="116" name="CustomShape 2"/>
+          <p:cNvSpPr/>
+          <p:nvPr/>
+        </p:nvSpPr>
+        <p:spPr>
+          <a:xfrm>
+            <a:off x="2614680" y="844560"/>
+            <a:ext cx="1623600" cy="510120"/>
+          </a:xfrm>
+          <a:prstGeom prst="chevron">
+            <a:avLst>
+              <a:gd name="adj" fmla="val 50000"/>
+            </a:avLst>
+          </a:prstGeom>
+          <a:solidFill>
+            <a:srgbClr val="111C76"/>
+          </a:solidFill>
+          <a:ln w="3240">
+            <a:solidFill>
+              <a:schemeClr val="bg1"/>
+            </a:solidFill>
+            <a:round/>
+          </a:ln>
+        </p:spPr>
+        <p:style>
+          <a:lnRef idx="2">
+            <a:schemeClr val="accent1">
+              <a:shade val="50000"/>
+            </a:schemeClr>
+          </a:lnRef>
+          <a:fillRef idx="1">
+            <a:schemeClr val="accent1"/>
+          </a:fillRef>
+          <a:effectRef idx="0">
+            <a:schemeClr val="accent1"/>
+          </a:effectRef>
+          <a:fontRef idx="minor"/>
+        </p:style>
+        <p:txBody>
+          <a:bodyPr lIns="90000" tIns="45000" rIns="90000" bIns="45000" anchor="ctr"/>
+          <a:p>
+            <a:pPr algn="ctr">
+              <a:lnSpc>
+                <a:spcPct val="100000"/>
+              </a:lnSpc>
+            </a:pPr>
+            <a:r>
+              <a:rPr lang="en-US" sz="1100" b="0" strike="noStrike" spc="-1">
+                <a:solidFill>
+                  <a:srgbClr val="FFFFFF"/>
+                </a:solidFill>
+                <a:uFill>
+                  <a:solidFill>
+                    <a:srgbClr val="FFFFFF"/>
+                  </a:solidFill>
+                </a:uFill>
+                <a:latin typeface="Caviar Dreams"/>
+                <a:ea typeface="DejaVu Sans" panose="020B0603030804020204"/>
+              </a:rPr>
+              <a:t>Tujuan Proyek Akhir</a:t>
+            </a:r>
+            <a:endParaRPr lang="en-US" sz="1800" b="0" strike="noStrike" spc="-1">
+              <a:solidFill>
+                <a:srgbClr val="000000"/>
+              </a:solidFill>
+              <a:uFill>
+                <a:solidFill>
+                  <a:srgbClr val="FFFFFF"/>
+                </a:solidFill>
+              </a:uFill>
+              <a:latin typeface="Arial" panose="020B0604020202020204"/>
+            </a:endParaRPr>
+          </a:p>
+        </p:txBody>
+      </p:sp>
+      <p:sp>
+        <p:nvSpPr>
+          <p:cNvPr id="117" name="CustomShape 3"/>
+          <p:cNvSpPr/>
+          <p:nvPr/>
+        </p:nvSpPr>
+        <p:spPr>
+          <a:xfrm>
+            <a:off x="3924000" y="848520"/>
+            <a:ext cx="1727640" cy="510120"/>
+          </a:xfrm>
+          <a:prstGeom prst="chevron">
+            <a:avLst>
+              <a:gd name="adj" fmla="val 50000"/>
+            </a:avLst>
+          </a:prstGeom>
+          <a:solidFill>
+            <a:srgbClr val="111C76"/>
+          </a:solidFill>
+          <a:ln w="3240">
+            <a:solidFill>
+              <a:schemeClr val="bg1"/>
+            </a:solidFill>
+            <a:round/>
+          </a:ln>
+        </p:spPr>
+        <p:style>
+          <a:lnRef idx="2">
+            <a:schemeClr val="accent1">
+              <a:shade val="50000"/>
+            </a:schemeClr>
+          </a:lnRef>
+          <a:fillRef idx="1">
+            <a:schemeClr val="accent1"/>
+          </a:fillRef>
+          <a:effectRef idx="0">
+            <a:schemeClr val="accent1"/>
+          </a:effectRef>
+          <a:fontRef idx="minor"/>
+        </p:style>
+        <p:txBody>
+          <a:bodyPr lIns="90000" tIns="45000" rIns="90000" bIns="45000" anchor="ctr"/>
+          <a:p>
+            <a:pPr algn="ctr">
+              <a:lnSpc>
+                <a:spcPct val="100000"/>
+              </a:lnSpc>
+            </a:pPr>
+            <a:r>
+              <a:rPr lang="en-US" sz="1100" b="0" strike="noStrike" spc="-1">
+                <a:solidFill>
+                  <a:srgbClr val="FFFFFF"/>
+                </a:solidFill>
+                <a:uFill>
+                  <a:solidFill>
+                    <a:srgbClr val="FFFFFF"/>
+                  </a:solidFill>
+                </a:uFill>
+                <a:latin typeface="Caviar Dreams"/>
+                <a:ea typeface="DejaVu Sans" panose="020B0603030804020204"/>
+              </a:rPr>
+              <a:t>Tinjauan Pustaka</a:t>
+            </a:r>
+            <a:endParaRPr lang="en-US" sz="1800" b="0" strike="noStrike" spc="-1">
+              <a:solidFill>
+                <a:srgbClr val="000000"/>
+              </a:solidFill>
+              <a:uFill>
+                <a:solidFill>
+                  <a:srgbClr val="FFFFFF"/>
+                </a:solidFill>
+              </a:uFill>
+              <a:latin typeface="Arial" panose="020B0604020202020204"/>
+            </a:endParaRPr>
+          </a:p>
+        </p:txBody>
+      </p:sp>
+      <p:sp>
+        <p:nvSpPr>
+          <p:cNvPr id="118" name="CustomShape 4"/>
+          <p:cNvSpPr/>
+          <p:nvPr/>
+        </p:nvSpPr>
+        <p:spPr>
+          <a:xfrm>
+            <a:off x="5402160" y="851400"/>
+            <a:ext cx="1755720" cy="503280"/>
+          </a:xfrm>
+          <a:prstGeom prst="chevron">
+            <a:avLst>
+              <a:gd name="adj" fmla="val 50000"/>
+            </a:avLst>
+          </a:prstGeom>
+          <a:solidFill>
+            <a:srgbClr val="111C76"/>
+          </a:solidFill>
+          <a:ln w="3240">
+            <a:solidFill>
+              <a:schemeClr val="bg1"/>
+            </a:solidFill>
+            <a:round/>
+          </a:ln>
+        </p:spPr>
+        <p:style>
+          <a:lnRef idx="2">
+            <a:schemeClr val="accent1">
+              <a:shade val="50000"/>
+            </a:schemeClr>
+          </a:lnRef>
+          <a:fillRef idx="1">
+            <a:schemeClr val="accent1"/>
+          </a:fillRef>
+          <a:effectRef idx="0">
+            <a:schemeClr val="accent1"/>
+          </a:effectRef>
+          <a:fontRef idx="minor"/>
+        </p:style>
+        <p:txBody>
+          <a:bodyPr lIns="90000" tIns="45000" rIns="90000" bIns="45000" anchor="ctr"/>
+          <a:p>
+            <a:pPr algn="ctr">
+              <a:lnSpc>
+                <a:spcPct val="100000"/>
+              </a:lnSpc>
+            </a:pPr>
+            <a:r>
+              <a:rPr lang="en-US" sz="1100" b="0" strike="noStrike" spc="-1">
+                <a:solidFill>
+                  <a:srgbClr val="FFFFFF"/>
+                </a:solidFill>
+                <a:uFill>
+                  <a:solidFill>
+                    <a:srgbClr val="FFFFFF"/>
+                  </a:solidFill>
+                </a:uFill>
+                <a:latin typeface="Caviar Dreams"/>
+                <a:ea typeface="DejaVu Sans" panose="020B0603030804020204"/>
+              </a:rPr>
+              <a:t>Hipotesis</a:t>
+            </a:r>
+            <a:endParaRPr lang="en-US" sz="1800" b="0" strike="noStrike" spc="-1">
+              <a:solidFill>
+                <a:srgbClr val="000000"/>
+              </a:solidFill>
+              <a:uFill>
+                <a:solidFill>
+                  <a:srgbClr val="FFFFFF"/>
+                </a:solidFill>
+              </a:uFill>
+              <a:latin typeface="Arial" panose="020B0604020202020204"/>
+            </a:endParaRPr>
+          </a:p>
+        </p:txBody>
+      </p:sp>
+      <p:sp>
+        <p:nvSpPr>
+          <p:cNvPr id="119" name="CustomShape 5"/>
+          <p:cNvSpPr/>
+          <p:nvPr/>
+        </p:nvSpPr>
+        <p:spPr>
+          <a:xfrm>
+            <a:off x="4624070" y="227330"/>
+            <a:ext cx="3621405" cy="699135"/>
+          </a:xfrm>
+          <a:prstGeom prst="rect">
+            <a:avLst/>
+          </a:prstGeom>
+          <a:noFill/>
+          <a:ln>
+            <a:noFill/>
+          </a:ln>
+        </p:spPr>
+        <p:style>
+          <a:lnRef idx="0">
+            <a:srgbClr val="FFFFFF"/>
+          </a:lnRef>
+          <a:fillRef idx="0">
+            <a:srgbClr val="FFFFFF"/>
+          </a:fillRef>
+          <a:effectRef idx="0">
+            <a:srgbClr val="FFFFFF"/>
+          </a:effectRef>
+          <a:fontRef idx="minor"/>
+        </p:style>
+        <p:txBody>
+          <a:bodyPr lIns="90000" tIns="45000" rIns="90000" bIns="45000"/>
+          <a:p>
+            <a:pPr algn="ctr">
+              <a:lnSpc>
+                <a:spcPct val="100000"/>
+              </a:lnSpc>
+            </a:pPr>
+            <a:r>
+              <a:rPr lang="en-US" sz="2000" b="1" strike="noStrike" spc="-1">
+                <a:solidFill>
+                  <a:srgbClr val="1F497D"/>
+                </a:solidFill>
+                <a:uFill>
+                  <a:solidFill>
+                    <a:srgbClr val="FFFFFF"/>
+                  </a:solidFill>
+                </a:uFill>
+                <a:latin typeface="Capsuula"/>
+                <a:ea typeface="DejaVu Sans" panose="020B0603030804020204"/>
+              </a:rPr>
+              <a:t>Universitas Gadjah Mada</a:t>
+            </a:r>
+            <a:endParaRPr lang="en-US" sz="1800" b="0" strike="noStrike" spc="-1">
+              <a:solidFill>
+                <a:srgbClr val="000000"/>
+              </a:solidFill>
+              <a:uFill>
+                <a:solidFill>
+                  <a:srgbClr val="FFFFFF"/>
+                </a:solidFill>
+              </a:uFill>
+              <a:latin typeface="Arial" panose="020B0604020202020204"/>
+            </a:endParaRPr>
+          </a:p>
+        </p:txBody>
+      </p:sp>
+      <p:sp>
+        <p:nvSpPr>
+          <p:cNvPr id="120" name="CustomShape 6"/>
+          <p:cNvSpPr/>
+          <p:nvPr/>
+        </p:nvSpPr>
+        <p:spPr>
+          <a:xfrm>
+            <a:off x="6849360" y="851400"/>
+            <a:ext cx="1703880" cy="503280"/>
+          </a:xfrm>
+          <a:prstGeom prst="chevron">
+            <a:avLst>
+              <a:gd name="adj" fmla="val 50000"/>
+            </a:avLst>
+          </a:prstGeom>
+          <a:solidFill>
+            <a:srgbClr val="111C76"/>
+          </a:solidFill>
+          <a:ln w="3240">
+            <a:solidFill>
+              <a:schemeClr val="bg1"/>
+            </a:solidFill>
+            <a:round/>
+          </a:ln>
+        </p:spPr>
+        <p:style>
+          <a:lnRef idx="2">
+            <a:schemeClr val="accent1">
+              <a:shade val="50000"/>
+            </a:schemeClr>
+          </a:lnRef>
+          <a:fillRef idx="1">
+            <a:schemeClr val="accent1"/>
+          </a:fillRef>
+          <a:effectRef idx="0">
+            <a:schemeClr val="accent1"/>
+          </a:effectRef>
+          <a:fontRef idx="minor"/>
+        </p:style>
+        <p:txBody>
+          <a:bodyPr lIns="90000" tIns="45000" rIns="90000" bIns="45000" anchor="ctr"/>
+          <a:p>
+            <a:pPr algn="ctr">
+              <a:lnSpc>
+                <a:spcPct val="100000"/>
+              </a:lnSpc>
+            </a:pPr>
+            <a:r>
+              <a:rPr lang="en-US" sz="1100" b="0" strike="noStrike" spc="-1">
+                <a:solidFill>
+                  <a:srgbClr val="FFFFFF"/>
+                </a:solidFill>
+                <a:uFill>
+                  <a:solidFill>
+                    <a:srgbClr val="FFFFFF"/>
+                  </a:solidFill>
+                </a:uFill>
+                <a:latin typeface="Caviar Dreams"/>
+                <a:ea typeface="DejaVu Sans" panose="020B0603030804020204"/>
+              </a:rPr>
+              <a:t>Metodologi</a:t>
+            </a:r>
+            <a:endParaRPr lang="en-US" sz="1800" b="0" strike="noStrike" spc="-1">
+              <a:solidFill>
+                <a:srgbClr val="000000"/>
+              </a:solidFill>
+              <a:uFill>
+                <a:solidFill>
+                  <a:srgbClr val="FFFFFF"/>
+                </a:solidFill>
+              </a:uFill>
+              <a:latin typeface="Arial" panose="020B0604020202020204"/>
+            </a:endParaRPr>
+          </a:p>
+        </p:txBody>
+      </p:sp>
+      <p:sp>
+        <p:nvSpPr>
+          <p:cNvPr id="121" name="CustomShape 7"/>
+          <p:cNvSpPr/>
+          <p:nvPr/>
+        </p:nvSpPr>
+        <p:spPr>
+          <a:xfrm>
+            <a:off x="20880" y="177840"/>
+            <a:ext cx="5270400" cy="576000"/>
+          </a:xfrm>
+          <a:prstGeom prst="rect">
+            <a:avLst/>
+          </a:prstGeom>
+          <a:noFill/>
+          <a:ln>
+            <a:noFill/>
+          </a:ln>
+        </p:spPr>
+        <p:style>
+          <a:lnRef idx="0">
+            <a:srgbClr val="FFFFFF"/>
+          </a:lnRef>
+          <a:fillRef idx="0">
+            <a:srgbClr val="FFFFFF"/>
+          </a:fillRef>
+          <a:effectRef idx="0">
+            <a:srgbClr val="FFFFFF"/>
+          </a:effectRef>
+          <a:fontRef idx="minor"/>
+        </p:style>
+        <p:txBody>
+          <a:bodyPr lIns="90000" tIns="45000" rIns="90000" bIns="45000"/>
+          <a:p>
+            <a:pPr>
+              <a:lnSpc>
+                <a:spcPct val="150000"/>
+              </a:lnSpc>
+            </a:pPr>
+            <a:r>
+              <a:rPr lang="en-US" altLang="en-US" sz="800" spc="-1">
+                <a:solidFill>
+                  <a:srgbClr val="1F497D"/>
+                </a:solidFill>
+                <a:uFill>
+                  <a:solidFill>
+                    <a:srgbClr val="FFFFFF"/>
+                  </a:solidFill>
+                </a:uFill>
+                <a:latin typeface="Caviar Dreams"/>
+                <a:ea typeface="DejaVu Sans" panose="020B0603030804020204"/>
+                <a:sym typeface="+mn-ea"/>
+              </a:rPr>
+              <a:t>“Penerapan HTTP/2 SSE dan Websocket pada Rumah Pintar”</a:t>
+            </a:r>
+            <a:endParaRPr lang="en-US" sz="1800" b="0" strike="noStrike" spc="-1">
+              <a:solidFill>
+                <a:srgbClr val="000000"/>
+              </a:solidFill>
+              <a:uFill>
+                <a:solidFill>
+                  <a:srgbClr val="FFFFFF"/>
+                </a:solidFill>
+              </a:uFill>
+              <a:latin typeface="Arial" panose="020B0604020202020204"/>
+            </a:endParaRPr>
+          </a:p>
+        </p:txBody>
+      </p:sp>
+      <p:sp>
+        <p:nvSpPr>
+          <p:cNvPr id="122" name="CustomShape 8"/>
+          <p:cNvSpPr/>
+          <p:nvPr/>
+        </p:nvSpPr>
+        <p:spPr>
+          <a:xfrm>
+            <a:off x="0" y="843480"/>
+            <a:ext cx="1505160" cy="510120"/>
+          </a:xfrm>
+          <a:prstGeom prst="homePlate">
+            <a:avLst>
+              <a:gd name="adj" fmla="val 50000"/>
+            </a:avLst>
+          </a:prstGeom>
+          <a:solidFill>
+            <a:srgbClr val="F9C534"/>
+          </a:solidFill>
+          <a:ln w="3240">
+            <a:solidFill>
+              <a:srgbClr val="111C76"/>
+            </a:solidFill>
+            <a:round/>
+          </a:ln>
+        </p:spPr>
+        <p:style>
+          <a:lnRef idx="2">
+            <a:schemeClr val="accent1">
+              <a:shade val="50000"/>
+            </a:schemeClr>
+          </a:lnRef>
+          <a:fillRef idx="1">
+            <a:schemeClr val="accent1"/>
+          </a:fillRef>
+          <a:effectRef idx="0">
+            <a:schemeClr val="accent1"/>
+          </a:effectRef>
+          <a:fontRef idx="minor"/>
+        </p:style>
+        <p:txBody>
+          <a:bodyPr lIns="90000" tIns="45000" rIns="90000" bIns="45000" anchor="ctr"/>
+          <a:p>
+            <a:pPr algn="ctr">
+              <a:lnSpc>
+                <a:spcPct val="100000"/>
+              </a:lnSpc>
+            </a:pPr>
+            <a:r>
+              <a:rPr lang="en-US" sz="1100" b="0" strike="noStrike" spc="-1">
+                <a:solidFill>
+                  <a:srgbClr val="111C76"/>
+                </a:solidFill>
+                <a:uFill>
+                  <a:solidFill>
+                    <a:srgbClr val="FFFFFF"/>
+                  </a:solidFill>
+                </a:uFill>
+                <a:latin typeface="Caviar Dreams"/>
+                <a:ea typeface="DejaVu Sans" panose="020B0603030804020204"/>
+              </a:rPr>
+              <a:t>Latar Belakang</a:t>
+            </a:r>
+            <a:endParaRPr lang="en-US" sz="1800" b="0" strike="noStrike" spc="-1">
+              <a:solidFill>
+                <a:srgbClr val="000000"/>
+              </a:solidFill>
+              <a:uFill>
+                <a:solidFill>
+                  <a:srgbClr val="FFFFFF"/>
+                </a:solidFill>
+              </a:uFill>
+              <a:latin typeface="Arial" panose="020B0604020202020204"/>
+            </a:endParaRPr>
+          </a:p>
+        </p:txBody>
+      </p:sp>
+      <p:sp>
+        <p:nvSpPr>
+          <p:cNvPr id="123" name="CustomShape 9"/>
+          <p:cNvSpPr/>
+          <p:nvPr/>
+        </p:nvSpPr>
+        <p:spPr>
+          <a:xfrm>
+            <a:off x="59040" y="1590120"/>
+            <a:ext cx="3720240" cy="2707920"/>
+          </a:xfrm>
+          <a:prstGeom prst="rect">
+            <a:avLst/>
+          </a:prstGeom>
+          <a:solidFill>
+            <a:schemeClr val="accent3">
+              <a:lumMod val="20000"/>
+              <a:lumOff val="80000"/>
+            </a:schemeClr>
+          </a:solidFill>
+          <a:ln>
+            <a:noFill/>
+          </a:ln>
+        </p:spPr>
+        <p:style>
+          <a:lnRef idx="0">
+            <a:srgbClr val="FFFFFF"/>
+          </a:lnRef>
+          <a:fillRef idx="0">
+            <a:srgbClr val="FFFFFF"/>
+          </a:fillRef>
+          <a:effectRef idx="0">
+            <a:srgbClr val="FFFFFF"/>
+          </a:effectRef>
+          <a:fontRef idx="minor"/>
+        </p:style>
+        <p:txBody>
+          <a:bodyPr lIns="90000" tIns="45000" rIns="90000" bIns="45000"/>
+          <a:p>
+            <a:pPr algn="just"/>
+            <a:r>
+              <a:rPr lang="en-GB" sz="1400" b="0" strike="noStrike" spc="-1">
+                <a:solidFill>
+                  <a:srgbClr val="000000"/>
+                </a:solidFill>
+                <a:uFill>
+                  <a:solidFill>
+                    <a:srgbClr val="FFFFFF"/>
+                  </a:solidFill>
+                </a:uFill>
+                <a:latin typeface="Caviar Dreams"/>
+                <a:ea typeface="Times New Roman" panose="02020603050405020304"/>
+              </a:rPr>
+              <a:t>Salah satu penerapan dari </a:t>
+            </a:r>
+            <a:r>
+              <a:rPr lang="en-GB" sz="1400" b="0" i="1" strike="noStrike" spc="-1">
+                <a:solidFill>
+                  <a:srgbClr val="000000"/>
+                </a:solidFill>
+                <a:uFill>
+                  <a:solidFill>
+                    <a:srgbClr val="FFFFFF"/>
+                  </a:solidFill>
+                </a:uFill>
+                <a:latin typeface="Caviar Dreams"/>
+                <a:ea typeface="Times New Roman" panose="02020603050405020304"/>
+              </a:rPr>
+              <a:t>Internet of Things</a:t>
+            </a:r>
+            <a:r>
+              <a:rPr lang="en-GB" sz="1400" b="0" strike="noStrike" spc="-1">
+                <a:solidFill>
+                  <a:srgbClr val="000000"/>
+                </a:solidFill>
+                <a:uFill>
+                  <a:solidFill>
+                    <a:srgbClr val="FFFFFF"/>
+                  </a:solidFill>
+                </a:uFill>
+                <a:latin typeface="Caviar Dreams"/>
+                <a:ea typeface="Times New Roman" panose="02020603050405020304"/>
+              </a:rPr>
+              <a:t> adalah rumah pintar. Bagian terpenting dari rumah pintar adalah jaringan, yang mana menghubungkan informasi yang dihasilkan dari dalam rumah dengan penghuni rumah tersebut</a:t>
+            </a:r>
+            <a:endParaRPr lang="en-GB" sz="1800" b="0" strike="noStrike" spc="-1">
+              <a:solidFill>
+                <a:srgbClr val="000000"/>
+              </a:solidFill>
+              <a:uFill>
+                <a:solidFill>
+                  <a:srgbClr val="FFFFFF"/>
+                </a:solidFill>
+              </a:uFill>
+              <a:latin typeface="Arial" panose="020B0604020202020204"/>
+            </a:endParaRPr>
+          </a:p>
+        </p:txBody>
+      </p:sp>
+      <p:pic>
+        <p:nvPicPr>
+          <p:cNvPr id="124" name="Picture 123"/>
+          <p:cNvPicPr/>
+          <p:nvPr/>
+        </p:nvPicPr>
+        <p:blipFill>
+          <a:blip r:embed="rId1"/>
+          <a:stretch>
+            <a:fillRect/>
+          </a:stretch>
+        </p:blipFill>
+        <p:spPr>
+          <a:xfrm>
+            <a:off x="4846320" y="1714680"/>
+            <a:ext cx="2857320" cy="2857320"/>
           </a:xfrm>
           <a:prstGeom prst="rect">
             <a:avLst/>
@@ -27140,914 +26315,14 @@
                             </p:stCondLst>
                             <p:childTnLst>
                               <p:par>
-                                <p:cTn id="5" fill="hold" nodeType="clickEffect">
-                                  <p:stCondLst>
-                                    <p:cond delay="0"/>
-                                  </p:stCondLst>
-                                  <p:childTnLst>
-                                    <p:animEffect transition="in" filter="fade">
-                                      <p:cBhvr additive="repl">
-                                        <p:cTn id="6" dur="500"/>
-                                        <p:tgtEl>
-                                          <p:spTgt spid="112"/>
-                                        </p:tgtEl>
-                                      </p:cBhvr>
-                                    </p:animEffect>
-                                  </p:childTnLst>
-                                </p:cTn>
-                              </p:par>
-                            </p:childTnLst>
-                          </p:cTn>
-                        </p:par>
-                      </p:childTnLst>
-                    </p:cTn>
-                  </p:par>
-                  <p:par>
-                    <p:cTn id="7" fill="hold">
-                      <p:stCondLst>
-                        <p:cond delay="indefinite"/>
-                      </p:stCondLst>
-                      <p:childTnLst>
-                        <p:par>
-                          <p:cTn id="8" fill="hold">
-                            <p:stCondLst>
-                              <p:cond delay="0"/>
-                            </p:stCondLst>
-                            <p:childTnLst>
-                              <p:par>
-                                <p:cTn id="9" presetID="22" presetClass="entr" presetSubtype="2" fill="hold" nodeType="clickEffect">
+                                <p:cTn id="5" presetID="22" presetClass="entr" presetSubtype="2" fill="hold" nodeType="clickEffect">
                                   <p:stCondLst>
                                     <p:cond delay="0"/>
                                   </p:stCondLst>
                                   <p:childTnLst>
                                     <p:set>
                                       <p:cBhvr>
-                                        <p:cTn id="10" dur="1" fill="hold">
-                                          <p:stCondLst>
-                                            <p:cond delay="0"/>
-                                          </p:stCondLst>
-                                        </p:cTn>
-                                        <p:tgtEl/>
-                                        <p:attrNameLst>
-                                          <p:attrName>style.visibility</p:attrName>
-                                        </p:attrNameLst>
-                                      </p:cBhvr>
-                                      <p:to>
-                                        <p:strVal val="visible"/>
-                                      </p:to>
-                                    </p:set>
-                                    <p:animEffect transition="out" filter="wipe(right)">
-                                      <p:cBhvr additive="repl">
-                                        <p:cTn id="11" dur="500"/>
-                                        <p:tgtEl/>
-                                      </p:cBhvr>
-                                    </p:animEffect>
-                                  </p:childTnLst>
-                                </p:cTn>
-                              </p:par>
-                            </p:childTnLst>
-                          </p:cTn>
-                        </p:par>
-                      </p:childTnLst>
-                    </p:cTn>
-                  </p:par>
-                </p:childTnLst>
-              </p:cTn>
-              <p:prevCondLst>
-                <p:cond evt="onPrev" delay="0">
-                  <p:tgtEl>
-                    <p:sldTgt/>
-                  </p:tgtEl>
-                </p:cond>
-              </p:prevCondLst>
-              <p:nextCondLst>
-                <p:cond evt="onNext" delay="0">
-                  <p:tgtEl>
-                    <p:sldTgt/>
-                  </p:tgtEl>
-                </p:cond>
-              </p:nextCondLst>
-            </p:seq>
-          </p:childTnLst>
-        </p:cTn>
-      </p:par>
-    </p:tnLst>
-  </p:timing>
-</p:sld>
-</file>
-
-<file path=ppt/slides/slide4.xml><?xml version="1.0" encoding="utf-8"?>
-<p:sld xmlns:a="http://schemas.openxmlformats.org/drawingml/2006/main" xmlns:r="http://schemas.openxmlformats.org/officeDocument/2006/relationships" xmlns:p="http://schemas.openxmlformats.org/presentationml/2006/main">
-  <p:cSld>
-    <p:spTree>
-      <p:nvGrpSpPr>
-        <p:cNvPr id="1" name=""/>
-        <p:cNvGrpSpPr/>
-        <p:nvPr/>
-      </p:nvGrpSpPr>
-      <p:grpSpPr>
-        <a:xfrm>
-          <a:off x="0" y="0"/>
-          <a:ext cx="0" cy="0"/>
-          <a:chOff x="0" y="0"/>
-          <a:chExt cx="0" cy="0"/>
-        </a:xfrm>
-      </p:grpSpPr>
-      <p:sp>
-        <p:nvSpPr>
-          <p:cNvPr id="115" name="CustomShape 1"/>
-          <p:cNvSpPr/>
-          <p:nvPr/>
-        </p:nvSpPr>
-        <p:spPr>
-          <a:xfrm>
-            <a:off x="1250640" y="844560"/>
-            <a:ext cx="1619640" cy="510120"/>
-          </a:xfrm>
-          <a:prstGeom prst="chevron">
-            <a:avLst>
-              <a:gd name="adj" fmla="val 50000"/>
-            </a:avLst>
-          </a:prstGeom>
-          <a:solidFill>
-            <a:srgbClr val="111C76"/>
-          </a:solidFill>
-          <a:ln w="3240">
-            <a:solidFill>
-              <a:schemeClr val="bg1"/>
-            </a:solidFill>
-            <a:round/>
-          </a:ln>
-        </p:spPr>
-        <p:style>
-          <a:lnRef idx="2">
-            <a:schemeClr val="accent1">
-              <a:shade val="50000"/>
-            </a:schemeClr>
-          </a:lnRef>
-          <a:fillRef idx="1">
-            <a:schemeClr val="accent1"/>
-          </a:fillRef>
-          <a:effectRef idx="0">
-            <a:schemeClr val="accent1"/>
-          </a:effectRef>
-          <a:fontRef idx="minor"/>
-        </p:style>
-        <p:txBody>
-          <a:bodyPr lIns="90000" tIns="45000" rIns="90000" bIns="45000" anchor="ctr"/>
-          <a:p>
-            <a:pPr algn="ctr">
-              <a:lnSpc>
-                <a:spcPct val="100000"/>
-              </a:lnSpc>
-            </a:pPr>
-            <a:r>
-              <a:rPr lang="en-US" sz="1100" b="0" strike="noStrike" spc="-1">
-                <a:solidFill>
-                  <a:srgbClr val="FFFFFF"/>
-                </a:solidFill>
-                <a:uFill>
-                  <a:solidFill>
-                    <a:srgbClr val="FFFFFF"/>
-                  </a:solidFill>
-                </a:uFill>
-                <a:latin typeface="Caviar Dreams"/>
-                <a:ea typeface="DejaVu Sans" panose="020B0603030804020204"/>
-              </a:rPr>
-              <a:t>Rumusan Masalah</a:t>
-            </a:r>
-            <a:endParaRPr lang="en-US" sz="1800" b="0" strike="noStrike" spc="-1">
-              <a:solidFill>
-                <a:srgbClr val="000000"/>
-              </a:solidFill>
-              <a:uFill>
-                <a:solidFill>
-                  <a:srgbClr val="FFFFFF"/>
-                </a:solidFill>
-              </a:uFill>
-              <a:latin typeface="Arial" panose="020B0604020202020204"/>
-            </a:endParaRPr>
-          </a:p>
-        </p:txBody>
-      </p:sp>
-      <p:sp>
-        <p:nvSpPr>
-          <p:cNvPr id="116" name="CustomShape 2"/>
-          <p:cNvSpPr/>
-          <p:nvPr/>
-        </p:nvSpPr>
-        <p:spPr>
-          <a:xfrm>
-            <a:off x="2614680" y="844560"/>
-            <a:ext cx="1623600" cy="510120"/>
-          </a:xfrm>
-          <a:prstGeom prst="chevron">
-            <a:avLst>
-              <a:gd name="adj" fmla="val 50000"/>
-            </a:avLst>
-          </a:prstGeom>
-          <a:solidFill>
-            <a:srgbClr val="111C76"/>
-          </a:solidFill>
-          <a:ln w="3240">
-            <a:solidFill>
-              <a:schemeClr val="bg1"/>
-            </a:solidFill>
-            <a:round/>
-          </a:ln>
-        </p:spPr>
-        <p:style>
-          <a:lnRef idx="2">
-            <a:schemeClr val="accent1">
-              <a:shade val="50000"/>
-            </a:schemeClr>
-          </a:lnRef>
-          <a:fillRef idx="1">
-            <a:schemeClr val="accent1"/>
-          </a:fillRef>
-          <a:effectRef idx="0">
-            <a:schemeClr val="accent1"/>
-          </a:effectRef>
-          <a:fontRef idx="minor"/>
-        </p:style>
-        <p:txBody>
-          <a:bodyPr lIns="90000" tIns="45000" rIns="90000" bIns="45000" anchor="ctr"/>
-          <a:p>
-            <a:pPr algn="ctr">
-              <a:lnSpc>
-                <a:spcPct val="100000"/>
-              </a:lnSpc>
-            </a:pPr>
-            <a:r>
-              <a:rPr lang="en-US" sz="1100" b="0" strike="noStrike" spc="-1">
-                <a:solidFill>
-                  <a:srgbClr val="FFFFFF"/>
-                </a:solidFill>
-                <a:uFill>
-                  <a:solidFill>
-                    <a:srgbClr val="FFFFFF"/>
-                  </a:solidFill>
-                </a:uFill>
-                <a:latin typeface="Caviar Dreams"/>
-                <a:ea typeface="DejaVu Sans" panose="020B0603030804020204"/>
-              </a:rPr>
-              <a:t>Tujuan Proyek Akhir</a:t>
-            </a:r>
-            <a:endParaRPr lang="en-US" sz="1800" b="0" strike="noStrike" spc="-1">
-              <a:solidFill>
-                <a:srgbClr val="000000"/>
-              </a:solidFill>
-              <a:uFill>
-                <a:solidFill>
-                  <a:srgbClr val="FFFFFF"/>
-                </a:solidFill>
-              </a:uFill>
-              <a:latin typeface="Arial" panose="020B0604020202020204"/>
-            </a:endParaRPr>
-          </a:p>
-        </p:txBody>
-      </p:sp>
-      <p:sp>
-        <p:nvSpPr>
-          <p:cNvPr id="117" name="CustomShape 3"/>
-          <p:cNvSpPr/>
-          <p:nvPr/>
-        </p:nvSpPr>
-        <p:spPr>
-          <a:xfrm>
-            <a:off x="3924000" y="848520"/>
-            <a:ext cx="1727640" cy="510120"/>
-          </a:xfrm>
-          <a:prstGeom prst="chevron">
-            <a:avLst>
-              <a:gd name="adj" fmla="val 50000"/>
-            </a:avLst>
-          </a:prstGeom>
-          <a:solidFill>
-            <a:srgbClr val="111C76"/>
-          </a:solidFill>
-          <a:ln w="3240">
-            <a:solidFill>
-              <a:schemeClr val="bg1"/>
-            </a:solidFill>
-            <a:round/>
-          </a:ln>
-        </p:spPr>
-        <p:style>
-          <a:lnRef idx="2">
-            <a:schemeClr val="accent1">
-              <a:shade val="50000"/>
-            </a:schemeClr>
-          </a:lnRef>
-          <a:fillRef idx="1">
-            <a:schemeClr val="accent1"/>
-          </a:fillRef>
-          <a:effectRef idx="0">
-            <a:schemeClr val="accent1"/>
-          </a:effectRef>
-          <a:fontRef idx="minor"/>
-        </p:style>
-        <p:txBody>
-          <a:bodyPr lIns="90000" tIns="45000" rIns="90000" bIns="45000" anchor="ctr"/>
-          <a:p>
-            <a:pPr algn="ctr">
-              <a:lnSpc>
-                <a:spcPct val="100000"/>
-              </a:lnSpc>
-            </a:pPr>
-            <a:r>
-              <a:rPr lang="en-US" sz="1100" b="0" strike="noStrike" spc="-1">
-                <a:solidFill>
-                  <a:srgbClr val="FFFFFF"/>
-                </a:solidFill>
-                <a:uFill>
-                  <a:solidFill>
-                    <a:srgbClr val="FFFFFF"/>
-                  </a:solidFill>
-                </a:uFill>
-                <a:latin typeface="Caviar Dreams"/>
-                <a:ea typeface="DejaVu Sans" panose="020B0603030804020204"/>
-              </a:rPr>
-              <a:t>Tinjauan Pustaka</a:t>
-            </a:r>
-            <a:endParaRPr lang="en-US" sz="1800" b="0" strike="noStrike" spc="-1">
-              <a:solidFill>
-                <a:srgbClr val="000000"/>
-              </a:solidFill>
-              <a:uFill>
-                <a:solidFill>
-                  <a:srgbClr val="FFFFFF"/>
-                </a:solidFill>
-              </a:uFill>
-              <a:latin typeface="Arial" panose="020B0604020202020204"/>
-            </a:endParaRPr>
-          </a:p>
-        </p:txBody>
-      </p:sp>
-      <p:sp>
-        <p:nvSpPr>
-          <p:cNvPr id="118" name="CustomShape 4"/>
-          <p:cNvSpPr/>
-          <p:nvPr/>
-        </p:nvSpPr>
-        <p:spPr>
-          <a:xfrm>
-            <a:off x="5402160" y="851400"/>
-            <a:ext cx="1755720" cy="503280"/>
-          </a:xfrm>
-          <a:prstGeom prst="chevron">
-            <a:avLst>
-              <a:gd name="adj" fmla="val 50000"/>
-            </a:avLst>
-          </a:prstGeom>
-          <a:solidFill>
-            <a:srgbClr val="111C76"/>
-          </a:solidFill>
-          <a:ln w="3240">
-            <a:solidFill>
-              <a:schemeClr val="bg1"/>
-            </a:solidFill>
-            <a:round/>
-          </a:ln>
-        </p:spPr>
-        <p:style>
-          <a:lnRef idx="2">
-            <a:schemeClr val="accent1">
-              <a:shade val="50000"/>
-            </a:schemeClr>
-          </a:lnRef>
-          <a:fillRef idx="1">
-            <a:schemeClr val="accent1"/>
-          </a:fillRef>
-          <a:effectRef idx="0">
-            <a:schemeClr val="accent1"/>
-          </a:effectRef>
-          <a:fontRef idx="minor"/>
-        </p:style>
-        <p:txBody>
-          <a:bodyPr lIns="90000" tIns="45000" rIns="90000" bIns="45000" anchor="ctr"/>
-          <a:p>
-            <a:pPr algn="ctr">
-              <a:lnSpc>
-                <a:spcPct val="100000"/>
-              </a:lnSpc>
-            </a:pPr>
-            <a:r>
-              <a:rPr lang="en-US" sz="1100" b="0" strike="noStrike" spc="-1">
-                <a:solidFill>
-                  <a:srgbClr val="FFFFFF"/>
-                </a:solidFill>
-                <a:uFill>
-                  <a:solidFill>
-                    <a:srgbClr val="FFFFFF"/>
-                  </a:solidFill>
-                </a:uFill>
-                <a:latin typeface="Caviar Dreams"/>
-                <a:ea typeface="DejaVu Sans" panose="020B0603030804020204"/>
-              </a:rPr>
-              <a:t>Hipotesis</a:t>
-            </a:r>
-            <a:endParaRPr lang="en-US" sz="1800" b="0" strike="noStrike" spc="-1">
-              <a:solidFill>
-                <a:srgbClr val="000000"/>
-              </a:solidFill>
-              <a:uFill>
-                <a:solidFill>
-                  <a:srgbClr val="FFFFFF"/>
-                </a:solidFill>
-              </a:uFill>
-              <a:latin typeface="Arial" panose="020B0604020202020204"/>
-            </a:endParaRPr>
-          </a:p>
-        </p:txBody>
-      </p:sp>
-      <p:sp>
-        <p:nvSpPr>
-          <p:cNvPr id="119" name="CustomShape 5"/>
-          <p:cNvSpPr/>
-          <p:nvPr/>
-        </p:nvSpPr>
-        <p:spPr>
-          <a:xfrm>
-            <a:off x="4624070" y="227330"/>
-            <a:ext cx="3621405" cy="699135"/>
-          </a:xfrm>
-          <a:prstGeom prst="rect">
-            <a:avLst/>
-          </a:prstGeom>
-          <a:noFill/>
-          <a:ln>
-            <a:noFill/>
-          </a:ln>
-        </p:spPr>
-        <p:style>
-          <a:lnRef idx="0">
-            <a:srgbClr val="FFFFFF"/>
-          </a:lnRef>
-          <a:fillRef idx="0">
-            <a:srgbClr val="FFFFFF"/>
-          </a:fillRef>
-          <a:effectRef idx="0">
-            <a:srgbClr val="FFFFFF"/>
-          </a:effectRef>
-          <a:fontRef idx="minor"/>
-        </p:style>
-        <p:txBody>
-          <a:bodyPr lIns="90000" tIns="45000" rIns="90000" bIns="45000"/>
-          <a:p>
-            <a:pPr algn="ctr">
-              <a:lnSpc>
-                <a:spcPct val="100000"/>
-              </a:lnSpc>
-            </a:pPr>
-            <a:r>
-              <a:rPr lang="en-US" sz="2000" b="1" strike="noStrike" spc="-1">
-                <a:solidFill>
-                  <a:srgbClr val="1F497D"/>
-                </a:solidFill>
-                <a:uFill>
-                  <a:solidFill>
-                    <a:srgbClr val="FFFFFF"/>
-                  </a:solidFill>
-                </a:uFill>
-                <a:latin typeface="Capsuula"/>
-                <a:ea typeface="DejaVu Sans" panose="020B0603030804020204"/>
-              </a:rPr>
-              <a:t>Universitas Gadjah Mada</a:t>
-            </a:r>
-            <a:endParaRPr lang="en-US" sz="1800" b="0" strike="noStrike" spc="-1">
-              <a:solidFill>
-                <a:srgbClr val="000000"/>
-              </a:solidFill>
-              <a:uFill>
-                <a:solidFill>
-                  <a:srgbClr val="FFFFFF"/>
-                </a:solidFill>
-              </a:uFill>
-              <a:latin typeface="Arial" panose="020B0604020202020204"/>
-            </a:endParaRPr>
-          </a:p>
-        </p:txBody>
-      </p:sp>
-      <p:sp>
-        <p:nvSpPr>
-          <p:cNvPr id="120" name="CustomShape 6"/>
-          <p:cNvSpPr/>
-          <p:nvPr/>
-        </p:nvSpPr>
-        <p:spPr>
-          <a:xfrm>
-            <a:off x="6849360" y="851400"/>
-            <a:ext cx="1703880" cy="503280"/>
-          </a:xfrm>
-          <a:prstGeom prst="chevron">
-            <a:avLst>
-              <a:gd name="adj" fmla="val 50000"/>
-            </a:avLst>
-          </a:prstGeom>
-          <a:solidFill>
-            <a:srgbClr val="111C76"/>
-          </a:solidFill>
-          <a:ln w="3240">
-            <a:solidFill>
-              <a:schemeClr val="bg1"/>
-            </a:solidFill>
-            <a:round/>
-          </a:ln>
-        </p:spPr>
-        <p:style>
-          <a:lnRef idx="2">
-            <a:schemeClr val="accent1">
-              <a:shade val="50000"/>
-            </a:schemeClr>
-          </a:lnRef>
-          <a:fillRef idx="1">
-            <a:schemeClr val="accent1"/>
-          </a:fillRef>
-          <a:effectRef idx="0">
-            <a:schemeClr val="accent1"/>
-          </a:effectRef>
-          <a:fontRef idx="minor"/>
-        </p:style>
-        <p:txBody>
-          <a:bodyPr lIns="90000" tIns="45000" rIns="90000" bIns="45000" anchor="ctr"/>
-          <a:p>
-            <a:pPr algn="ctr">
-              <a:lnSpc>
-                <a:spcPct val="100000"/>
-              </a:lnSpc>
-            </a:pPr>
-            <a:r>
-              <a:rPr lang="en-US" sz="1100" b="0" strike="noStrike" spc="-1">
-                <a:solidFill>
-                  <a:srgbClr val="FFFFFF"/>
-                </a:solidFill>
-                <a:uFill>
-                  <a:solidFill>
-                    <a:srgbClr val="FFFFFF"/>
-                  </a:solidFill>
-                </a:uFill>
-                <a:latin typeface="Caviar Dreams"/>
-                <a:ea typeface="DejaVu Sans" panose="020B0603030804020204"/>
-              </a:rPr>
-              <a:t>Metodologi</a:t>
-            </a:r>
-            <a:endParaRPr lang="en-US" sz="1800" b="0" strike="noStrike" spc="-1">
-              <a:solidFill>
-                <a:srgbClr val="000000"/>
-              </a:solidFill>
-              <a:uFill>
-                <a:solidFill>
-                  <a:srgbClr val="FFFFFF"/>
-                </a:solidFill>
-              </a:uFill>
-              <a:latin typeface="Arial" panose="020B0604020202020204"/>
-            </a:endParaRPr>
-          </a:p>
-        </p:txBody>
-      </p:sp>
-      <p:sp>
-        <p:nvSpPr>
-          <p:cNvPr id="121" name="CustomShape 7"/>
-          <p:cNvSpPr/>
-          <p:nvPr/>
-        </p:nvSpPr>
-        <p:spPr>
-          <a:xfrm>
-            <a:off x="20880" y="177840"/>
-            <a:ext cx="5270400" cy="576000"/>
-          </a:xfrm>
-          <a:prstGeom prst="rect">
-            <a:avLst/>
-          </a:prstGeom>
-          <a:noFill/>
-          <a:ln>
-            <a:noFill/>
-          </a:ln>
-        </p:spPr>
-        <p:style>
-          <a:lnRef idx="0">
-            <a:srgbClr val="FFFFFF"/>
-          </a:lnRef>
-          <a:fillRef idx="0">
-            <a:srgbClr val="FFFFFF"/>
-          </a:fillRef>
-          <a:effectRef idx="0">
-            <a:srgbClr val="FFFFFF"/>
-          </a:effectRef>
-          <a:fontRef idx="minor"/>
-        </p:style>
-        <p:txBody>
-          <a:bodyPr lIns="90000" tIns="45000" rIns="90000" bIns="45000"/>
-          <a:p>
-            <a:pPr>
-              <a:lnSpc>
-                <a:spcPct val="150000"/>
-              </a:lnSpc>
-            </a:pPr>
-            <a:r>
-              <a:rPr lang="en-US" altLang="en-US" sz="800" spc="-1">
-                <a:solidFill>
-                  <a:srgbClr val="1F497D"/>
-                </a:solidFill>
-                <a:uFill>
-                  <a:solidFill>
-                    <a:srgbClr val="FFFFFF"/>
-                  </a:solidFill>
-                </a:uFill>
-                <a:latin typeface="Caviar Dreams"/>
-                <a:ea typeface="DejaVu Sans" panose="020B0603030804020204"/>
-                <a:sym typeface="+mn-ea"/>
-              </a:rPr>
-              <a:t>“Penerapan HTTP/2 SSE dan Websocket pada Rumah Pintar”</a:t>
-            </a:r>
-            <a:endParaRPr lang="en-US" sz="1800" b="0" strike="noStrike" spc="-1">
-              <a:solidFill>
-                <a:srgbClr val="000000"/>
-              </a:solidFill>
-              <a:uFill>
-                <a:solidFill>
-                  <a:srgbClr val="FFFFFF"/>
-                </a:solidFill>
-              </a:uFill>
-              <a:latin typeface="Arial" panose="020B0604020202020204"/>
-            </a:endParaRPr>
-          </a:p>
-        </p:txBody>
-      </p:sp>
-      <p:sp>
-        <p:nvSpPr>
-          <p:cNvPr id="122" name="CustomShape 8"/>
-          <p:cNvSpPr/>
-          <p:nvPr/>
-        </p:nvSpPr>
-        <p:spPr>
-          <a:xfrm>
-            <a:off x="0" y="843480"/>
-            <a:ext cx="1505160" cy="510120"/>
-          </a:xfrm>
-          <a:prstGeom prst="homePlate">
-            <a:avLst>
-              <a:gd name="adj" fmla="val 50000"/>
-            </a:avLst>
-          </a:prstGeom>
-          <a:solidFill>
-            <a:srgbClr val="F9C534"/>
-          </a:solidFill>
-          <a:ln w="3240">
-            <a:solidFill>
-              <a:srgbClr val="111C76"/>
-            </a:solidFill>
-            <a:round/>
-          </a:ln>
-        </p:spPr>
-        <p:style>
-          <a:lnRef idx="2">
-            <a:schemeClr val="accent1">
-              <a:shade val="50000"/>
-            </a:schemeClr>
-          </a:lnRef>
-          <a:fillRef idx="1">
-            <a:schemeClr val="accent1"/>
-          </a:fillRef>
-          <a:effectRef idx="0">
-            <a:schemeClr val="accent1"/>
-          </a:effectRef>
-          <a:fontRef idx="minor"/>
-        </p:style>
-        <p:txBody>
-          <a:bodyPr lIns="90000" tIns="45000" rIns="90000" bIns="45000" anchor="ctr"/>
-          <a:p>
-            <a:pPr algn="ctr">
-              <a:lnSpc>
-                <a:spcPct val="100000"/>
-              </a:lnSpc>
-            </a:pPr>
-            <a:r>
-              <a:rPr lang="en-US" sz="1100" b="0" strike="noStrike" spc="-1">
-                <a:solidFill>
-                  <a:srgbClr val="111C76"/>
-                </a:solidFill>
-                <a:uFill>
-                  <a:solidFill>
-                    <a:srgbClr val="FFFFFF"/>
-                  </a:solidFill>
-                </a:uFill>
-                <a:latin typeface="Caviar Dreams"/>
-                <a:ea typeface="DejaVu Sans" panose="020B0603030804020204"/>
-              </a:rPr>
-              <a:t>Latar Belakang</a:t>
-            </a:r>
-            <a:endParaRPr lang="en-US" sz="1800" b="0" strike="noStrike" spc="-1">
-              <a:solidFill>
-                <a:srgbClr val="000000"/>
-              </a:solidFill>
-              <a:uFill>
-                <a:solidFill>
-                  <a:srgbClr val="FFFFFF"/>
-                </a:solidFill>
-              </a:uFill>
-              <a:latin typeface="Arial" panose="020B0604020202020204"/>
-            </a:endParaRPr>
-          </a:p>
-        </p:txBody>
-      </p:sp>
-      <p:sp>
-        <p:nvSpPr>
-          <p:cNvPr id="123" name="CustomShape 9"/>
-          <p:cNvSpPr/>
-          <p:nvPr/>
-        </p:nvSpPr>
-        <p:spPr>
-          <a:xfrm>
-            <a:off x="59040" y="1590120"/>
-            <a:ext cx="3720240" cy="2707920"/>
-          </a:xfrm>
-          <a:prstGeom prst="rect">
-            <a:avLst/>
-          </a:prstGeom>
-          <a:solidFill>
-            <a:schemeClr val="accent3">
-              <a:lumMod val="20000"/>
-              <a:lumOff val="80000"/>
-            </a:schemeClr>
-          </a:solidFill>
-          <a:ln>
-            <a:noFill/>
-          </a:ln>
-        </p:spPr>
-        <p:style>
-          <a:lnRef idx="0">
-            <a:srgbClr val="FFFFFF"/>
-          </a:lnRef>
-          <a:fillRef idx="0">
-            <a:srgbClr val="FFFFFF"/>
-          </a:fillRef>
-          <a:effectRef idx="0">
-            <a:srgbClr val="FFFFFF"/>
-          </a:effectRef>
-          <a:fontRef idx="minor"/>
-        </p:style>
-        <p:txBody>
-          <a:bodyPr lIns="90000" tIns="45000" rIns="90000" bIns="45000"/>
-          <a:p>
-            <a:pPr algn="just"/>
-            <a:r>
-              <a:rPr lang="en-GB" sz="1400" b="0" strike="noStrike" spc="-1">
-                <a:solidFill>
-                  <a:srgbClr val="000000"/>
-                </a:solidFill>
-                <a:uFill>
-                  <a:solidFill>
-                    <a:srgbClr val="FFFFFF"/>
-                  </a:solidFill>
-                </a:uFill>
-                <a:latin typeface="Caviar Dreams"/>
-                <a:ea typeface="Times New Roman" panose="02020603050405020304"/>
-              </a:rPr>
-              <a:t>Salah satu penerapan dari </a:t>
-            </a:r>
-            <a:r>
-              <a:rPr lang="en-GB" sz="1400" b="0" i="1" strike="noStrike" spc="-1">
-                <a:solidFill>
-                  <a:srgbClr val="000000"/>
-                </a:solidFill>
-                <a:uFill>
-                  <a:solidFill>
-                    <a:srgbClr val="FFFFFF"/>
-                  </a:solidFill>
-                </a:uFill>
-                <a:latin typeface="Caviar Dreams"/>
-                <a:ea typeface="Times New Roman" panose="02020603050405020304"/>
-              </a:rPr>
-              <a:t>Internet of Things</a:t>
-            </a:r>
-            <a:r>
-              <a:rPr lang="en-GB" sz="1400" b="0" strike="noStrike" spc="-1">
-                <a:solidFill>
-                  <a:srgbClr val="000000"/>
-                </a:solidFill>
-                <a:uFill>
-                  <a:solidFill>
-                    <a:srgbClr val="FFFFFF"/>
-                  </a:solidFill>
-                </a:uFill>
-                <a:latin typeface="Caviar Dreams"/>
-                <a:ea typeface="Times New Roman" panose="02020603050405020304"/>
-              </a:rPr>
-              <a:t> adalah rumah pintar. Bagian terpenting dari rumah pintar adalah jaringan, yang mana menghubungkan informasi yang dihasilkan dari dalam rumah dengan penghuni rumah tersebut</a:t>
-            </a:r>
-            <a:endParaRPr lang="en-GB" sz="1800" b="0" strike="noStrike" spc="-1">
-              <a:solidFill>
-                <a:srgbClr val="000000"/>
-              </a:solidFill>
-              <a:uFill>
-                <a:solidFill>
-                  <a:srgbClr val="FFFFFF"/>
-                </a:solidFill>
-              </a:uFill>
-              <a:latin typeface="Arial" panose="020B0604020202020204"/>
-            </a:endParaRPr>
-          </a:p>
-        </p:txBody>
-      </p:sp>
-      <p:pic>
-        <p:nvPicPr>
-          <p:cNvPr id="124" name="Picture 123"/>
-          <p:cNvPicPr/>
-          <p:nvPr/>
-        </p:nvPicPr>
-        <p:blipFill>
-          <a:blip r:embed="rId1"/>
-          <a:stretch>
-            <a:fillRect/>
-          </a:stretch>
-        </p:blipFill>
-        <p:spPr>
-          <a:xfrm>
-            <a:off x="4846320" y="1714680"/>
-            <a:ext cx="2857320" cy="2857320"/>
-          </a:xfrm>
-          <a:prstGeom prst="rect">
-            <a:avLst/>
-          </a:prstGeom>
-          <a:ln>
-            <a:noFill/>
-          </a:ln>
-        </p:spPr>
-      </p:pic>
-    </p:spTree>
-  </p:cSld>
-  <p:clrMapOvr>
-    <a:masterClrMapping/>
-  </p:clrMapOvr>
-  <p:transition spd="slow">
-    <p:push dir="d"/>
-  </p:transition>
-  <p:timing>
-    <p:tnLst>
-      <p:par>
-        <p:cTn id="1" dur="indefinite" restart="never" nodeType="tmRoot">
-          <p:childTnLst>
-            <p:seq concurrent="1" nextAc="seek">
-              <p:cTn id="2" dur="indefinite" nodeType="mainSeq">
-                <p:childTnLst>
-                  <p:par>
-                    <p:cTn id="3" fill="hold">
-                      <p:stCondLst>
-                        <p:cond delay="indefinite"/>
-                      </p:stCondLst>
-                      <p:childTnLst>
-                        <p:par>
-                          <p:cTn id="4" fill="hold">
-                            <p:stCondLst>
-                              <p:cond delay="0"/>
-                            </p:stCondLst>
-                            <p:childTnLst>
-                              <p:par>
-                                <p:cTn id="5" fill="hold" nodeType="clickEffect">
-                                  <p:stCondLst>
-                                    <p:cond delay="0"/>
-                                  </p:stCondLst>
-                                  <p:childTnLst>
-                                    <p:animEffect transition="in" filter="fade">
-                                      <p:cBhvr additive="repl">
-                                        <p:cTn id="6" dur="500"/>
-                                        <p:tgtEl>
-                                          <p:spTgt spid="122"/>
-                                        </p:tgtEl>
-                                      </p:cBhvr>
-                                    </p:animEffect>
-                                  </p:childTnLst>
-                                </p:cTn>
-                              </p:par>
-                            </p:childTnLst>
-                          </p:cTn>
-                        </p:par>
-                      </p:childTnLst>
-                    </p:cTn>
-                  </p:par>
-                  <p:par>
-                    <p:cTn id="7" fill="hold">
-                      <p:stCondLst>
-                        <p:cond delay="indefinite"/>
-                      </p:stCondLst>
-                      <p:childTnLst>
-                        <p:par>
-                          <p:cTn id="8" fill="hold">
-                            <p:stCondLst>
-                              <p:cond delay="0"/>
-                            </p:stCondLst>
-                            <p:childTnLst>
-                              <p:par>
-                                <p:cTn id="9" presetID="22" presetClass="entr" presetSubtype="2" fill="hold" nodeType="clickEffect">
-                                  <p:stCondLst>
-                                    <p:cond delay="0"/>
-                                  </p:stCondLst>
-                                  <p:childTnLst>
-                                    <p:set>
-                                      <p:cBhvr>
-                                        <p:cTn id="10" dur="1" fill="hold">
+                                        <p:cTn id="6" dur="1" fill="hold">
                                           <p:stCondLst>
                                             <p:cond delay="0"/>
                                           </p:stCondLst>
@@ -28065,7 +26340,7 @@
                                     </p:set>
                                     <p:animEffect transition="out" filter="wipe(right)">
                                       <p:cBhvr additive="repl">
-                                        <p:cTn id="11" dur="500"/>
+                                        <p:cTn id="7" dur="500"/>
                                         <p:tgtEl>
                                           <p:spTgt spid="123"/>
                                         </p:tgtEl>
@@ -28964,49 +27239,14 @@
                             </p:stCondLst>
                             <p:childTnLst>
                               <p:par>
-                                <p:cTn id="5" fill="hold" nodeType="clickEffect">
-                                  <p:stCondLst>
-                                    <p:cond delay="0"/>
-                                  </p:stCondLst>
-                                  <p:childTnLst>
-                                    <p:animEffect transition="in" filter="fade">
-                                      <p:cBhvr additive="repl">
-                                        <p:cTn id="6" dur="500"/>
-                                        <p:tgtEl>
-                                          <p:spTgt spid="132"/>
-                                        </p:tgtEl>
-                                      </p:cBhvr>
-                                    </p:animEffect>
-                                  </p:childTnLst>
-                                </p:cTn>
-                              </p:par>
-                            </p:childTnLst>
-                          </p:cTn>
-                        </p:par>
-                      </p:childTnLst>
-                    </p:cTn>
-                  </p:par>
-                  <p:par>
-                    <p:cTn id="7" fill="hold">
-                      <p:stCondLst>
-                        <p:cond delay="indefinite"/>
-                      </p:stCondLst>
-                      <p:childTnLst>
-                        <p:par>
-                          <p:cTn id="8" fill="hold">
-                            <p:stCondLst>
-                              <p:cond delay="0"/>
-                            </p:stCondLst>
-                            <p:childTnLst>
-                              <p:par>
-                                <p:cTn id="9" presetID="22" presetClass="entr" presetSubtype="2" fill="hold" nodeType="clickEffect">
+                                <p:cTn id="5" presetID="22" presetClass="entr" presetSubtype="2" fill="hold" nodeType="clickEffect">
                                   <p:stCondLst>
                                     <p:cond delay="0"/>
                                   </p:stCondLst>
                                   <p:childTnLst>
                                     <p:set>
                                       <p:cBhvr>
-                                        <p:cTn id="10" dur="1" fill="hold">
+                                        <p:cTn id="6" dur="1" fill="hold">
                                           <p:stCondLst>
                                             <p:cond delay="0"/>
                                           </p:stCondLst>
@@ -29024,7 +27264,7 @@
                                     </p:set>
                                     <p:animEffect transition="out" filter="wipe(right)">
                                       <p:cBhvr additive="repl">
-                                        <p:cTn id="11" dur="500"/>
+                                        <p:cTn id="7" dur="500"/>
                                         <p:tgtEl>
                                           <p:spTgt spid="133"/>
                                         </p:tgtEl>
@@ -29294,7 +27534,7 @@
               </a:lnSpc>
             </a:pPr>
             <a:r>
-              <a:rPr lang="" altLang="en-US" sz="1800" b="0" strike="noStrike" spc="-1">
+              <a:rPr lang="en-US" altLang="en-US" sz="1800" b="0" strike="noStrike" spc="-1">
                 <a:solidFill>
                   <a:srgbClr val="000000"/>
                 </a:solidFill>
@@ -29323,7 +27563,7 @@
               <a:t>HTTP/2 SSE atau Websocket </a:t>
             </a:r>
             <a:r>
-              <a:rPr lang="" altLang="en-US" sz="1800" b="0" strike="noStrike" spc="-1">
+              <a:rPr lang="en-US" altLang="en-US" sz="1800" b="0" strike="noStrike" spc="-1">
                 <a:solidFill>
                   <a:srgbClr val="000000"/>
                 </a:solidFill>
@@ -29368,7 +27608,7 @@
               <a:t>website </a:t>
             </a:r>
             <a:r>
-              <a:rPr lang="" altLang="en-US" sz="1800" b="0" strike="noStrike" spc="-1">
+              <a:rPr lang="en-US" altLang="en-US" sz="1800" b="0" strike="noStrike" spc="-1">
                 <a:solidFill>
                   <a:srgbClr val="000000"/>
                 </a:solidFill>
@@ -29382,7 +27622,7 @@
               </a:rPr>
               <a:t>dan bagaimana perbandingan antara keduanya</a:t>
             </a:r>
-            <a:endParaRPr lang="" altLang="en-US" sz="1800" b="0" i="1" strike="noStrike" spc="-1">
+            <a:endParaRPr lang="en-US" altLang="en-US" sz="1800" b="0" i="1" strike="noStrike" spc="-1">
               <a:solidFill>
                 <a:srgbClr val="000000"/>
               </a:solidFill>
@@ -29879,6 +28119,9 @@
                     <p:cTn id="3" fill="hold">
                       <p:stCondLst>
                         <p:cond delay="indefinite"/>
+                        <p:cond evt="onBegin" delay="0">
+                          <p:tn val="2"/>
+                        </p:cond>
                       </p:stCondLst>
                       <p:childTnLst>
                         <p:par>
@@ -29888,40 +28131,14 @@
                             </p:stCondLst>
                             <p:childTnLst>
                               <p:par>
-                                <p:cTn id="5" fill="hold" nodeType="clickEffect">
-                                  <p:stCondLst>
-                                    <p:cond delay="0"/>
-                                  </p:stCondLst>
-                                  <p:childTnLst>
-                                    <p:animEffect transition="in" filter="fade">
-                                      <p:cBhvr additive="repl">
-                                        <p:cTn id="6" dur="500"/>
-                                        <p:tgtEl>
-                                          <p:spTgt spid="139"/>
-                                        </p:tgtEl>
-                                      </p:cBhvr>
-                                    </p:animEffect>
-                                  </p:childTnLst>
-                                </p:cTn>
-                              </p:par>
-                            </p:childTnLst>
-                          </p:cTn>
-                        </p:par>
-                        <p:par>
-                          <p:cTn id="7" fill="hold">
-                            <p:stCondLst>
-                              <p:cond delay="500"/>
-                            </p:stCondLst>
-                            <p:childTnLst>
-                              <p:par>
-                                <p:cTn id="8" presetID="47" presetClass="entr" presetSubtype="0" fill="hold" nodeType="afterEffect">
+                                <p:cTn id="5" presetID="47" presetClass="entr" presetSubtype="0" fill="hold" nodeType="afterEffect">
                                   <p:stCondLst>
                                     <p:cond delay="0"/>
                                   </p:stCondLst>
                                   <p:childTnLst>
                                     <p:set>
                                       <p:cBhvr>
-                                        <p:cTn id="9" dur="1" fill="hold">
+                                        <p:cTn id="6" dur="1" fill="hold">
                                           <p:stCondLst>
                                             <p:cond delay="0"/>
                                           </p:stCondLst>
@@ -29939,7 +28156,7 @@
                                     </p:set>
                                     <p:animEffect transition="in" filter="fade">
                                       <p:cBhvr additive="repl">
-                                        <p:cTn id="10" dur="1000"/>
+                                        <p:cTn id="7" dur="1000"/>
                                         <p:tgtEl>
                                           <p:spTgt spid="138"/>
                                         </p:tgtEl>
@@ -29947,7 +28164,7 @@
                                     </p:animEffect>
                                     <p:anim calcmode="lin" valueType="num">
                                       <p:cBhvr additive="repl">
-                                        <p:cTn id="11" dur="1000" fill="hold"/>
+                                        <p:cTn id="8" dur="1000" fill="hold"/>
                                         <p:tgtEl>
                                           <p:spTgt spid="138"/>
                                         </p:tgtEl>
@@ -29970,7 +28187,7 @@
                                     </p:anim>
                                     <p:anim calcmode="lin" valueType="num">
                                       <p:cBhvr additive="repl">
-                                        <p:cTn id="12" dur="1000" fill="hold"/>
+                                        <p:cTn id="9" dur="1000" fill="hold"/>
                                         <p:tgtEl>
                                           <p:spTgt spid="138"/>
                                         </p:tgtEl>
@@ -30364,7 +28581,7 @@
               <a:t>Mengimplementasi HTTP/2 SSE, HTTP/1.1 SSE, dan Websocket dalam pengiriman data dari rumah pintar </a:t>
             </a:r>
             <a:r>
-              <a:rPr lang="" altLang="en-US" sz="1600" b="0" strike="noStrike" spc="-1">
+              <a:rPr lang="en-US" altLang="en-US" sz="1600" b="0" strike="noStrike" spc="-1">
                 <a:solidFill>
                   <a:srgbClr val="111C76"/>
                 </a:solidFill>
@@ -31029,6 +29246,9 @@
                     <p:cTn id="3" fill="hold">
                       <p:stCondLst>
                         <p:cond delay="indefinite"/>
+                        <p:cond evt="onBegin" delay="0">
+                          <p:tn val="2"/>
+                        </p:cond>
                       </p:stCondLst>
                       <p:childTnLst>
                         <p:par>
@@ -31038,80 +29258,14 @@
                             </p:stCondLst>
                             <p:childTnLst>
                               <p:par>
-                                <p:cTn id="5" fill="hold" nodeType="clickEffect">
-                                  <p:stCondLst>
-                                    <p:cond delay="0"/>
-                                  </p:stCondLst>
-                                  <p:childTnLst>
-                                    <p:animEffect transition="in" filter="fade">
-                                      <p:cBhvr additive="repl">
-                                        <p:cTn id="6" dur="500"/>
-                                        <p:tgtEl>
-                                          <p:spTgt spid="155"/>
-                                        </p:tgtEl>
-                                      </p:cBhvr>
-                                    </p:animEffect>
-                                  </p:childTnLst>
-                                </p:cTn>
-                              </p:par>
-                            </p:childTnLst>
-                          </p:cTn>
-                        </p:par>
-                      </p:childTnLst>
-                    </p:cTn>
-                  </p:par>
-                  <p:par>
-                    <p:cTn id="7" fill="hold">
-                      <p:stCondLst>
-                        <p:cond delay="indefinite"/>
-                      </p:stCondLst>
-                      <p:childTnLst>
-                        <p:par>
-                          <p:cTn id="8" fill="hold">
-                            <p:stCondLst>
-                              <p:cond delay="0"/>
-                            </p:stCondLst>
-                            <p:childTnLst>
-                              <p:par>
-                                <p:cTn id="9" presetID="22" presetClass="entr" presetSubtype="1" fill="hold" nodeType="clickEffect">
+                                <p:cTn id="5" presetID="22" presetClass="entr" presetSubtype="1" fill="hold" nodeType="withEffect">
                                   <p:stCondLst>
                                     <p:cond delay="0"/>
                                   </p:stCondLst>
                                   <p:childTnLst>
                                     <p:set>
                                       <p:cBhvr>
-                                        <p:cTn id="10" dur="1" fill="hold">
-                                          <p:stCondLst>
-                                            <p:cond delay="0"/>
-                                          </p:stCondLst>
-                                        </p:cTn>
-                                        <p:tgtEl/>
-                                        <p:attrNameLst>
-                                          <p:attrName>style.visibility</p:attrName>
-                                        </p:attrNameLst>
-                                      </p:cBhvr>
-                                      <p:to>
-                                        <p:strVal val="visible"/>
-                                      </p:to>
-                                    </p:set>
-                                    <p:animEffect transition="in" filter="wipe(up)">
-                                      <p:cBhvr additive="repl">
-                                        <p:cTn id="11" dur="500"/>
-                                        <p:tgtEl/>
-                                      </p:cBhvr>
-                                    </p:animEffect>
-                                  </p:childTnLst>
-                                </p:cTn>
-                              </p:par>
-                              <p:par>
-                                <p:cTn id="12" presetID="22" presetClass="entr" presetSubtype="1" fill="hold" nodeType="withEffect">
-                                  <p:stCondLst>
-                                    <p:cond delay="0"/>
-                                  </p:stCondLst>
-                                  <p:childTnLst>
-                                    <p:set>
-                                      <p:cBhvr>
-                                        <p:cTn id="13" dur="1" fill="hold">
+                                        <p:cTn id="6" dur="1" fill="hold">
                                           <p:stCondLst>
                                             <p:cond delay="0"/>
                                           </p:stCondLst>
@@ -31129,50 +29283,10 @@
                                     </p:set>
                                     <p:animEffect transition="in" filter="wipe(up)">
                                       <p:cBhvr additive="repl">
-                                        <p:cTn id="14" dur="500"/>
+                                        <p:cTn id="7" dur="500"/>
                                         <p:tgtEl>
                                           <p:spTgt spid="153"/>
                                         </p:tgtEl>
-                                      </p:cBhvr>
-                                    </p:animEffect>
-                                  </p:childTnLst>
-                                </p:cTn>
-                              </p:par>
-                            </p:childTnLst>
-                          </p:cTn>
-                        </p:par>
-                        <p:par>
-                          <p:cTn id="15" fill="hold">
-                            <p:stCondLst>
-                              <p:cond delay="500"/>
-                            </p:stCondLst>
-                            <p:childTnLst>
-                              <p:par>
-                                <p:cTn id="16" presetID="22" presetClass="entr" presetSubtype="1" fill="hold" nodeType="afterEffect">
-                                  <p:stCondLst>
-                                    <p:cond delay="0"/>
-                                  </p:stCondLst>
-                                  <p:childTnLst>
-                                    <p:set>
-                                      <p:cBhvr>
-                                        <p:cTn id="17" dur="1" fill="hold">
-                                          <p:stCondLst>
-                                            <p:cond delay="0"/>
-                                          </p:stCondLst>
-                                        </p:cTn>
-                                        <p:tgtEl/>
-                                        <p:attrNameLst>
-                                          <p:attrName>style.visibility</p:attrName>
-                                        </p:attrNameLst>
-                                      </p:cBhvr>
-                                      <p:to>
-                                        <p:strVal val="visible"/>
-                                      </p:to>
-                                    </p:set>
-                                    <p:animEffect transition="in" filter="wipe(up)">
-                                      <p:cBhvr additive="repl">
-                                        <p:cTn id="18" dur="500"/>
-                                        <p:tgtEl/>
                                       </p:cBhvr>
                                     </p:animEffect>
                                   </p:childTnLst>
@@ -31417,7 +29531,7 @@
               </a:rPr>
               <a:t>Binary Protocol dan Plain Text Protocol</a:t>
             </a:r>
-            <a:endParaRPr lang="" altLang="en-US" sz="1800" b="0" strike="noStrike" spc="-1">
+            <a:endParaRPr lang="en-US" altLang="en-US" sz="1800" b="0" strike="noStrike" spc="-1">
               <a:solidFill>
                 <a:srgbClr val="000000"/>
               </a:solidFill>
@@ -31473,7 +29587,7 @@
               <a:buChar char="•"/>
             </a:pPr>
             <a:r>
-              <a:rPr lang="" altLang="en-US" sz="1200" b="0" strike="noStrike" spc="-1">
+              <a:rPr lang="en-US" altLang="en-US" sz="1200" b="0" strike="noStrike" spc="-1">
                 <a:solidFill>
                   <a:srgbClr val="000000"/>
                 </a:solidFill>
@@ -31487,7 +29601,7 @@
               </a:rPr>
               <a:t>Binary Protocol adalah protokol yang ditujukan untuk dibaca oleh mesin dibandingkan manusia, contohnya Websocket dan HTTP/2</a:t>
             </a:r>
-            <a:endParaRPr lang="" altLang="en-US" sz="1200" b="0" strike="noStrike" spc="-1">
+            <a:endParaRPr lang="en-US" altLang="en-US" sz="1200" b="0" strike="noStrike" spc="-1">
               <a:solidFill>
                 <a:srgbClr val="000000"/>
               </a:solidFill>
@@ -31508,7 +29622,7 @@
               <a:buFont typeface="Arial" panose="020B0604020202020204" pitchFamily="34" charset="0"/>
               <a:buChar char="•"/>
             </a:pPr>
-            <a:endParaRPr lang="" altLang="en-US" sz="1200" b="0" strike="noStrike" spc="-1">
+            <a:endParaRPr lang="en-US" altLang="en-US" sz="1200" b="0" strike="noStrike" spc="-1">
               <a:solidFill>
                 <a:srgbClr val="000000"/>
               </a:solidFill>
@@ -31530,7 +29644,7 @@
               <a:buChar char="•"/>
             </a:pPr>
             <a:r>
-              <a:rPr lang="" altLang="en-US" sz="1200" spc="-1">
+              <a:rPr lang="en-US" altLang="en-US" sz="1200" spc="-1">
                 <a:solidFill>
                   <a:srgbClr val="000000"/>
                 </a:solidFill>
@@ -31543,23 +29657,7 @@
                 <a:ea typeface="DejaVu Sans" panose="020B0603030804020204"/>
                 <a:sym typeface="+mn-ea"/>
               </a:rPr>
-              <a:t>Plain Text </a:t>
-            </a:r>
-            <a:r>
-              <a:rPr lang="en-US" altLang="en-US" sz="1200" spc="-1">
-                <a:solidFill>
-                  <a:srgbClr val="000000"/>
-                </a:solidFill>
-                <a:uFill>
-                  <a:solidFill>
-                    <a:srgbClr val="FFFFFF"/>
-                  </a:solidFill>
-                </a:uFill>
-                <a:latin typeface="Caviar Dreams"/>
-                <a:ea typeface="DejaVu Sans" panose="020B0603030804020204"/>
-                <a:sym typeface="+mn-ea"/>
-              </a:rPr>
-              <a:t>Protocol adalah protokol yang ditujukan untuk dibaca oleh mesin dibandingkan manusia, contohnya SMTP dan HTTP/1.1</a:t>
+              <a:t>Plain Text Protocol adalah protokol yang ditujukan untuk dibaca oleh mesin dibandingkan manusia, contohnya SMTP dan HTTP/1.1</a:t>
             </a:r>
             <a:endParaRPr lang="en-US" altLang="en-US" sz="1200" b="0" strike="noStrike" spc="-1">
               <a:solidFill>
@@ -31582,7 +29680,7 @@
               <a:buFont typeface="Arial" panose="020B0604020202020204" pitchFamily="34" charset="0"/>
               <a:buChar char="•"/>
             </a:pPr>
-            <a:endParaRPr lang="" altLang="en-US" sz="1200" b="0" strike="noStrike" spc="-1">
+            <a:endParaRPr lang="en-US" altLang="en-US" sz="1200" b="0" strike="noStrike" spc="-1">
               <a:solidFill>
                 <a:srgbClr val="000000"/>
               </a:solidFill>
@@ -32271,7 +30369,7 @@
               </a:lnSpc>
             </a:pPr>
             <a:r>
-              <a:rPr lang="" altLang="en-US" sz="1800" b="0" strike="noStrike" spc="-1">
+              <a:rPr lang="en-US" altLang="en-US" sz="1800" b="0" strike="noStrike" spc="-1">
                 <a:solidFill>
                   <a:srgbClr val="000000"/>
                 </a:solidFill>
@@ -32284,7 +30382,7 @@
               </a:rPr>
               <a:t>HTTP/2</a:t>
             </a:r>
-            <a:endParaRPr lang="" altLang="en-US" sz="1800" b="0" strike="noStrike" spc="-1">
+            <a:endParaRPr lang="en-US" altLang="en-US" sz="1800" b="0" strike="noStrike" spc="-1">
               <a:solidFill>
                 <a:srgbClr val="000000"/>
               </a:solidFill>
@@ -32339,7 +30437,7 @@
               <a:buNone/>
             </a:pPr>
             <a:r>
-              <a:rPr lang="" altLang="en-US" sz="1200" b="0" strike="noStrike" spc="-1">
+              <a:rPr lang="en-US" altLang="en-US" sz="1200" b="0" strike="noStrike" spc="-1">
                 <a:solidFill>
                   <a:srgbClr val="000000"/>
                 </a:solidFill>
@@ -32353,7 +30451,7 @@
               </a:rPr>
               <a:t>HTTP/2 merupakan hasil pengembangan dari SPDY (generasi setelah HTTP/1.1). Kelebihan dari penggunaan HTTP/2 dibandingkan HTTP/1.1 ialah :</a:t>
             </a:r>
-            <a:endParaRPr lang="" altLang="en-US" sz="1200" b="0" strike="noStrike" spc="-1">
+            <a:endParaRPr lang="en-US" altLang="en-US" sz="1200" b="0" strike="noStrike" spc="-1">
               <a:solidFill>
                 <a:srgbClr val="000000"/>
               </a:solidFill>
@@ -32375,7 +30473,7 @@
               <a:buChar char="•"/>
             </a:pPr>
             <a:r>
-              <a:rPr lang="" altLang="en-US" sz="1200" b="0" strike="noStrike" spc="-1">
+              <a:rPr lang="en-US" altLang="en-US" sz="1200" b="0" strike="noStrike" spc="-1">
                 <a:solidFill>
                   <a:srgbClr val="000000"/>
                 </a:solidFill>
@@ -32390,7 +30488,7 @@
               <a:t>Mampu menangani </a:t>
             </a:r>
             <a:r>
-              <a:rPr lang="" altLang="en-US" sz="1200" b="0" i="1" strike="noStrike" spc="-1">
+              <a:rPr lang="en-US" altLang="en-US" sz="1200" b="0" i="1" strike="noStrike" spc="-1">
                 <a:solidFill>
                   <a:srgbClr val="000000"/>
                 </a:solidFill>
@@ -32405,7 +30503,7 @@
               <a:t>Head of Line Blocking</a:t>
             </a:r>
             <a:r>
-              <a:rPr lang="" altLang="en-US" sz="1200" b="0" strike="noStrike" spc="-1">
+              <a:rPr lang="en-US" altLang="en-US" sz="1200" b="0" strike="noStrike" spc="-1">
                 <a:solidFill>
                   <a:srgbClr val="000000"/>
                 </a:solidFill>
@@ -32420,7 +30518,7 @@
               <a:t> sehingga memungkinkan multiplexing (beberapa </a:t>
             </a:r>
             <a:r>
-              <a:rPr lang="" altLang="en-US" sz="1200" b="0" i="1" strike="noStrike" spc="-1">
+              <a:rPr lang="en-US" altLang="en-US" sz="1200" b="0" i="1" strike="noStrike" spc="-1">
                 <a:solidFill>
                   <a:srgbClr val="000000"/>
                 </a:solidFill>
@@ -32435,7 +30533,7 @@
               <a:t>request </a:t>
             </a:r>
             <a:r>
-              <a:rPr lang="" altLang="en-US" sz="1200" b="0" strike="noStrike" spc="-1">
+              <a:rPr lang="en-US" altLang="en-US" sz="1200" b="0" strike="noStrike" spc="-1">
                 <a:solidFill>
                   <a:srgbClr val="000000"/>
                 </a:solidFill>
@@ -32450,7 +30548,7 @@
               <a:t>dan </a:t>
             </a:r>
             <a:r>
-              <a:rPr lang="" altLang="en-US" sz="1200" b="0" i="1" strike="noStrike" spc="-1">
+              <a:rPr lang="en-US" altLang="en-US" sz="1200" b="0" i="1" strike="noStrike" spc="-1">
                 <a:solidFill>
                   <a:srgbClr val="000000"/>
                 </a:solidFill>
@@ -32465,7 +30563,7 @@
               <a:t>response</a:t>
             </a:r>
             <a:r>
-              <a:rPr lang="" altLang="en-US" sz="1200" b="0" strike="noStrike" spc="-1">
+              <a:rPr lang="en-US" altLang="en-US" sz="1200" b="0" strike="noStrike" spc="-1">
                 <a:solidFill>
                   <a:srgbClr val="000000"/>
                 </a:solidFill>
@@ -32479,7 +30577,7 @@
               </a:rPr>
               <a:t> dalam satu waktu)</a:t>
             </a:r>
-            <a:endParaRPr lang="" altLang="en-US" sz="1200" b="0" strike="noStrike" spc="-1">
+            <a:endParaRPr lang="en-US" altLang="en-US" sz="1200" b="0" strike="noStrike" spc="-1">
               <a:solidFill>
                 <a:srgbClr val="000000"/>
               </a:solidFill>
@@ -32501,7 +30599,7 @@
               <a:buChar char="•"/>
             </a:pPr>
             <a:r>
-              <a:rPr lang="" altLang="en-US" sz="1200" b="0" strike="noStrike" spc="-1">
+              <a:rPr lang="en-US" altLang="en-US" sz="1200" b="0" strike="noStrike" spc="-1">
                 <a:solidFill>
                   <a:srgbClr val="000000"/>
                 </a:solidFill>
@@ -32515,7 +30613,7 @@
               </a:rPr>
               <a:t>Tidak membutuhkan koneksi tambahan untuk memungkinkan komunikasi paralel (dalam satu jalur TCP)</a:t>
             </a:r>
-            <a:endParaRPr lang="" altLang="en-US" sz="1200" b="0" strike="noStrike" spc="-1">
+            <a:endParaRPr lang="en-US" altLang="en-US" sz="1200" b="0" strike="noStrike" spc="-1">
               <a:solidFill>
                 <a:srgbClr val="000000"/>
               </a:solidFill>
@@ -32537,7 +30635,7 @@
               <a:buChar char="•"/>
             </a:pPr>
             <a:r>
-              <a:rPr lang="" altLang="en-US" sz="1200" b="0" strike="noStrike" spc="-1">
+              <a:rPr lang="en-US" altLang="en-US" sz="1200" b="0" strike="noStrike" spc="-1">
                 <a:solidFill>
                   <a:srgbClr val="000000"/>
                 </a:solidFill>
@@ -32552,7 +30650,7 @@
               <a:t>Mampu melakukan </a:t>
             </a:r>
             <a:r>
-              <a:rPr lang="" altLang="en-US" sz="1200" b="0" i="1" strike="noStrike" spc="-1">
+              <a:rPr lang="en-US" altLang="en-US" sz="1200" b="0" i="1" strike="noStrike" spc="-1">
                 <a:solidFill>
                   <a:srgbClr val="000000"/>
                 </a:solidFill>
@@ -32567,7 +30665,7 @@
               <a:t>header compression</a:t>
             </a:r>
             <a:r>
-              <a:rPr lang="" altLang="en-US" sz="1200" b="0" strike="noStrike" spc="-1">
+              <a:rPr lang="en-US" altLang="en-US" sz="1200" b="0" strike="noStrike" spc="-1">
                 <a:solidFill>
                   <a:srgbClr val="000000"/>
                 </a:solidFill>
@@ -32581,7 +30679,7 @@
               </a:rPr>
               <a:t> dengan HPACK</a:t>
             </a:r>
-            <a:endParaRPr lang="" altLang="en-US" sz="1200" b="0" strike="noStrike" spc="-1">
+            <a:endParaRPr lang="en-US" altLang="en-US" sz="1200" b="0" strike="noStrike" spc="-1">
               <a:solidFill>
                 <a:srgbClr val="000000"/>
               </a:solidFill>

</xml_diff>

<commit_message>
jurnal, proposal, laporan akhir fix
</commit_message>
<xml_diff>
--- a/berkas/ppt muham.pptx
+++ b/berkas/ppt muham.pptx
@@ -36,9 +36,8 @@
     <p:sldId id="271" r:id="rId29"/>
     <p:sldId id="299" r:id="rId30"/>
     <p:sldId id="300" r:id="rId31"/>
-    <p:sldId id="333" r:id="rId32"/>
-    <p:sldId id="331" r:id="rId33"/>
-    <p:sldId id="272" r:id="rId34"/>
+    <p:sldId id="331" r:id="rId32"/>
+    <p:sldId id="272" r:id="rId33"/>
   </p:sldIdLst>
   <p:sldSz cx="9144000" cy="5143500"/>
   <p:notesSz cx="9313545" cy="6858000"/>
@@ -5450,44 +5449,6 @@
               </a:uFill>
               <a:latin typeface="Arial" panose="020B0604020202020204"/>
             </a:endParaRPr>
-          </a:p>
-        </p:txBody>
-      </p:sp>
-    </p:spTree>
-  </p:cSld>
-  <p:clrMapOvr>
-    <a:masterClrMapping/>
-  </p:clrMapOvr>
-</p:notes>
-</file>
-
-<file path=ppt/notesSlides/notesSlide20.xml><?xml version="1.0" encoding="utf-8"?>
-<p:notes xmlns:a="http://schemas.openxmlformats.org/drawingml/2006/main" xmlns:r="http://schemas.openxmlformats.org/officeDocument/2006/relationships" xmlns:p="http://schemas.openxmlformats.org/presentationml/2006/main">
-  <p:cSld>
-    <p:spTree>
-      <p:nvGrpSpPr>
-        <p:cNvPr id="1" name=""/>
-        <p:cNvGrpSpPr/>
-        <p:nvPr/>
-      </p:nvGrpSpPr>
-      <p:grpSpPr/>
-      <p:sp>
-        <p:nvSpPr>
-          <p:cNvPr id="2" name="Text Placeholder 1"/>
-          <p:cNvSpPr/>
-          <p:nvPr>
-            <p:ph type="body"/>
-          </p:nvPr>
-        </p:nvSpPr>
-        <p:spPr/>
-        <p:txBody>
-          <a:bodyPr/>
-          <a:p>
-            <a:r>
-              <a:rPr lang="" altLang="en-US"/>
-              <a:t>Limitasi koneksi dapat diatur pada web browser</a:t>
-            </a:r>
-            <a:endParaRPr lang="" altLang="en-US"/>
           </a:p>
         </p:txBody>
       </p:sp>
@@ -35361,1841 +35322,6 @@
         <p:cNvGrpSpPr/>
         <p:nvPr/>
       </p:nvGrpSpPr>
-      <p:grpSpPr>
-        <a:xfrm>
-          <a:off x="0" y="0"/>
-          <a:ext cx="0" cy="0"/>
-          <a:chOff x="0" y="0"/>
-          <a:chExt cx="0" cy="0"/>
-        </a:xfrm>
-      </p:grpSpPr>
-      <p:sp>
-        <p:nvSpPr>
-          <p:cNvPr id="267" name="CustomShape 1"/>
-          <p:cNvSpPr/>
-          <p:nvPr/>
-        </p:nvSpPr>
-        <p:spPr>
-          <a:xfrm>
-            <a:off x="4981575" y="227330"/>
-            <a:ext cx="3264535" cy="699135"/>
-          </a:xfrm>
-          <a:prstGeom prst="rect">
-            <a:avLst/>
-          </a:prstGeom>
-          <a:noFill/>
-          <a:ln>
-            <a:noFill/>
-          </a:ln>
-        </p:spPr>
-        <p:style>
-          <a:lnRef idx="0">
-            <a:srgbClr val="FFFFFF"/>
-          </a:lnRef>
-          <a:fillRef idx="0">
-            <a:srgbClr val="FFFFFF"/>
-          </a:fillRef>
-          <a:effectRef idx="0">
-            <a:srgbClr val="FFFFFF"/>
-          </a:effectRef>
-          <a:fontRef idx="minor"/>
-        </p:style>
-        <p:txBody>
-          <a:bodyPr lIns="90000" tIns="45000" rIns="90000" bIns="45000"/>
-          <a:p>
-            <a:pPr algn="ctr">
-              <a:lnSpc>
-                <a:spcPct val="100000"/>
-              </a:lnSpc>
-            </a:pPr>
-            <a:r>
-              <a:rPr lang="en-US" sz="2000" b="1" strike="noStrike" spc="-1">
-                <a:solidFill>
-                  <a:srgbClr val="1F497D"/>
-                </a:solidFill>
-                <a:uFill>
-                  <a:solidFill>
-                    <a:srgbClr val="FFFFFF"/>
-                  </a:solidFill>
-                </a:uFill>
-                <a:latin typeface="Capsuula"/>
-                <a:ea typeface="DejaVu Sans" panose="020B0603030804020204"/>
-              </a:rPr>
-              <a:t>Universitas Gadjah Mada</a:t>
-            </a:r>
-            <a:endParaRPr lang="en-US" sz="1800" b="0" strike="noStrike" spc="-1">
-              <a:solidFill>
-                <a:srgbClr val="000000"/>
-              </a:solidFill>
-              <a:uFill>
-                <a:solidFill>
-                  <a:srgbClr val="FFFFFF"/>
-                </a:solidFill>
-              </a:uFill>
-              <a:latin typeface="Arial" panose="020B0604020202020204"/>
-            </a:endParaRPr>
-          </a:p>
-        </p:txBody>
-      </p:sp>
-      <p:sp>
-        <p:nvSpPr>
-          <p:cNvPr id="268" name="CustomShape 2"/>
-          <p:cNvSpPr/>
-          <p:nvPr/>
-        </p:nvSpPr>
-        <p:spPr>
-          <a:xfrm>
-            <a:off x="20880" y="177840"/>
-            <a:ext cx="3398040" cy="394200"/>
-          </a:xfrm>
-          <a:prstGeom prst="rect">
-            <a:avLst/>
-          </a:prstGeom>
-          <a:noFill/>
-          <a:ln>
-            <a:noFill/>
-          </a:ln>
-        </p:spPr>
-        <p:style>
-          <a:lnRef idx="0">
-            <a:srgbClr val="FFFFFF"/>
-          </a:lnRef>
-          <a:fillRef idx="0">
-            <a:srgbClr val="FFFFFF"/>
-          </a:fillRef>
-          <a:effectRef idx="0">
-            <a:srgbClr val="FFFFFF"/>
-          </a:effectRef>
-          <a:fontRef idx="minor"/>
-        </p:style>
-        <p:txBody>
-          <a:bodyPr lIns="90000" tIns="45000" rIns="90000" bIns="45000"/>
-          <a:p>
-            <a:pPr>
-              <a:lnSpc>
-                <a:spcPct val="150000"/>
-              </a:lnSpc>
-            </a:pPr>
-            <a:r>
-              <a:rPr lang="en-US" altLang="en-US" sz="800" spc="-1">
-                <a:solidFill>
-                  <a:srgbClr val="1F497D"/>
-                </a:solidFill>
-                <a:uFill>
-                  <a:solidFill>
-                    <a:srgbClr val="FFFFFF"/>
-                  </a:solidFill>
-                </a:uFill>
-                <a:latin typeface="Caviar Dreams"/>
-                <a:ea typeface="DejaVu Sans" panose="020B0603030804020204"/>
-                <a:sym typeface="+mn-ea"/>
-              </a:rPr>
-              <a:t>“Penerapan HTTP/2 SSE dan Websocket pada Rumah Pintar”</a:t>
-            </a:r>
-            <a:endParaRPr lang="en-US" sz="1800" b="0" strike="noStrike" spc="-1">
-              <a:solidFill>
-                <a:srgbClr val="000000"/>
-              </a:solidFill>
-              <a:uFill>
-                <a:solidFill>
-                  <a:srgbClr val="FFFFFF"/>
-                </a:solidFill>
-              </a:uFill>
-              <a:latin typeface="Arial" panose="020B0604020202020204"/>
-            </a:endParaRPr>
-          </a:p>
-        </p:txBody>
-      </p:sp>
-      <p:sp>
-        <p:nvSpPr>
-          <p:cNvPr id="269" name="CustomShape 3"/>
-          <p:cNvSpPr/>
-          <p:nvPr/>
-        </p:nvSpPr>
-        <p:spPr>
-          <a:xfrm>
-            <a:off x="828720" y="1531440"/>
-            <a:ext cx="1653120" cy="333360"/>
-          </a:xfrm>
-          <a:prstGeom prst="rect">
-            <a:avLst/>
-          </a:prstGeom>
-          <a:noFill/>
-          <a:ln>
-            <a:noFill/>
-          </a:ln>
-        </p:spPr>
-        <p:style>
-          <a:lnRef idx="0">
-            <a:srgbClr val="FFFFFF"/>
-          </a:lnRef>
-          <a:fillRef idx="0">
-            <a:srgbClr val="FFFFFF"/>
-          </a:fillRef>
-          <a:effectRef idx="0">
-            <a:srgbClr val="FFFFFF"/>
-          </a:effectRef>
-          <a:fontRef idx="minor"/>
-        </p:style>
-        <p:txBody>
-          <a:bodyPr wrap="none" lIns="90000" tIns="45000" rIns="90000" bIns="45000"/>
-          <a:p>
-            <a:pPr>
-              <a:lnSpc>
-                <a:spcPct val="100000"/>
-              </a:lnSpc>
-            </a:pPr>
-            <a:r>
-              <a:rPr lang="en-US" sz="1600" b="1" i="1" strike="noStrike" spc="-1">
-                <a:solidFill>
-                  <a:srgbClr val="111C76"/>
-                </a:solidFill>
-                <a:uFill>
-                  <a:solidFill>
-                    <a:srgbClr val="FFFFFF"/>
-                  </a:solidFill>
-                </a:uFill>
-                <a:latin typeface="Caviar Dreams"/>
-                <a:ea typeface="Open Sans Extrabold"/>
-              </a:rPr>
-              <a:t>Analisa Hasil</a:t>
-            </a:r>
-            <a:endParaRPr lang="en-US" sz="1800" b="0" strike="noStrike" spc="-1">
-              <a:solidFill>
-                <a:srgbClr val="000000"/>
-              </a:solidFill>
-              <a:uFill>
-                <a:solidFill>
-                  <a:srgbClr val="FFFFFF"/>
-                </a:solidFill>
-              </a:uFill>
-              <a:latin typeface="Arial" panose="020B0604020202020204"/>
-            </a:endParaRPr>
-          </a:p>
-        </p:txBody>
-      </p:sp>
-      <p:pic>
-        <p:nvPicPr>
-          <p:cNvPr id="277" name="Picture 276"/>
-          <p:cNvPicPr/>
-          <p:nvPr/>
-        </p:nvPicPr>
-        <p:blipFill>
-          <a:blip r:embed="rId1"/>
-          <a:stretch>
-            <a:fillRect/>
-          </a:stretch>
-        </p:blipFill>
-        <p:spPr>
-          <a:xfrm>
-            <a:off x="101520" y="1422360"/>
-            <a:ext cx="3606480" cy="659880"/>
-          </a:xfrm>
-          <a:prstGeom prst="rect">
-            <a:avLst/>
-          </a:prstGeom>
-          <a:ln>
-            <a:noFill/>
-          </a:ln>
-        </p:spPr>
-      </p:pic>
-      <p:graphicFrame>
-        <p:nvGraphicFramePr>
-          <p:cNvPr id="5" name="Table 4"/>
-          <p:cNvGraphicFramePr/>
-          <p:nvPr/>
-        </p:nvGraphicFramePr>
-        <p:xfrm>
-          <a:off x="1818005" y="2893695"/>
-          <a:ext cx="5576570" cy="857250"/>
-        </p:xfrm>
-        <a:graphic>
-          <a:graphicData uri="http://schemas.openxmlformats.org/drawingml/2006/table">
-            <a:tbl>
-              <a:tblPr firstRow="1" bandRow="1">
-                <a:tableStyleId>{5C22544A-7EE6-4342-B048-85BDC9FD1C3A}</a:tableStyleId>
-              </a:tblPr>
-              <a:tblGrid>
-                <a:gridCol w="934720"/>
-                <a:gridCol w="1054735"/>
-                <a:gridCol w="1031240"/>
-                <a:gridCol w="1365885"/>
-                <a:gridCol w="1189990"/>
-              </a:tblGrid>
-              <a:tr h="433070">
-                <a:tc>
-                  <a:txBody>
-                    <a:bodyPr/>
-                    <a:p>
-                      <a:pPr marL="0" indent="0" algn="ctr">
-                        <a:buNone/>
-                      </a:pPr>
-                      <a:r>
-                        <a:rPr lang="en-US" sz="1200" b="0">
-                          <a:solidFill>
-                            <a:srgbClr val="000000"/>
-                          </a:solidFill>
-                          <a:latin typeface="Calibri" charset="-122"/>
-                        </a:rPr>
-                        <a:t> </a:t>
-                      </a:r>
-                      <a:endParaRPr lang="en-US" sz="1200" b="0">
-                        <a:solidFill>
-                          <a:srgbClr val="000000"/>
-                        </a:solidFill>
-                        <a:latin typeface="Calibri" charset="-122"/>
-                      </a:endParaRPr>
-                    </a:p>
-                  </a:txBody>
-                  <a:tcPr marL="12700" marR="12700" marT="12700" vert="horz" anchor="ctr" anchorCtr="0">
-                    <a:lnL w="6350" cap="flat" cmpd="sng">
-                      <a:solidFill>
-                        <a:srgbClr val="000000"/>
-                      </a:solidFill>
-                      <a:prstDash val="solid"/>
-                      <a:headEnd type="none" w="med" len="med"/>
-                      <a:tailEnd type="none" w="med" len="med"/>
-                    </a:lnL>
-                    <a:lnR w="6350" cap="flat" cmpd="sng">
-                      <a:solidFill>
-                        <a:srgbClr val="000000"/>
-                      </a:solidFill>
-                      <a:prstDash val="solid"/>
-                      <a:headEnd type="none" w="med" len="med"/>
-                      <a:tailEnd type="none" w="med" len="med"/>
-                    </a:lnR>
-                    <a:lnT w="6350" cap="flat" cmpd="sng">
-                      <a:solidFill>
-                        <a:srgbClr val="000000"/>
-                      </a:solidFill>
-                      <a:prstDash val="solid"/>
-                      <a:headEnd type="none" w="med" len="med"/>
-                      <a:tailEnd type="none" w="med" len="med"/>
-                    </a:lnT>
-                    <a:lnB w="6350" cap="flat" cmpd="sng">
-                      <a:solidFill>
-                        <a:srgbClr val="000000"/>
-                      </a:solidFill>
-                      <a:prstDash val="solid"/>
-                      <a:headEnd type="none" w="med" len="med"/>
-                      <a:tailEnd type="none" w="med" len="med"/>
-                    </a:lnB>
-                    <a:lnTlToBr>
-                      <a:noFill/>
-                    </a:lnTlToBr>
-                    <a:lnBlToTr>
-                      <a:noFill/>
-                    </a:lnBlToTr>
-                    <a:noFill/>
-                  </a:tcPr>
-                </a:tc>
-                <a:tc>
-                  <a:txBody>
-                    <a:bodyPr/>
-                    <a:p>
-                      <a:pPr marL="0" indent="0" algn="ctr">
-                        <a:buNone/>
-                      </a:pPr>
-                      <a:r>
-                        <a:rPr lang="en-US" sz="1200" b="0">
-                          <a:solidFill>
-                            <a:srgbClr val="000000"/>
-                          </a:solidFill>
-                          <a:latin typeface="Calibri" charset="-122"/>
-                        </a:rPr>
-                        <a:t>SSE HTTP/1.1</a:t>
-                      </a:r>
-                      <a:endParaRPr lang="en-US" altLang="en-US" sz="1200" b="0">
-                        <a:solidFill>
-                          <a:srgbClr val="000000"/>
-                        </a:solidFill>
-                        <a:latin typeface="Calibri" charset="-122"/>
-                      </a:endParaRPr>
-                    </a:p>
-                  </a:txBody>
-                  <a:tcPr marL="12700" marR="12700" marT="12700" vert="horz" anchor="ctr" anchorCtr="0">
-                    <a:lnL w="6350" cap="flat" cmpd="sng">
-                      <a:solidFill>
-                        <a:srgbClr val="000000"/>
-                      </a:solidFill>
-                      <a:prstDash val="solid"/>
-                      <a:headEnd type="none" w="med" len="med"/>
-                      <a:tailEnd type="none" w="med" len="med"/>
-                    </a:lnL>
-                    <a:lnR w="6350" cap="flat" cmpd="sng">
-                      <a:solidFill>
-                        <a:srgbClr val="000000"/>
-                      </a:solidFill>
-                      <a:prstDash val="solid"/>
-                      <a:headEnd type="none" w="med" len="med"/>
-                      <a:tailEnd type="none" w="med" len="med"/>
-                    </a:lnR>
-                    <a:lnT w="6350" cap="flat" cmpd="sng">
-                      <a:solidFill>
-                        <a:srgbClr val="000000"/>
-                      </a:solidFill>
-                      <a:prstDash val="solid"/>
-                      <a:headEnd type="none" w="med" len="med"/>
-                      <a:tailEnd type="none" w="med" len="med"/>
-                    </a:lnT>
-                    <a:lnB w="6350" cap="flat" cmpd="sng">
-                      <a:solidFill>
-                        <a:srgbClr val="000000"/>
-                      </a:solidFill>
-                      <a:prstDash val="solid"/>
-                      <a:headEnd type="none" w="med" len="med"/>
-                      <a:tailEnd type="none" w="med" len="med"/>
-                    </a:lnB>
-                    <a:lnTlToBr>
-                      <a:noFill/>
-                    </a:lnTlToBr>
-                    <a:lnBlToTr>
-                      <a:noFill/>
-                    </a:lnBlToTr>
-                    <a:noFill/>
-                  </a:tcPr>
-                </a:tc>
-                <a:tc>
-                  <a:txBody>
-                    <a:bodyPr/>
-                    <a:p>
-                      <a:pPr marL="0" indent="0" algn="ctr">
-                        <a:buNone/>
-                      </a:pPr>
-                      <a:r>
-                        <a:rPr lang="en-US" sz="1200" b="0">
-                          <a:solidFill>
-                            <a:srgbClr val="000000"/>
-                          </a:solidFill>
-                          <a:latin typeface="Calibri" charset="-122"/>
-                        </a:rPr>
-                        <a:t>SSE HTTPS</a:t>
-                      </a:r>
-                      <a:endParaRPr lang="en-US" sz="1200" b="0">
-                        <a:solidFill>
-                          <a:srgbClr val="000000"/>
-                        </a:solidFill>
-                        <a:latin typeface="Calibri" charset="-122"/>
-                      </a:endParaRPr>
-                    </a:p>
-                  </a:txBody>
-                  <a:tcPr marL="12700" marR="12700" marT="12700" vert="horz" anchor="ctr" anchorCtr="0">
-                    <a:lnL w="6350" cap="flat" cmpd="sng">
-                      <a:solidFill>
-                        <a:srgbClr val="000000"/>
-                      </a:solidFill>
-                      <a:prstDash val="solid"/>
-                      <a:headEnd type="none" w="med" len="med"/>
-                      <a:tailEnd type="none" w="med" len="med"/>
-                    </a:lnL>
-                    <a:lnR w="6350" cap="flat" cmpd="sng">
-                      <a:solidFill>
-                        <a:srgbClr val="000000"/>
-                      </a:solidFill>
-                      <a:prstDash val="solid"/>
-                      <a:headEnd type="none" w="med" len="med"/>
-                      <a:tailEnd type="none" w="med" len="med"/>
-                    </a:lnR>
-                    <a:lnT w="6350" cap="flat" cmpd="sng">
-                      <a:solidFill>
-                        <a:srgbClr val="000000"/>
-                      </a:solidFill>
-                      <a:prstDash val="solid"/>
-                      <a:headEnd type="none" w="med" len="med"/>
-                      <a:tailEnd type="none" w="med" len="med"/>
-                    </a:lnT>
-                    <a:lnB w="6350" cap="flat" cmpd="sng">
-                      <a:solidFill>
-                        <a:srgbClr val="000000"/>
-                      </a:solidFill>
-                      <a:prstDash val="solid"/>
-                      <a:headEnd type="none" w="med" len="med"/>
-                      <a:tailEnd type="none" w="med" len="med"/>
-                    </a:lnB>
-                    <a:lnTlToBr>
-                      <a:noFill/>
-                    </a:lnTlToBr>
-                    <a:lnBlToTr>
-                      <a:noFill/>
-                    </a:lnBlToTr>
-                    <a:noFill/>
-                  </a:tcPr>
-                </a:tc>
-                <a:tc>
-                  <a:txBody>
-                    <a:bodyPr/>
-                    <a:p>
-                      <a:pPr marL="0" indent="0" algn="ctr">
-                        <a:buNone/>
-                      </a:pPr>
-                      <a:r>
-                        <a:rPr lang="en-US" sz="1200" b="0">
-                          <a:solidFill>
-                            <a:srgbClr val="000000"/>
-                          </a:solidFill>
-                          <a:latin typeface="Calibri" charset="-122"/>
-                        </a:rPr>
-                        <a:t>SSE HTTP/2</a:t>
-                      </a:r>
-                      <a:endParaRPr lang="en-US" sz="1200" b="0">
-                        <a:solidFill>
-                          <a:srgbClr val="000000"/>
-                        </a:solidFill>
-                        <a:latin typeface="Calibri" charset="-122"/>
-                      </a:endParaRPr>
-                    </a:p>
-                  </a:txBody>
-                  <a:tcPr marL="12700" marR="12700" marT="12700" vert="horz" anchor="ctr" anchorCtr="0">
-                    <a:lnL w="6350" cap="flat" cmpd="sng">
-                      <a:solidFill>
-                        <a:srgbClr val="000000"/>
-                      </a:solidFill>
-                      <a:prstDash val="solid"/>
-                      <a:headEnd type="none" w="med" len="med"/>
-                      <a:tailEnd type="none" w="med" len="med"/>
-                    </a:lnL>
-                    <a:lnR w="6350" cap="flat" cmpd="sng">
-                      <a:solidFill>
-                        <a:srgbClr val="000000"/>
-                      </a:solidFill>
-                      <a:prstDash val="solid"/>
-                      <a:headEnd type="none" w="med" len="med"/>
-                      <a:tailEnd type="none" w="med" len="med"/>
-                    </a:lnR>
-                    <a:lnT w="6350" cap="flat" cmpd="sng">
-                      <a:solidFill>
-                        <a:srgbClr val="000000"/>
-                      </a:solidFill>
-                      <a:prstDash val="solid"/>
-                      <a:headEnd type="none" w="med" len="med"/>
-                      <a:tailEnd type="none" w="med" len="med"/>
-                    </a:lnT>
-                    <a:lnB w="6350" cap="flat" cmpd="sng">
-                      <a:solidFill>
-                        <a:srgbClr val="000000"/>
-                      </a:solidFill>
-                      <a:prstDash val="solid"/>
-                      <a:headEnd type="none" w="med" len="med"/>
-                      <a:tailEnd type="none" w="med" len="med"/>
-                    </a:lnB>
-                    <a:lnTlToBr>
-                      <a:noFill/>
-                    </a:lnTlToBr>
-                    <a:lnBlToTr>
-                      <a:noFill/>
-                    </a:lnBlToTr>
-                    <a:noFill/>
-                  </a:tcPr>
-                </a:tc>
-                <a:tc>
-                  <a:txBody>
-                    <a:bodyPr/>
-                    <a:p>
-                      <a:pPr marL="0" indent="0" algn="ctr">
-                        <a:buNone/>
-                      </a:pPr>
-                      <a:r>
-                        <a:rPr lang="en-US" sz="1200" b="0">
-                          <a:solidFill>
-                            <a:srgbClr val="000000"/>
-                          </a:solidFill>
-                          <a:latin typeface="Calibri" charset="-122"/>
-                        </a:rPr>
-                        <a:t>Websocket</a:t>
-                      </a:r>
-                      <a:endParaRPr lang="en-US" sz="1200" b="0">
-                        <a:solidFill>
-                          <a:srgbClr val="000000"/>
-                        </a:solidFill>
-                        <a:latin typeface="Calibri" charset="-122"/>
-                      </a:endParaRPr>
-                    </a:p>
-                  </a:txBody>
-                  <a:tcPr marL="12700" marR="12700" marT="12700" vert="horz" anchor="ctr" anchorCtr="0">
-                    <a:lnL w="6350" cap="flat" cmpd="sng">
-                      <a:solidFill>
-                        <a:srgbClr val="000000"/>
-                      </a:solidFill>
-                      <a:prstDash val="solid"/>
-                      <a:headEnd type="none" w="med" len="med"/>
-                      <a:tailEnd type="none" w="med" len="med"/>
-                    </a:lnL>
-                    <a:lnR w="6350" cap="flat" cmpd="sng">
-                      <a:solidFill>
-                        <a:srgbClr val="000000"/>
-                      </a:solidFill>
-                      <a:prstDash val="solid"/>
-                      <a:headEnd type="none" w="med" len="med"/>
-                      <a:tailEnd type="none" w="med" len="med"/>
-                    </a:lnR>
-                    <a:lnT w="6350" cap="flat" cmpd="sng">
-                      <a:solidFill>
-                        <a:srgbClr val="000000"/>
-                      </a:solidFill>
-                      <a:prstDash val="solid"/>
-                      <a:headEnd type="none" w="med" len="med"/>
-                      <a:tailEnd type="none" w="med" len="med"/>
-                    </a:lnT>
-                    <a:lnB w="6350" cap="flat" cmpd="sng">
-                      <a:solidFill>
-                        <a:srgbClr val="000000"/>
-                      </a:solidFill>
-                      <a:prstDash val="solid"/>
-                      <a:headEnd type="none" w="med" len="med"/>
-                      <a:tailEnd type="none" w="med" len="med"/>
-                    </a:lnB>
-                    <a:lnTlToBr>
-                      <a:noFill/>
-                    </a:lnTlToBr>
-                    <a:lnBlToTr>
-                      <a:noFill/>
-                    </a:lnBlToTr>
-                    <a:noFill/>
-                  </a:tcPr>
-                </a:tc>
-              </a:tr>
-              <a:tr h="241300">
-                <a:tc>
-                  <a:txBody>
-                    <a:bodyPr/>
-                    <a:p>
-                      <a:pPr marL="0" indent="0" algn="ctr">
-                        <a:buNone/>
-                      </a:pPr>
-                      <a:r>
-                        <a:rPr lang="" altLang="en-US" sz="1200" b="0">
-                          <a:solidFill>
-                            <a:srgbClr val="000000"/>
-                          </a:solidFill>
-                          <a:latin typeface="Calibri" charset="-122"/>
-                        </a:rPr>
-                        <a:t>Maksimal Koneksi</a:t>
-                      </a:r>
-                      <a:endParaRPr lang="" altLang="en-US" sz="1200" b="0">
-                        <a:solidFill>
-                          <a:srgbClr val="000000"/>
-                        </a:solidFill>
-                        <a:latin typeface="Calibri" charset="-122"/>
-                      </a:endParaRPr>
-                    </a:p>
-                  </a:txBody>
-                  <a:tcPr marL="12700" marR="12700" marT="12700" vert="horz" anchor="ctr" anchorCtr="0">
-                    <a:lnL w="6350" cap="flat" cmpd="sng">
-                      <a:solidFill>
-                        <a:srgbClr val="000000"/>
-                      </a:solidFill>
-                      <a:prstDash val="solid"/>
-                      <a:headEnd type="none" w="med" len="med"/>
-                      <a:tailEnd type="none" w="med" len="med"/>
-                    </a:lnL>
-                    <a:lnR w="6350" cap="flat" cmpd="sng">
-                      <a:solidFill>
-                        <a:srgbClr val="000000"/>
-                      </a:solidFill>
-                      <a:prstDash val="solid"/>
-                      <a:headEnd type="none" w="med" len="med"/>
-                      <a:tailEnd type="none" w="med" len="med"/>
-                    </a:lnR>
-                    <a:lnT w="6350" cap="flat" cmpd="sng">
-                      <a:solidFill>
-                        <a:srgbClr val="000000"/>
-                      </a:solidFill>
-                      <a:prstDash val="solid"/>
-                      <a:headEnd type="none" w="med" len="med"/>
-                      <a:tailEnd type="none" w="med" len="med"/>
-                    </a:lnT>
-                    <a:lnB w="6350" cap="flat" cmpd="sng">
-                      <a:solidFill>
-                        <a:srgbClr val="000000"/>
-                      </a:solidFill>
-                      <a:prstDash val="solid"/>
-                      <a:headEnd type="none" w="med" len="med"/>
-                      <a:tailEnd type="none" w="med" len="med"/>
-                    </a:lnB>
-                    <a:lnTlToBr>
-                      <a:noFill/>
-                    </a:lnTlToBr>
-                    <a:lnBlToTr>
-                      <a:noFill/>
-                    </a:lnBlToTr>
-                    <a:noFill/>
-                  </a:tcPr>
-                </a:tc>
-                <a:tc>
-                  <a:txBody>
-                    <a:bodyPr/>
-                    <a:p>
-                      <a:pPr marL="0" indent="0" algn="ctr">
-                        <a:buNone/>
-                      </a:pPr>
-                      <a:r>
-                        <a:rPr lang="" altLang="en-US" sz="1200" b="0">
-                          <a:solidFill>
-                            <a:srgbClr val="000000"/>
-                          </a:solidFill>
-                          <a:latin typeface="Calibri" charset="-122"/>
-                        </a:rPr>
-                        <a:t>6 connection</a:t>
-                      </a:r>
-                      <a:endParaRPr lang="" altLang="en-US" sz="1200" b="0">
-                        <a:solidFill>
-                          <a:srgbClr val="000000"/>
-                        </a:solidFill>
-                        <a:latin typeface="Calibri" charset="-122"/>
-                      </a:endParaRPr>
-                    </a:p>
-                  </a:txBody>
-                  <a:tcPr marL="12700" marR="12700" marT="12700" vert="horz" anchor="ctr" anchorCtr="0">
-                    <a:lnL w="6350" cap="flat" cmpd="sng">
-                      <a:solidFill>
-                        <a:srgbClr val="000000"/>
-                      </a:solidFill>
-                      <a:prstDash val="solid"/>
-                      <a:headEnd type="none" w="med" len="med"/>
-                      <a:tailEnd type="none" w="med" len="med"/>
-                    </a:lnL>
-                    <a:lnR w="6350" cap="flat" cmpd="sng">
-                      <a:solidFill>
-                        <a:srgbClr val="000000"/>
-                      </a:solidFill>
-                      <a:prstDash val="solid"/>
-                      <a:headEnd type="none" w="med" len="med"/>
-                      <a:tailEnd type="none" w="med" len="med"/>
-                    </a:lnR>
-                    <a:lnT w="6350" cap="flat" cmpd="sng">
-                      <a:solidFill>
-                        <a:srgbClr val="000000"/>
-                      </a:solidFill>
-                      <a:prstDash val="solid"/>
-                      <a:headEnd type="none" w="med" len="med"/>
-                      <a:tailEnd type="none" w="med" len="med"/>
-                    </a:lnT>
-                    <a:lnB w="6350" cap="flat" cmpd="sng">
-                      <a:solidFill>
-                        <a:srgbClr val="000000"/>
-                      </a:solidFill>
-                      <a:prstDash val="solid"/>
-                      <a:headEnd type="none" w="med" len="med"/>
-                      <a:tailEnd type="none" w="med" len="med"/>
-                    </a:lnB>
-                    <a:lnTlToBr>
-                      <a:noFill/>
-                    </a:lnTlToBr>
-                    <a:lnBlToTr>
-                      <a:noFill/>
-                    </a:lnBlToTr>
-                    <a:noFill/>
-                  </a:tcPr>
-                </a:tc>
-                <a:tc>
-                  <a:txBody>
-                    <a:bodyPr/>
-                    <a:p>
-                      <a:pPr marL="0" indent="0" algn="ctr">
-                        <a:buNone/>
-                      </a:pPr>
-                      <a:r>
-                        <a:rPr lang="" altLang="en-US" sz="1200" b="0">
-                          <a:solidFill>
-                            <a:srgbClr val="000000"/>
-                          </a:solidFill>
-                          <a:latin typeface="Calibri" charset="-122"/>
-                        </a:rPr>
-                        <a:t>6 connection</a:t>
-                      </a:r>
-                      <a:endParaRPr lang="" altLang="en-US" sz="1200" b="0">
-                        <a:solidFill>
-                          <a:srgbClr val="000000"/>
-                        </a:solidFill>
-                        <a:latin typeface="Calibri" charset="-122"/>
-                      </a:endParaRPr>
-                    </a:p>
-                  </a:txBody>
-                  <a:tcPr marL="12700" marR="12700" marT="12700" vert="horz" anchor="ctr" anchorCtr="0">
-                    <a:lnL w="6350" cap="flat" cmpd="sng">
-                      <a:solidFill>
-                        <a:srgbClr val="000000"/>
-                      </a:solidFill>
-                      <a:prstDash val="solid"/>
-                      <a:headEnd type="none" w="med" len="med"/>
-                      <a:tailEnd type="none" w="med" len="med"/>
-                    </a:lnL>
-                    <a:lnR w="6350" cap="flat" cmpd="sng">
-                      <a:solidFill>
-                        <a:srgbClr val="000000"/>
-                      </a:solidFill>
-                      <a:prstDash val="solid"/>
-                      <a:headEnd type="none" w="med" len="med"/>
-                      <a:tailEnd type="none" w="med" len="med"/>
-                    </a:lnR>
-                    <a:lnT w="6350" cap="flat" cmpd="sng">
-                      <a:solidFill>
-                        <a:srgbClr val="000000"/>
-                      </a:solidFill>
-                      <a:prstDash val="solid"/>
-                      <a:headEnd type="none" w="med" len="med"/>
-                      <a:tailEnd type="none" w="med" len="med"/>
-                    </a:lnT>
-                    <a:lnB w="6350" cap="flat" cmpd="sng">
-                      <a:solidFill>
-                        <a:srgbClr val="000000"/>
-                      </a:solidFill>
-                      <a:prstDash val="solid"/>
-                      <a:headEnd type="none" w="med" len="med"/>
-                      <a:tailEnd type="none" w="med" len="med"/>
-                    </a:lnB>
-                    <a:lnTlToBr>
-                      <a:noFill/>
-                    </a:lnTlToBr>
-                    <a:lnBlToTr>
-                      <a:noFill/>
-                    </a:lnBlToTr>
-                    <a:noFill/>
-                  </a:tcPr>
-                </a:tc>
-                <a:tc>
-                  <a:txBody>
-                    <a:bodyPr/>
-                    <a:p>
-                      <a:pPr marL="0" indent="0" algn="ctr">
-                        <a:buNone/>
-                      </a:pPr>
-                      <a:r>
-                        <a:rPr lang="" altLang="en-US" sz="1200" b="0">
-                          <a:solidFill>
-                            <a:srgbClr val="000000"/>
-                          </a:solidFill>
-                          <a:latin typeface="Calibri" charset="-122"/>
-                        </a:rPr>
-                        <a:t>103 steam</a:t>
-                      </a:r>
-                      <a:endParaRPr lang="" altLang="en-US" sz="1200" b="0">
-                        <a:solidFill>
-                          <a:srgbClr val="000000"/>
-                        </a:solidFill>
-                        <a:latin typeface="Calibri" charset="-122"/>
-                      </a:endParaRPr>
-                    </a:p>
-                  </a:txBody>
-                  <a:tcPr marL="12700" marR="12700" marT="12700" vert="horz" anchor="ctr" anchorCtr="0">
-                    <a:lnL w="6350" cap="flat" cmpd="sng">
-                      <a:solidFill>
-                        <a:srgbClr val="000000"/>
-                      </a:solidFill>
-                      <a:prstDash val="solid"/>
-                      <a:headEnd type="none" w="med" len="med"/>
-                      <a:tailEnd type="none" w="med" len="med"/>
-                    </a:lnL>
-                    <a:lnR w="6350" cap="flat" cmpd="sng">
-                      <a:solidFill>
-                        <a:srgbClr val="000000"/>
-                      </a:solidFill>
-                      <a:prstDash val="solid"/>
-                      <a:headEnd type="none" w="med" len="med"/>
-                      <a:tailEnd type="none" w="med" len="med"/>
-                    </a:lnR>
-                    <a:lnT w="6350" cap="flat" cmpd="sng">
-                      <a:solidFill>
-                        <a:srgbClr val="000000"/>
-                      </a:solidFill>
-                      <a:prstDash val="solid"/>
-                      <a:headEnd type="none" w="med" len="med"/>
-                      <a:tailEnd type="none" w="med" len="med"/>
-                    </a:lnT>
-                    <a:lnB w="6350" cap="flat" cmpd="sng">
-                      <a:solidFill>
-                        <a:srgbClr val="000000"/>
-                      </a:solidFill>
-                      <a:prstDash val="solid"/>
-                      <a:headEnd type="none" w="med" len="med"/>
-                      <a:tailEnd type="none" w="med" len="med"/>
-                    </a:lnB>
-                    <a:lnTlToBr>
-                      <a:noFill/>
-                    </a:lnTlToBr>
-                    <a:lnBlToTr>
-                      <a:noFill/>
-                    </a:lnBlToTr>
-                    <a:noFill/>
-                  </a:tcPr>
-                </a:tc>
-                <a:tc>
-                  <a:txBody>
-                    <a:bodyPr/>
-                    <a:p>
-                      <a:pPr marL="0" indent="0" algn="ctr">
-                        <a:buNone/>
-                      </a:pPr>
-                      <a:r>
-                        <a:rPr lang="" altLang="en-US" sz="1200" b="0">
-                          <a:solidFill>
-                            <a:srgbClr val="000000"/>
-                          </a:solidFill>
-                          <a:latin typeface="Calibri" charset="-122"/>
-                        </a:rPr>
-                        <a:t>153 connection</a:t>
-                      </a:r>
-                      <a:endParaRPr lang="" altLang="en-US" sz="1200" b="0">
-                        <a:solidFill>
-                          <a:srgbClr val="000000"/>
-                        </a:solidFill>
-                        <a:latin typeface="Calibri" charset="-122"/>
-                      </a:endParaRPr>
-                    </a:p>
-                  </a:txBody>
-                  <a:tcPr marL="12700" marR="12700" marT="12700" vert="horz" anchor="ctr" anchorCtr="0">
-                    <a:lnL w="6350" cap="flat" cmpd="sng">
-                      <a:solidFill>
-                        <a:srgbClr val="000000"/>
-                      </a:solidFill>
-                      <a:prstDash val="solid"/>
-                      <a:headEnd type="none" w="med" len="med"/>
-                      <a:tailEnd type="none" w="med" len="med"/>
-                    </a:lnL>
-                    <a:lnR w="6350" cap="flat" cmpd="sng">
-                      <a:solidFill>
-                        <a:srgbClr val="000000"/>
-                      </a:solidFill>
-                      <a:prstDash val="solid"/>
-                      <a:headEnd type="none" w="med" len="med"/>
-                      <a:tailEnd type="none" w="med" len="med"/>
-                    </a:lnR>
-                    <a:lnT w="6350" cap="flat" cmpd="sng">
-                      <a:solidFill>
-                        <a:srgbClr val="000000"/>
-                      </a:solidFill>
-                      <a:prstDash val="solid"/>
-                      <a:headEnd type="none" w="med" len="med"/>
-                      <a:tailEnd type="none" w="med" len="med"/>
-                    </a:lnT>
-                    <a:lnB w="6350" cap="flat" cmpd="sng">
-                      <a:solidFill>
-                        <a:srgbClr val="000000"/>
-                      </a:solidFill>
-                      <a:prstDash val="solid"/>
-                      <a:headEnd type="none" w="med" len="med"/>
-                      <a:tailEnd type="none" w="med" len="med"/>
-                    </a:lnB>
-                    <a:lnTlToBr>
-                      <a:noFill/>
-                    </a:lnTlToBr>
-                    <a:lnBlToTr>
-                      <a:noFill/>
-                    </a:lnBlToTr>
-                    <a:noFill/>
-                  </a:tcPr>
-                </a:tc>
-              </a:tr>
-            </a:tbl>
-          </a:graphicData>
-        </a:graphic>
-      </p:graphicFrame>
-      <p:sp>
-        <p:nvSpPr>
-          <p:cNvPr id="235" name="CustomShape 15"/>
-          <p:cNvSpPr/>
-          <p:nvPr/>
-        </p:nvSpPr>
-        <p:spPr>
-          <a:xfrm>
-            <a:off x="1261440" y="847800"/>
-            <a:ext cx="1623600" cy="510120"/>
-          </a:xfrm>
-          <a:prstGeom prst="chevron">
-            <a:avLst>
-              <a:gd name="adj" fmla="val 50000"/>
-            </a:avLst>
-          </a:prstGeom>
-          <a:solidFill>
-            <a:srgbClr val="111C76"/>
-          </a:solidFill>
-          <a:ln w="3240">
-            <a:solidFill>
-              <a:schemeClr val="bg1"/>
-            </a:solidFill>
-            <a:round/>
-          </a:ln>
-        </p:spPr>
-        <p:style>
-          <a:lnRef idx="2">
-            <a:schemeClr val="accent1">
-              <a:shade val="50000"/>
-            </a:schemeClr>
-          </a:lnRef>
-          <a:fillRef idx="1">
-            <a:schemeClr val="accent1"/>
-          </a:fillRef>
-          <a:effectRef idx="0">
-            <a:schemeClr val="accent1"/>
-          </a:effectRef>
-          <a:fontRef idx="minor"/>
-        </p:style>
-        <p:txBody>
-          <a:bodyPr lIns="90000" tIns="45000" rIns="90000" bIns="45000" anchor="ctr"/>
-          <a:p>
-            <a:pPr algn="ctr">
-              <a:lnSpc>
-                <a:spcPct val="100000"/>
-              </a:lnSpc>
-            </a:pPr>
-            <a:r>
-              <a:rPr lang="en-US" sz="1100" b="0" strike="noStrike" spc="-1">
-                <a:solidFill>
-                  <a:srgbClr val="FFFFFF"/>
-                </a:solidFill>
-                <a:uFill>
-                  <a:solidFill>
-                    <a:srgbClr val="FFFFFF"/>
-                  </a:solidFill>
-                </a:uFill>
-                <a:latin typeface="Caviar Dreams"/>
-                <a:ea typeface="DejaVu Sans" panose="020B0603030804020204"/>
-              </a:rPr>
-              <a:t>Rumusan Masalah</a:t>
-            </a:r>
-            <a:endParaRPr lang="en-US" sz="1800" b="0" strike="noStrike" spc="-1">
-              <a:solidFill>
-                <a:srgbClr val="000000"/>
-              </a:solidFill>
-              <a:uFill>
-                <a:solidFill>
-                  <a:srgbClr val="FFFFFF"/>
-                </a:solidFill>
-              </a:uFill>
-              <a:latin typeface="Arial" panose="020B0604020202020204"/>
-            </a:endParaRPr>
-          </a:p>
-        </p:txBody>
-      </p:sp>
-      <p:sp>
-        <p:nvSpPr>
-          <p:cNvPr id="236" name="CustomShape 16"/>
-          <p:cNvSpPr/>
-          <p:nvPr/>
-        </p:nvSpPr>
-        <p:spPr>
-          <a:xfrm>
-            <a:off x="2629440" y="847800"/>
-            <a:ext cx="1623600" cy="510120"/>
-          </a:xfrm>
-          <a:prstGeom prst="chevron">
-            <a:avLst>
-              <a:gd name="adj" fmla="val 50000"/>
-            </a:avLst>
-          </a:prstGeom>
-          <a:solidFill>
-            <a:srgbClr val="111C76"/>
-          </a:solidFill>
-          <a:ln w="3240">
-            <a:solidFill>
-              <a:schemeClr val="bg1"/>
-            </a:solidFill>
-            <a:round/>
-          </a:ln>
-        </p:spPr>
-        <p:style>
-          <a:lnRef idx="2">
-            <a:schemeClr val="accent1">
-              <a:shade val="50000"/>
-            </a:schemeClr>
-          </a:lnRef>
-          <a:fillRef idx="1">
-            <a:schemeClr val="accent1"/>
-          </a:fillRef>
-          <a:effectRef idx="0">
-            <a:schemeClr val="accent1"/>
-          </a:effectRef>
-          <a:fontRef idx="minor"/>
-        </p:style>
-        <p:txBody>
-          <a:bodyPr lIns="90000" tIns="45000" rIns="90000" bIns="45000" anchor="ctr"/>
-          <a:p>
-            <a:pPr algn="ctr">
-              <a:lnSpc>
-                <a:spcPct val="100000"/>
-              </a:lnSpc>
-            </a:pPr>
-            <a:r>
-              <a:rPr lang="en-US" sz="1100" b="0" strike="noStrike" spc="-1">
-                <a:solidFill>
-                  <a:srgbClr val="FFFFFF"/>
-                </a:solidFill>
-                <a:uFill>
-                  <a:solidFill>
-                    <a:srgbClr val="FFFFFF"/>
-                  </a:solidFill>
-                </a:uFill>
-                <a:latin typeface="Caviar Dreams"/>
-                <a:ea typeface="DejaVu Sans" panose="020B0603030804020204"/>
-              </a:rPr>
-              <a:t>Tujuan Proyek Akhir</a:t>
-            </a:r>
-            <a:endParaRPr lang="en-US" sz="1800" b="0" strike="noStrike" spc="-1">
-              <a:solidFill>
-                <a:srgbClr val="000000"/>
-              </a:solidFill>
-              <a:uFill>
-                <a:solidFill>
-                  <a:srgbClr val="FFFFFF"/>
-                </a:solidFill>
-              </a:uFill>
-              <a:latin typeface="Arial" panose="020B0604020202020204"/>
-            </a:endParaRPr>
-          </a:p>
-        </p:txBody>
-      </p:sp>
-      <p:sp>
-        <p:nvSpPr>
-          <p:cNvPr id="237" name="CustomShape 17"/>
-          <p:cNvSpPr/>
-          <p:nvPr/>
-        </p:nvSpPr>
-        <p:spPr>
-          <a:xfrm>
-            <a:off x="4018320" y="854640"/>
-            <a:ext cx="1727640" cy="491040"/>
-          </a:xfrm>
-          <a:prstGeom prst="chevron">
-            <a:avLst>
-              <a:gd name="adj" fmla="val 50000"/>
-            </a:avLst>
-          </a:prstGeom>
-          <a:solidFill>
-            <a:srgbClr val="111C76"/>
-          </a:solidFill>
-          <a:ln w="3240">
-            <a:solidFill>
-              <a:srgbClr val="111C76"/>
-            </a:solidFill>
-            <a:round/>
-          </a:ln>
-        </p:spPr>
-        <p:style>
-          <a:lnRef idx="2">
-            <a:schemeClr val="accent1">
-              <a:shade val="50000"/>
-            </a:schemeClr>
-          </a:lnRef>
-          <a:fillRef idx="1">
-            <a:schemeClr val="accent1"/>
-          </a:fillRef>
-          <a:effectRef idx="0">
-            <a:schemeClr val="accent1"/>
-          </a:effectRef>
-          <a:fontRef idx="minor"/>
-        </p:style>
-        <p:txBody>
-          <a:bodyPr lIns="90000" tIns="45000" rIns="90000" bIns="45000" anchor="ctr"/>
-          <a:p>
-            <a:pPr algn="ctr">
-              <a:lnSpc>
-                <a:spcPct val="100000"/>
-              </a:lnSpc>
-            </a:pPr>
-            <a:r>
-              <a:rPr lang="en-US" altLang="en-US" sz="1100" b="0" strike="noStrike" spc="-1">
-                <a:solidFill>
-                  <a:srgbClr val="FFFFFF"/>
-                </a:solidFill>
-                <a:uFill>
-                  <a:solidFill>
-                    <a:srgbClr val="FFFFFF"/>
-                  </a:solidFill>
-                </a:uFill>
-                <a:latin typeface="Caviar Dreams"/>
-                <a:ea typeface="DejaVu Sans" panose="020B0603030804020204"/>
-              </a:rPr>
-              <a:t>Metodologi</a:t>
-            </a:r>
-            <a:endParaRPr lang="en-US" altLang="en-US" sz="1800" b="0" strike="noStrike" spc="-1">
-              <a:solidFill>
-                <a:srgbClr val="000000"/>
-              </a:solidFill>
-              <a:uFill>
-                <a:solidFill>
-                  <a:srgbClr val="FFFFFF"/>
-                </a:solidFill>
-              </a:uFill>
-              <a:latin typeface="Arial" panose="020B0604020202020204"/>
-            </a:endParaRPr>
-          </a:p>
-        </p:txBody>
-      </p:sp>
-      <p:sp>
-        <p:nvSpPr>
-          <p:cNvPr id="239" name="CustomShape 19"/>
-          <p:cNvSpPr/>
-          <p:nvPr/>
-        </p:nvSpPr>
-        <p:spPr>
-          <a:xfrm>
-            <a:off x="6864120" y="854640"/>
-            <a:ext cx="1703880" cy="503280"/>
-          </a:xfrm>
-          <a:prstGeom prst="chevron">
-            <a:avLst>
-              <a:gd name="adj" fmla="val 50000"/>
-            </a:avLst>
-          </a:prstGeom>
-          <a:solidFill>
-            <a:srgbClr val="F9C534"/>
-          </a:solidFill>
-          <a:ln w="3240">
-            <a:solidFill>
-              <a:schemeClr val="bg1"/>
-            </a:solidFill>
-            <a:round/>
-          </a:ln>
-        </p:spPr>
-        <p:style>
-          <a:lnRef idx="2">
-            <a:schemeClr val="accent1">
-              <a:shade val="50000"/>
-            </a:schemeClr>
-          </a:lnRef>
-          <a:fillRef idx="1">
-            <a:schemeClr val="accent1"/>
-          </a:fillRef>
-          <a:effectRef idx="0">
-            <a:schemeClr val="accent1"/>
-          </a:effectRef>
-          <a:fontRef idx="minor"/>
-        </p:style>
-        <p:txBody>
-          <a:bodyPr lIns="90000" tIns="45000" rIns="90000" bIns="45000" anchor="ctr"/>
-          <a:p>
-            <a:pPr algn="ctr">
-              <a:lnSpc>
-                <a:spcPct val="100000"/>
-              </a:lnSpc>
-            </a:pPr>
-            <a:r>
-              <a:rPr lang="en-US" sz="1100" b="0" strike="noStrike" spc="-1">
-                <a:solidFill>
-                  <a:srgbClr val="000000"/>
-                </a:solidFill>
-                <a:uFill>
-                  <a:solidFill>
-                    <a:srgbClr val="FFFFFF"/>
-                  </a:solidFill>
-                </a:uFill>
-                <a:latin typeface="Caviar Dreams"/>
-                <a:ea typeface="DejaVu Sans" panose="020B0603030804020204"/>
-              </a:rPr>
-              <a:t>Metodologi</a:t>
-            </a:r>
-            <a:endParaRPr lang="en-US" sz="1800" b="0" strike="noStrike" spc="-1">
-              <a:solidFill>
-                <a:srgbClr val="000000"/>
-              </a:solidFill>
-              <a:uFill>
-                <a:solidFill>
-                  <a:srgbClr val="FFFFFF"/>
-                </a:solidFill>
-              </a:uFill>
-              <a:latin typeface="Arial" panose="020B0604020202020204"/>
-            </a:endParaRPr>
-          </a:p>
-        </p:txBody>
-      </p:sp>
-      <p:sp>
-        <p:nvSpPr>
-          <p:cNvPr id="240" name="CustomShape 20"/>
-          <p:cNvSpPr/>
-          <p:nvPr/>
-        </p:nvSpPr>
-        <p:spPr>
-          <a:xfrm>
-            <a:off x="-10080" y="847800"/>
-            <a:ext cx="1510200" cy="510120"/>
-          </a:xfrm>
-          <a:prstGeom prst="homePlate">
-            <a:avLst>
-              <a:gd name="adj" fmla="val 50000"/>
-            </a:avLst>
-          </a:prstGeom>
-          <a:solidFill>
-            <a:srgbClr val="111C76"/>
-          </a:solidFill>
-          <a:ln w="3240">
-            <a:solidFill>
-              <a:srgbClr val="111C76"/>
-            </a:solidFill>
-            <a:round/>
-          </a:ln>
-        </p:spPr>
-        <p:style>
-          <a:lnRef idx="2">
-            <a:schemeClr val="accent1">
-              <a:shade val="50000"/>
-            </a:schemeClr>
-          </a:lnRef>
-          <a:fillRef idx="1">
-            <a:schemeClr val="accent1"/>
-          </a:fillRef>
-          <a:effectRef idx="0">
-            <a:schemeClr val="accent1"/>
-          </a:effectRef>
-          <a:fontRef idx="minor"/>
-        </p:style>
-        <p:txBody>
-          <a:bodyPr lIns="90000" tIns="45000" rIns="90000" bIns="45000" anchor="ctr"/>
-          <a:p>
-            <a:pPr algn="ctr">
-              <a:lnSpc>
-                <a:spcPct val="100000"/>
-              </a:lnSpc>
-            </a:pPr>
-            <a:r>
-              <a:rPr lang="en-US" sz="1100" b="0" strike="noStrike" spc="-1">
-                <a:solidFill>
-                  <a:srgbClr val="FFFFFF"/>
-                </a:solidFill>
-                <a:uFill>
-                  <a:solidFill>
-                    <a:srgbClr val="FFFFFF"/>
-                  </a:solidFill>
-                </a:uFill>
-                <a:latin typeface="Caviar Dreams"/>
-                <a:ea typeface="DejaVu Sans" panose="020B0603030804020204"/>
-              </a:rPr>
-              <a:t>Latar Belakang</a:t>
-            </a:r>
-            <a:endParaRPr lang="en-US" sz="1800" b="0" strike="noStrike" spc="-1">
-              <a:solidFill>
-                <a:srgbClr val="000000"/>
-              </a:solidFill>
-              <a:uFill>
-                <a:solidFill>
-                  <a:srgbClr val="FFFFFF"/>
-                </a:solidFill>
-              </a:uFill>
-              <a:latin typeface="Arial" panose="020B0604020202020204"/>
-            </a:endParaRPr>
-          </a:p>
-        </p:txBody>
-      </p:sp>
-      <p:sp>
-        <p:nvSpPr>
-          <p:cNvPr id="2" name="CustomShape 1"/>
-          <p:cNvSpPr/>
-          <p:nvPr/>
-        </p:nvSpPr>
-        <p:spPr>
-          <a:xfrm>
-            <a:off x="5485765" y="854710"/>
-            <a:ext cx="1619885" cy="490855"/>
-          </a:xfrm>
-          <a:prstGeom prst="chevron">
-            <a:avLst>
-              <a:gd name="adj" fmla="val 50000"/>
-            </a:avLst>
-          </a:prstGeom>
-          <a:solidFill>
-            <a:srgbClr val="F9C534"/>
-          </a:solidFill>
-          <a:ln w="3240">
-            <a:solidFill>
-              <a:srgbClr val="111C76"/>
-            </a:solidFill>
-            <a:round/>
-          </a:ln>
-        </p:spPr>
-        <p:style>
-          <a:lnRef idx="2">
-            <a:schemeClr val="accent1">
-              <a:shade val="50000"/>
-            </a:schemeClr>
-          </a:lnRef>
-          <a:fillRef idx="1">
-            <a:schemeClr val="accent1"/>
-          </a:fillRef>
-          <a:effectRef idx="0">
-            <a:schemeClr val="accent1"/>
-          </a:effectRef>
-          <a:fontRef idx="minor"/>
-        </p:style>
-        <p:txBody>
-          <a:bodyPr lIns="90000" tIns="45000" rIns="90000" bIns="45000" anchor="ctr"/>
-          <a:p>
-            <a:pPr algn="ctr">
-              <a:lnSpc>
-                <a:spcPct val="100000"/>
-              </a:lnSpc>
-            </a:pPr>
-            <a:r>
-              <a:rPr lang="en-US" altLang="en-US" sz="1100" spc="-1">
-                <a:solidFill>
-                  <a:srgbClr val="111C76"/>
-                </a:solidFill>
-                <a:uFill>
-                  <a:solidFill>
-                    <a:srgbClr val="FFFFFF"/>
-                  </a:solidFill>
-                </a:uFill>
-                <a:latin typeface="Caviar Dreams"/>
-                <a:ea typeface="DejaVu Sans" panose="020B0603030804020204"/>
-                <a:sym typeface="+mn-ea"/>
-              </a:rPr>
-              <a:t>Pembahasan</a:t>
-            </a:r>
-            <a:endParaRPr lang="en-US" altLang="en-US" sz="1100" spc="-1">
-              <a:solidFill>
-                <a:srgbClr val="111C76"/>
-              </a:solidFill>
-              <a:uFill>
-                <a:solidFill>
-                  <a:srgbClr val="FFFFFF"/>
-                </a:solidFill>
-              </a:uFill>
-              <a:latin typeface="Caviar Dreams"/>
-              <a:ea typeface="DejaVu Sans" panose="020B0603030804020204"/>
-              <a:sym typeface="+mn-ea"/>
-            </a:endParaRPr>
-          </a:p>
-        </p:txBody>
-      </p:sp>
-      <p:sp>
-        <p:nvSpPr>
-          <p:cNvPr id="4" name="CustomShape 2"/>
-          <p:cNvSpPr/>
-          <p:nvPr/>
-        </p:nvSpPr>
-        <p:spPr>
-          <a:xfrm>
-            <a:off x="1228475" y="848370"/>
-            <a:ext cx="1623600" cy="510120"/>
-          </a:xfrm>
-          <a:prstGeom prst="chevron">
-            <a:avLst>
-              <a:gd name="adj" fmla="val 50000"/>
-            </a:avLst>
-          </a:prstGeom>
-          <a:solidFill>
-            <a:srgbClr val="111C76"/>
-          </a:solidFill>
-          <a:ln w="3240">
-            <a:solidFill>
-              <a:schemeClr val="bg1"/>
-            </a:solidFill>
-            <a:round/>
-          </a:ln>
-        </p:spPr>
-        <p:style>
-          <a:lnRef idx="2">
-            <a:schemeClr val="accent1">
-              <a:shade val="50000"/>
-            </a:schemeClr>
-          </a:lnRef>
-          <a:fillRef idx="1">
-            <a:schemeClr val="accent1"/>
-          </a:fillRef>
-          <a:effectRef idx="0">
-            <a:schemeClr val="accent1"/>
-          </a:effectRef>
-          <a:fontRef idx="minor"/>
-        </p:style>
-        <p:txBody>
-          <a:bodyPr lIns="90000" tIns="45000" rIns="90000" bIns="45000" anchor="ctr"/>
-          <a:p>
-            <a:pPr algn="ctr">
-              <a:lnSpc>
-                <a:spcPct val="100000"/>
-              </a:lnSpc>
-            </a:pPr>
-            <a:r>
-              <a:rPr lang="en-US" sz="1100" b="0" strike="noStrike" spc="-1">
-                <a:solidFill>
-                  <a:srgbClr val="FFFFFF"/>
-                </a:solidFill>
-                <a:uFill>
-                  <a:solidFill>
-                    <a:srgbClr val="FFFFFF"/>
-                  </a:solidFill>
-                </a:uFill>
-                <a:latin typeface="Caviar Dreams"/>
-                <a:ea typeface="DejaVu Sans" panose="020B0603030804020204"/>
-              </a:rPr>
-              <a:t>Tinjauan Pustaka</a:t>
-            </a:r>
-            <a:endParaRPr lang="en-US" sz="1100" b="0" strike="noStrike" spc="-1">
-              <a:solidFill>
-                <a:srgbClr val="FFFFFF"/>
-              </a:solidFill>
-              <a:uFill>
-                <a:solidFill>
-                  <a:srgbClr val="FFFFFF"/>
-                </a:solidFill>
-              </a:uFill>
-              <a:latin typeface="Caviar Dreams"/>
-              <a:ea typeface="DejaVu Sans" panose="020B0603030804020204"/>
-            </a:endParaRPr>
-          </a:p>
-        </p:txBody>
-      </p:sp>
-      <p:sp>
-        <p:nvSpPr>
-          <p:cNvPr id="6" name="CustomShape 3"/>
-          <p:cNvSpPr/>
-          <p:nvPr/>
-        </p:nvSpPr>
-        <p:spPr>
-          <a:xfrm>
-            <a:off x="2589230" y="848520"/>
-            <a:ext cx="1727640" cy="510120"/>
-          </a:xfrm>
-          <a:prstGeom prst="chevron">
-            <a:avLst>
-              <a:gd name="adj" fmla="val 50000"/>
-            </a:avLst>
-          </a:prstGeom>
-          <a:solidFill>
-            <a:srgbClr val="111C76"/>
-          </a:solidFill>
-          <a:ln w="3240">
-            <a:solidFill>
-              <a:schemeClr val="bg1"/>
-            </a:solidFill>
-            <a:round/>
-          </a:ln>
-        </p:spPr>
-        <p:style>
-          <a:lnRef idx="2">
-            <a:schemeClr val="accent1">
-              <a:shade val="50000"/>
-            </a:schemeClr>
-          </a:lnRef>
-          <a:fillRef idx="1">
-            <a:schemeClr val="accent1"/>
-          </a:fillRef>
-          <a:effectRef idx="0">
-            <a:schemeClr val="accent1"/>
-          </a:effectRef>
-          <a:fontRef idx="minor"/>
-        </p:style>
-        <p:txBody>
-          <a:bodyPr lIns="90000" tIns="45000" rIns="90000" bIns="45000" anchor="ctr"/>
-          <a:p>
-            <a:pPr algn="ctr">
-              <a:lnSpc>
-                <a:spcPct val="100000"/>
-              </a:lnSpc>
-            </a:pPr>
-            <a:r>
-              <a:rPr lang="en-US" sz="1100" spc="-1">
-                <a:solidFill>
-                  <a:srgbClr val="FFFFFF"/>
-                </a:solidFill>
-                <a:uFill>
-                  <a:solidFill>
-                    <a:srgbClr val="FFFFFF"/>
-                  </a:solidFill>
-                </a:uFill>
-                <a:latin typeface="Caviar Dreams"/>
-                <a:ea typeface="DejaVu Sans" panose="020B0603030804020204"/>
-                <a:sym typeface="+mn-ea"/>
-              </a:rPr>
-              <a:t>Tujuan Proyek Akhir</a:t>
-            </a:r>
-            <a:endParaRPr lang="en-US" sz="1100" spc="-1">
-              <a:solidFill>
-                <a:srgbClr val="FFFFFF"/>
-              </a:solidFill>
-              <a:uFill>
-                <a:solidFill>
-                  <a:srgbClr val="FFFFFF"/>
-                </a:solidFill>
-              </a:uFill>
-              <a:latin typeface="Caviar Dreams"/>
-              <a:ea typeface="DejaVu Sans" panose="020B0603030804020204"/>
-              <a:sym typeface="+mn-ea"/>
-            </a:endParaRPr>
-          </a:p>
-        </p:txBody>
-      </p:sp>
-      <p:sp>
-        <p:nvSpPr>
-          <p:cNvPr id="8" name="CustomShape 6"/>
-          <p:cNvSpPr/>
-          <p:nvPr/>
-        </p:nvSpPr>
-        <p:spPr>
-          <a:xfrm>
-            <a:off x="6849360" y="851400"/>
-            <a:ext cx="1703880" cy="503280"/>
-          </a:xfrm>
-          <a:prstGeom prst="chevron">
-            <a:avLst>
-              <a:gd name="adj" fmla="val 50000"/>
-            </a:avLst>
-          </a:prstGeom>
-          <a:solidFill>
-            <a:srgbClr val="111C76"/>
-          </a:solidFill>
-          <a:ln w="3240">
-            <a:solidFill>
-              <a:schemeClr val="bg1"/>
-            </a:solidFill>
-            <a:round/>
-          </a:ln>
-        </p:spPr>
-        <p:style>
-          <a:lnRef idx="2">
-            <a:schemeClr val="accent1">
-              <a:shade val="50000"/>
-            </a:schemeClr>
-          </a:lnRef>
-          <a:fillRef idx="1">
-            <a:schemeClr val="accent1"/>
-          </a:fillRef>
-          <a:effectRef idx="0">
-            <a:schemeClr val="accent1"/>
-          </a:effectRef>
-          <a:fontRef idx="minor"/>
-        </p:style>
-        <p:txBody>
-          <a:bodyPr lIns="90000" tIns="45000" rIns="90000" bIns="45000" anchor="ctr"/>
-          <a:p>
-            <a:pPr algn="ctr">
-              <a:lnSpc>
-                <a:spcPct val="100000"/>
-              </a:lnSpc>
-            </a:pPr>
-            <a:r>
-              <a:rPr lang="en-US" altLang="en-US" sz="1100" b="0" strike="noStrike" spc="-1">
-                <a:solidFill>
-                  <a:srgbClr val="FFFFFF"/>
-                </a:solidFill>
-                <a:uFill>
-                  <a:solidFill>
-                    <a:srgbClr val="FFFFFF"/>
-                  </a:solidFill>
-                </a:uFill>
-                <a:latin typeface="Caviar Dreams"/>
-                <a:ea typeface="DejaVu Sans" panose="020B0603030804020204"/>
-              </a:rPr>
-              <a:t>Kesimpulan dan Saran</a:t>
-            </a:r>
-            <a:endParaRPr lang="en-US" altLang="en-US" sz="1800" b="0" strike="noStrike" spc="-1">
-              <a:solidFill>
-                <a:srgbClr val="000000"/>
-              </a:solidFill>
-              <a:uFill>
-                <a:solidFill>
-                  <a:srgbClr val="FFFFFF"/>
-                </a:solidFill>
-              </a:uFill>
-              <a:latin typeface="Arial" panose="020B0604020202020204"/>
-            </a:endParaRPr>
-          </a:p>
-        </p:txBody>
-      </p:sp>
-      <p:sp>
-        <p:nvSpPr>
-          <p:cNvPr id="9" name="CustomShape 8"/>
-          <p:cNvSpPr/>
-          <p:nvPr/>
-        </p:nvSpPr>
-        <p:spPr>
-          <a:xfrm>
-            <a:off x="0" y="843480"/>
-            <a:ext cx="1505160" cy="510120"/>
-          </a:xfrm>
-          <a:prstGeom prst="homePlate">
-            <a:avLst>
-              <a:gd name="adj" fmla="val 50000"/>
-            </a:avLst>
-          </a:prstGeom>
-          <a:solidFill>
-            <a:srgbClr val="111C76"/>
-          </a:solidFill>
-          <a:ln w="3240">
-            <a:solidFill>
-              <a:schemeClr val="bg1"/>
-            </a:solidFill>
-            <a:round/>
-          </a:ln>
-        </p:spPr>
-        <p:style>
-          <a:lnRef idx="2">
-            <a:schemeClr val="accent1">
-              <a:shade val="50000"/>
-            </a:schemeClr>
-          </a:lnRef>
-          <a:fillRef idx="1">
-            <a:schemeClr val="accent1"/>
-          </a:fillRef>
-          <a:effectRef idx="0">
-            <a:schemeClr val="accent1"/>
-          </a:effectRef>
-          <a:fontRef idx="minor"/>
-        </p:style>
-        <p:txBody>
-          <a:bodyPr lIns="90000" tIns="45000" rIns="90000" bIns="45000" anchor="ctr"/>
-          <a:p>
-            <a:pPr algn="ctr">
-              <a:lnSpc>
-                <a:spcPct val="100000"/>
-              </a:lnSpc>
-            </a:pPr>
-            <a:r>
-              <a:rPr lang="en-US" sz="1100" b="0" strike="noStrike" spc="-1">
-                <a:solidFill>
-                  <a:schemeClr val="bg1"/>
-                </a:solidFill>
-                <a:uFill>
-                  <a:solidFill>
-                    <a:srgbClr val="FFFFFF"/>
-                  </a:solidFill>
-                </a:uFill>
-                <a:latin typeface="Caviar Dreams"/>
-                <a:ea typeface="DejaVu Sans" panose="020B0603030804020204"/>
-              </a:rPr>
-              <a:t>Latar Belakang</a:t>
-            </a:r>
-            <a:endParaRPr lang="en-US" sz="1100" b="0" strike="noStrike" spc="-1">
-              <a:solidFill>
-                <a:schemeClr val="bg1"/>
-              </a:solidFill>
-              <a:uFill>
-                <a:solidFill>
-                  <a:srgbClr val="FFFFFF"/>
-                </a:solidFill>
-              </a:uFill>
-              <a:latin typeface="Caviar Dreams"/>
-              <a:ea typeface="DejaVu Sans" panose="020B0603030804020204"/>
-            </a:endParaRPr>
-          </a:p>
-        </p:txBody>
-      </p:sp>
-      <p:sp>
-        <p:nvSpPr>
-          <p:cNvPr id="270" name="CustomShape 4"/>
-          <p:cNvSpPr/>
-          <p:nvPr/>
-        </p:nvSpPr>
-        <p:spPr>
-          <a:xfrm>
-            <a:off x="828675" y="1864995"/>
-            <a:ext cx="6859905" cy="664210"/>
-          </a:xfrm>
-          <a:prstGeom prst="rect">
-            <a:avLst/>
-          </a:prstGeom>
-          <a:noFill/>
-          <a:ln>
-            <a:noFill/>
-          </a:ln>
-        </p:spPr>
-        <p:style>
-          <a:lnRef idx="0">
-            <a:srgbClr val="FFFFFF"/>
-          </a:lnRef>
-          <a:fillRef idx="0">
-            <a:srgbClr val="FFFFFF"/>
-          </a:fillRef>
-          <a:effectRef idx="0">
-            <a:srgbClr val="FFFFFF"/>
-          </a:effectRef>
-          <a:fontRef idx="minor"/>
-        </p:style>
-        <p:txBody>
-          <a:bodyPr lIns="90000" tIns="45000" rIns="90000" bIns="45000"/>
-          <a:p>
-            <a:pPr indent="0" algn="just">
-              <a:lnSpc>
-                <a:spcPct val="130000"/>
-              </a:lnSpc>
-              <a:buFont typeface="Arial" panose="020B0604020202020204" pitchFamily="34" charset="0"/>
-              <a:buNone/>
-            </a:pPr>
-            <a:r>
-              <a:rPr lang="" altLang="en-US" sz="1400" b="0" strike="noStrike" spc="-1">
-                <a:solidFill>
-                  <a:srgbClr val="111C76"/>
-                </a:solidFill>
-                <a:uFill>
-                  <a:solidFill>
-                    <a:srgbClr val="FFFFFF"/>
-                  </a:solidFill>
-                </a:uFill>
-                <a:latin typeface="Caviar Dreams"/>
-                <a:ea typeface="DejaVu Sans" panose="020B0603030804020204"/>
-              </a:rPr>
-              <a:t>Total jumlah koneksi terbuka (TCP Connection / stream) yang dapat dibuat dalam satu </a:t>
-            </a:r>
-            <a:r>
-              <a:rPr lang="" altLang="en-US" sz="1400" b="0" i="1" strike="noStrike" spc="-1">
-                <a:solidFill>
-                  <a:srgbClr val="111C76"/>
-                </a:solidFill>
-                <a:uFill>
-                  <a:solidFill>
-                    <a:srgbClr val="FFFFFF"/>
-                  </a:solidFill>
-                </a:uFill>
-                <a:latin typeface="Caviar Dreams"/>
-                <a:ea typeface="DejaVu Sans" panose="020B0603030804020204"/>
-              </a:rPr>
-              <a:t>web browser</a:t>
-            </a:r>
-            <a:r>
-              <a:rPr lang="" altLang="en-US" sz="1400" b="0" strike="noStrike" spc="-1">
-                <a:solidFill>
-                  <a:srgbClr val="111C76"/>
-                </a:solidFill>
-                <a:uFill>
-                  <a:solidFill>
-                    <a:srgbClr val="FFFFFF"/>
-                  </a:solidFill>
-                </a:uFill>
-                <a:latin typeface="Caviar Dreams"/>
-                <a:ea typeface="DejaVu Sans" panose="020B0603030804020204"/>
-              </a:rPr>
-              <a:t> (Google Chrome Version 70.0.3538.110 (Official Build) (64-bit))</a:t>
-            </a:r>
-            <a:endParaRPr lang="" altLang="en-US" sz="1400" b="0" strike="noStrike" spc="-1">
-              <a:solidFill>
-                <a:srgbClr val="111C76"/>
-              </a:solidFill>
-              <a:uFill>
-                <a:solidFill>
-                  <a:srgbClr val="FFFFFF"/>
-                </a:solidFill>
-              </a:uFill>
-              <a:latin typeface="Caviar Dreams"/>
-              <a:ea typeface="DejaVu Sans" panose="020B0603030804020204"/>
-            </a:endParaRPr>
-          </a:p>
-        </p:txBody>
-      </p:sp>
-    </p:spTree>
-  </p:cSld>
-  <p:clrMapOvr>
-    <a:masterClrMapping/>
-  </p:clrMapOvr>
-  <p:transition spd="slow">
-    <p:push dir="d"/>
-  </p:transition>
-  <p:timing>
-    <p:tnLst>
-      <p:par>
-        <p:cTn id="1" dur="indefinite" restart="never" nodeType="tmRoot"/>
-      </p:par>
-    </p:tnLst>
-  </p:timing>
-</p:sld>
-</file>
-
-<file path=ppt/slides/slide29.xml><?xml version="1.0" encoding="utf-8"?>
-<p:sld xmlns:a="http://schemas.openxmlformats.org/drawingml/2006/main" xmlns:r="http://schemas.openxmlformats.org/officeDocument/2006/relationships" xmlns:p="http://schemas.openxmlformats.org/presentationml/2006/main">
-  <p:cSld>
-    <p:spTree>
-      <p:nvGrpSpPr>
-        <p:cNvPr id="1" name=""/>
-        <p:cNvGrpSpPr/>
-        <p:nvPr/>
-      </p:nvGrpSpPr>
       <p:grpSpPr/>
       <p:sp>
         <p:nvSpPr>
@@ -37502,749 +35628,7 @@
 </p:sld>
 </file>
 
-<file path=ppt/slides/slide3.xml><?xml version="1.0" encoding="utf-8"?>
-<p:sld xmlns:a="http://schemas.openxmlformats.org/drawingml/2006/main" xmlns:r="http://schemas.openxmlformats.org/officeDocument/2006/relationships" xmlns:p="http://schemas.openxmlformats.org/presentationml/2006/main">
-  <p:cSld>
-    <p:spTree>
-      <p:nvGrpSpPr>
-        <p:cNvPr id="1" name=""/>
-        <p:cNvGrpSpPr/>
-        <p:nvPr/>
-      </p:nvGrpSpPr>
-      <p:grpSpPr>
-        <a:xfrm>
-          <a:off x="0" y="0"/>
-          <a:ext cx="0" cy="0"/>
-          <a:chOff x="0" y="0"/>
-          <a:chExt cx="0" cy="0"/>
-        </a:xfrm>
-      </p:grpSpPr>
-      <p:sp>
-        <p:nvSpPr>
-          <p:cNvPr id="105" name="CustomShape 1"/>
-          <p:cNvSpPr/>
-          <p:nvPr/>
-        </p:nvSpPr>
-        <p:spPr>
-          <a:xfrm>
-            <a:off x="1250640" y="844560"/>
-            <a:ext cx="1619640" cy="510120"/>
-          </a:xfrm>
-          <a:prstGeom prst="chevron">
-            <a:avLst>
-              <a:gd name="adj" fmla="val 50000"/>
-            </a:avLst>
-          </a:prstGeom>
-          <a:solidFill>
-            <a:srgbClr val="111C76"/>
-          </a:solidFill>
-          <a:ln w="3240">
-            <a:solidFill>
-              <a:schemeClr val="bg1"/>
-            </a:solidFill>
-            <a:round/>
-          </a:ln>
-        </p:spPr>
-        <p:style>
-          <a:lnRef idx="2">
-            <a:schemeClr val="accent1">
-              <a:shade val="50000"/>
-            </a:schemeClr>
-          </a:lnRef>
-          <a:fillRef idx="1">
-            <a:schemeClr val="accent1"/>
-          </a:fillRef>
-          <a:effectRef idx="0">
-            <a:schemeClr val="accent1"/>
-          </a:effectRef>
-          <a:fontRef idx="minor"/>
-        </p:style>
-        <p:txBody>
-          <a:bodyPr lIns="90000" tIns="45000" rIns="90000" bIns="45000" anchor="ctr"/>
-          <a:p>
-            <a:pPr algn="ctr">
-              <a:lnSpc>
-                <a:spcPct val="100000"/>
-              </a:lnSpc>
-            </a:pPr>
-            <a:r>
-              <a:rPr lang="en-US" sz="1100" spc="-1">
-                <a:solidFill>
-                  <a:srgbClr val="FFFFFF"/>
-                </a:solidFill>
-                <a:uFill>
-                  <a:solidFill>
-                    <a:srgbClr val="FFFFFF"/>
-                  </a:solidFill>
-                </a:uFill>
-                <a:latin typeface="Caviar Dreams"/>
-                <a:ea typeface="DejaVu Sans" panose="020B0603030804020204"/>
-                <a:sym typeface="+mn-ea"/>
-              </a:rPr>
-              <a:t>Tinjauan Pustaka</a:t>
-            </a:r>
-            <a:endParaRPr lang="en-US" sz="1800" b="0" strike="noStrike" spc="-1">
-              <a:solidFill>
-                <a:srgbClr val="000000"/>
-              </a:solidFill>
-              <a:uFill>
-                <a:solidFill>
-                  <a:srgbClr val="FFFFFF"/>
-                </a:solidFill>
-              </a:uFill>
-              <a:latin typeface="Arial" panose="020B0604020202020204"/>
-            </a:endParaRPr>
-          </a:p>
-        </p:txBody>
-      </p:sp>
-      <p:sp>
-        <p:nvSpPr>
-          <p:cNvPr id="106" name="CustomShape 2"/>
-          <p:cNvSpPr/>
-          <p:nvPr/>
-        </p:nvSpPr>
-        <p:spPr>
-          <a:xfrm>
-            <a:off x="2614680" y="844560"/>
-            <a:ext cx="1623600" cy="510120"/>
-          </a:xfrm>
-          <a:prstGeom prst="chevron">
-            <a:avLst>
-              <a:gd name="adj" fmla="val 50000"/>
-            </a:avLst>
-          </a:prstGeom>
-          <a:solidFill>
-            <a:srgbClr val="111C76"/>
-          </a:solidFill>
-          <a:ln w="3240">
-            <a:solidFill>
-              <a:schemeClr val="bg1"/>
-            </a:solidFill>
-            <a:round/>
-          </a:ln>
-        </p:spPr>
-        <p:style>
-          <a:lnRef idx="2">
-            <a:schemeClr val="accent1">
-              <a:shade val="50000"/>
-            </a:schemeClr>
-          </a:lnRef>
-          <a:fillRef idx="1">
-            <a:schemeClr val="accent1"/>
-          </a:fillRef>
-          <a:effectRef idx="0">
-            <a:schemeClr val="accent1"/>
-          </a:effectRef>
-          <a:fontRef idx="minor"/>
-        </p:style>
-        <p:txBody>
-          <a:bodyPr lIns="90000" tIns="45000" rIns="90000" bIns="45000" anchor="ctr"/>
-          <a:p>
-            <a:pPr algn="ctr">
-              <a:lnSpc>
-                <a:spcPct val="100000"/>
-              </a:lnSpc>
-            </a:pPr>
-            <a:r>
-              <a:rPr lang="en-US" sz="1100" b="0" strike="noStrike" spc="-1">
-                <a:solidFill>
-                  <a:srgbClr val="FFFFFF"/>
-                </a:solidFill>
-                <a:uFill>
-                  <a:solidFill>
-                    <a:srgbClr val="FFFFFF"/>
-                  </a:solidFill>
-                </a:uFill>
-                <a:latin typeface="Caviar Dreams"/>
-                <a:ea typeface="DejaVu Sans" panose="020B0603030804020204"/>
-              </a:rPr>
-              <a:t>Tujuan Proyek Akhir</a:t>
-            </a:r>
-            <a:endParaRPr lang="en-US" sz="1800" b="0" strike="noStrike" spc="-1">
-              <a:solidFill>
-                <a:srgbClr val="000000"/>
-              </a:solidFill>
-              <a:uFill>
-                <a:solidFill>
-                  <a:srgbClr val="FFFFFF"/>
-                </a:solidFill>
-              </a:uFill>
-              <a:latin typeface="Arial" panose="020B0604020202020204"/>
-            </a:endParaRPr>
-          </a:p>
-        </p:txBody>
-      </p:sp>
-      <p:sp>
-        <p:nvSpPr>
-          <p:cNvPr id="107" name="CustomShape 3"/>
-          <p:cNvSpPr/>
-          <p:nvPr/>
-        </p:nvSpPr>
-        <p:spPr>
-          <a:xfrm>
-            <a:off x="3924000" y="848520"/>
-            <a:ext cx="1727640" cy="510120"/>
-          </a:xfrm>
-          <a:prstGeom prst="chevron">
-            <a:avLst>
-              <a:gd name="adj" fmla="val 50000"/>
-            </a:avLst>
-          </a:prstGeom>
-          <a:solidFill>
-            <a:srgbClr val="111C76"/>
-          </a:solidFill>
-          <a:ln w="3240">
-            <a:solidFill>
-              <a:schemeClr val="bg1"/>
-            </a:solidFill>
-            <a:round/>
-          </a:ln>
-        </p:spPr>
-        <p:style>
-          <a:lnRef idx="2">
-            <a:schemeClr val="accent1">
-              <a:shade val="50000"/>
-            </a:schemeClr>
-          </a:lnRef>
-          <a:fillRef idx="1">
-            <a:schemeClr val="accent1"/>
-          </a:fillRef>
-          <a:effectRef idx="0">
-            <a:schemeClr val="accent1"/>
-          </a:effectRef>
-          <a:fontRef idx="minor"/>
-        </p:style>
-        <p:txBody>
-          <a:bodyPr lIns="90000" tIns="45000" rIns="90000" bIns="45000" anchor="ctr"/>
-          <a:p>
-            <a:pPr algn="ctr">
-              <a:lnSpc>
-                <a:spcPct val="100000"/>
-              </a:lnSpc>
-            </a:pPr>
-            <a:r>
-              <a:rPr lang="en-US" sz="1100" spc="-1">
-                <a:solidFill>
-                  <a:srgbClr val="FFFFFF"/>
-                </a:solidFill>
-                <a:uFill>
-                  <a:solidFill>
-                    <a:srgbClr val="FFFFFF"/>
-                  </a:solidFill>
-                </a:uFill>
-                <a:latin typeface="Caviar Dreams"/>
-                <a:ea typeface="DejaVu Sans" panose="020B0603030804020204"/>
-                <a:sym typeface="+mn-ea"/>
-              </a:rPr>
-              <a:t>Metodologi</a:t>
-            </a:r>
-            <a:endParaRPr lang="en-US" sz="1800" b="0" strike="noStrike" spc="-1">
-              <a:solidFill>
-                <a:srgbClr val="000000"/>
-              </a:solidFill>
-              <a:uFill>
-                <a:solidFill>
-                  <a:srgbClr val="FFFFFF"/>
-                </a:solidFill>
-              </a:uFill>
-              <a:latin typeface="Arial" panose="020B0604020202020204"/>
-            </a:endParaRPr>
-          </a:p>
-        </p:txBody>
-      </p:sp>
-      <p:sp>
-        <p:nvSpPr>
-          <p:cNvPr id="108" name="CustomShape 4"/>
-          <p:cNvSpPr/>
-          <p:nvPr/>
-        </p:nvSpPr>
-        <p:spPr>
-          <a:xfrm>
-            <a:off x="5402160" y="851400"/>
-            <a:ext cx="1755720" cy="503280"/>
-          </a:xfrm>
-          <a:prstGeom prst="chevron">
-            <a:avLst>
-              <a:gd name="adj" fmla="val 50000"/>
-            </a:avLst>
-          </a:prstGeom>
-          <a:solidFill>
-            <a:srgbClr val="111C76"/>
-          </a:solidFill>
-          <a:ln w="3240">
-            <a:solidFill>
-              <a:schemeClr val="bg1"/>
-            </a:solidFill>
-            <a:round/>
-          </a:ln>
-        </p:spPr>
-        <p:style>
-          <a:lnRef idx="2">
-            <a:schemeClr val="accent1">
-              <a:shade val="50000"/>
-            </a:schemeClr>
-          </a:lnRef>
-          <a:fillRef idx="1">
-            <a:schemeClr val="accent1"/>
-          </a:fillRef>
-          <a:effectRef idx="0">
-            <a:schemeClr val="accent1"/>
-          </a:effectRef>
-          <a:fontRef idx="minor"/>
-        </p:style>
-        <p:txBody>
-          <a:bodyPr lIns="90000" tIns="45000" rIns="90000" bIns="45000" anchor="ctr"/>
-          <a:p>
-            <a:pPr algn="ctr">
-              <a:lnSpc>
-                <a:spcPct val="100000"/>
-              </a:lnSpc>
-            </a:pPr>
-            <a:r>
-              <a:rPr lang="en-US" altLang="en-US" sz="1100" b="0" strike="noStrike" spc="-1">
-                <a:solidFill>
-                  <a:srgbClr val="FFFFFF"/>
-                </a:solidFill>
-                <a:uFill>
-                  <a:solidFill>
-                    <a:srgbClr val="FFFFFF"/>
-                  </a:solidFill>
-                </a:uFill>
-                <a:latin typeface="Caviar Dreams"/>
-                <a:ea typeface="DejaVu Sans" panose="020B0603030804020204"/>
-              </a:rPr>
-              <a:t>Pembahasan</a:t>
-            </a:r>
-            <a:endParaRPr lang="en-US" altLang="en-US" sz="1800" b="0" strike="noStrike" spc="-1">
-              <a:solidFill>
-                <a:srgbClr val="000000"/>
-              </a:solidFill>
-              <a:uFill>
-                <a:solidFill>
-                  <a:srgbClr val="FFFFFF"/>
-                </a:solidFill>
-              </a:uFill>
-              <a:latin typeface="Arial" panose="020B0604020202020204"/>
-            </a:endParaRPr>
-          </a:p>
-        </p:txBody>
-      </p:sp>
-      <p:sp>
-        <p:nvSpPr>
-          <p:cNvPr id="109" name="CustomShape 5"/>
-          <p:cNvSpPr/>
-          <p:nvPr/>
-        </p:nvSpPr>
-        <p:spPr>
-          <a:xfrm>
-            <a:off x="4897755" y="227330"/>
-            <a:ext cx="3347720" cy="699135"/>
-          </a:xfrm>
-          <a:prstGeom prst="rect">
-            <a:avLst/>
-          </a:prstGeom>
-          <a:noFill/>
-          <a:ln>
-            <a:noFill/>
-          </a:ln>
-        </p:spPr>
-        <p:style>
-          <a:lnRef idx="0">
-            <a:srgbClr val="FFFFFF"/>
-          </a:lnRef>
-          <a:fillRef idx="0">
-            <a:srgbClr val="FFFFFF"/>
-          </a:fillRef>
-          <a:effectRef idx="0">
-            <a:srgbClr val="FFFFFF"/>
-          </a:effectRef>
-          <a:fontRef idx="minor"/>
-        </p:style>
-        <p:txBody>
-          <a:bodyPr lIns="90000" tIns="45000" rIns="90000" bIns="45000"/>
-          <a:p>
-            <a:pPr algn="ctr">
-              <a:lnSpc>
-                <a:spcPct val="100000"/>
-              </a:lnSpc>
-            </a:pPr>
-            <a:r>
-              <a:rPr lang="en-US" sz="2000" b="1" strike="noStrike" spc="-1">
-                <a:solidFill>
-                  <a:srgbClr val="1F497D"/>
-                </a:solidFill>
-                <a:uFill>
-                  <a:solidFill>
-                    <a:srgbClr val="FFFFFF"/>
-                  </a:solidFill>
-                </a:uFill>
-                <a:latin typeface="Capsuula"/>
-                <a:ea typeface="DejaVu Sans" panose="020B0603030804020204"/>
-              </a:rPr>
-              <a:t>Universitas Gadjah Mada</a:t>
-            </a:r>
-            <a:endParaRPr lang="en-US" sz="1800" b="0" strike="noStrike" spc="-1">
-              <a:solidFill>
-                <a:srgbClr val="000000"/>
-              </a:solidFill>
-              <a:uFill>
-                <a:solidFill>
-                  <a:srgbClr val="FFFFFF"/>
-                </a:solidFill>
-              </a:uFill>
-              <a:latin typeface="Arial" panose="020B0604020202020204"/>
-            </a:endParaRPr>
-          </a:p>
-        </p:txBody>
-      </p:sp>
-      <p:sp>
-        <p:nvSpPr>
-          <p:cNvPr id="110" name="CustomShape 6"/>
-          <p:cNvSpPr/>
-          <p:nvPr/>
-        </p:nvSpPr>
-        <p:spPr>
-          <a:xfrm>
-            <a:off x="6849360" y="851400"/>
-            <a:ext cx="1703880" cy="503280"/>
-          </a:xfrm>
-          <a:prstGeom prst="chevron">
-            <a:avLst>
-              <a:gd name="adj" fmla="val 50000"/>
-            </a:avLst>
-          </a:prstGeom>
-          <a:solidFill>
-            <a:srgbClr val="111C76"/>
-          </a:solidFill>
-          <a:ln w="3240">
-            <a:solidFill>
-              <a:schemeClr val="bg1"/>
-            </a:solidFill>
-            <a:round/>
-          </a:ln>
-        </p:spPr>
-        <p:style>
-          <a:lnRef idx="2">
-            <a:schemeClr val="accent1">
-              <a:shade val="50000"/>
-            </a:schemeClr>
-          </a:lnRef>
-          <a:fillRef idx="1">
-            <a:schemeClr val="accent1"/>
-          </a:fillRef>
-          <a:effectRef idx="0">
-            <a:schemeClr val="accent1"/>
-          </a:effectRef>
-          <a:fontRef idx="minor"/>
-        </p:style>
-        <p:txBody>
-          <a:bodyPr lIns="90000" tIns="45000" rIns="90000" bIns="45000" anchor="ctr"/>
-          <a:p>
-            <a:pPr algn="ctr">
-              <a:lnSpc>
-                <a:spcPct val="100000"/>
-              </a:lnSpc>
-            </a:pPr>
-            <a:r>
-              <a:rPr lang="en-US" altLang="en-US" sz="1100" b="0" strike="noStrike" spc="-1">
-                <a:solidFill>
-                  <a:srgbClr val="FFFFFF"/>
-                </a:solidFill>
-                <a:uFill>
-                  <a:solidFill>
-                    <a:srgbClr val="FFFFFF"/>
-                  </a:solidFill>
-                </a:uFill>
-                <a:latin typeface="Caviar Dreams"/>
-                <a:ea typeface="DejaVu Sans" panose="020B0603030804020204"/>
-              </a:rPr>
-              <a:t>Kesimpulan dan Saran</a:t>
-            </a:r>
-            <a:endParaRPr lang="en-US" altLang="en-US" sz="1800" b="0" strike="noStrike" spc="-1">
-              <a:solidFill>
-                <a:srgbClr val="000000"/>
-              </a:solidFill>
-              <a:uFill>
-                <a:solidFill>
-                  <a:srgbClr val="FFFFFF"/>
-                </a:solidFill>
-              </a:uFill>
-              <a:latin typeface="Arial" panose="020B0604020202020204"/>
-            </a:endParaRPr>
-          </a:p>
-        </p:txBody>
-      </p:sp>
-      <p:sp>
-        <p:nvSpPr>
-          <p:cNvPr id="111" name="CustomShape 7"/>
-          <p:cNvSpPr/>
-          <p:nvPr/>
-        </p:nvSpPr>
-        <p:spPr>
-          <a:xfrm>
-            <a:off x="20880" y="177840"/>
-            <a:ext cx="3542040" cy="394200"/>
-          </a:xfrm>
-          <a:prstGeom prst="rect">
-            <a:avLst/>
-          </a:prstGeom>
-          <a:noFill/>
-          <a:ln>
-            <a:noFill/>
-          </a:ln>
-        </p:spPr>
-        <p:style>
-          <a:lnRef idx="0">
-            <a:srgbClr val="FFFFFF"/>
-          </a:lnRef>
-          <a:fillRef idx="0">
-            <a:srgbClr val="FFFFFF"/>
-          </a:fillRef>
-          <a:effectRef idx="0">
-            <a:srgbClr val="FFFFFF"/>
-          </a:effectRef>
-          <a:fontRef idx="minor"/>
-        </p:style>
-        <p:txBody>
-          <a:bodyPr lIns="90000" tIns="45000" rIns="90000" bIns="45000"/>
-          <a:p>
-            <a:pPr>
-              <a:lnSpc>
-                <a:spcPct val="150000"/>
-              </a:lnSpc>
-            </a:pPr>
-            <a:r>
-              <a:rPr lang="en-US" altLang="en-US" sz="800" b="0" strike="noStrike" spc="-1">
-                <a:solidFill>
-                  <a:srgbClr val="1F497D"/>
-                </a:solidFill>
-                <a:uFill>
-                  <a:solidFill>
-                    <a:srgbClr val="FFFFFF"/>
-                  </a:solidFill>
-                </a:uFill>
-                <a:latin typeface="Caviar Dreams"/>
-                <a:ea typeface="DejaVu Sans" panose="020B0603030804020204"/>
-              </a:rPr>
-              <a:t>“Penerapan HTTP/2 SSE dan Websocket pada Rumah Pintar”</a:t>
-            </a:r>
-            <a:endParaRPr lang="en-US" altLang="en-US" sz="800" b="0" strike="noStrike" spc="-1">
-              <a:solidFill>
-                <a:srgbClr val="1F497D"/>
-              </a:solidFill>
-              <a:uFill>
-                <a:solidFill>
-                  <a:srgbClr val="FFFFFF"/>
-                </a:solidFill>
-              </a:uFill>
-              <a:latin typeface="Caviar Dreams"/>
-              <a:ea typeface="DejaVu Sans" panose="020B0603030804020204"/>
-            </a:endParaRPr>
-          </a:p>
-        </p:txBody>
-      </p:sp>
-      <p:sp>
-        <p:nvSpPr>
-          <p:cNvPr id="112" name="CustomShape 8"/>
-          <p:cNvSpPr/>
-          <p:nvPr/>
-        </p:nvSpPr>
-        <p:spPr>
-          <a:xfrm>
-            <a:off x="0" y="843480"/>
-            <a:ext cx="1505160" cy="510120"/>
-          </a:xfrm>
-          <a:prstGeom prst="homePlate">
-            <a:avLst>
-              <a:gd name="adj" fmla="val 50000"/>
-            </a:avLst>
-          </a:prstGeom>
-          <a:solidFill>
-            <a:srgbClr val="F9C534"/>
-          </a:solidFill>
-          <a:ln w="3240">
-            <a:solidFill>
-              <a:srgbClr val="111C76"/>
-            </a:solidFill>
-            <a:round/>
-          </a:ln>
-        </p:spPr>
-        <p:style>
-          <a:lnRef idx="2">
-            <a:schemeClr val="accent1">
-              <a:shade val="50000"/>
-            </a:schemeClr>
-          </a:lnRef>
-          <a:fillRef idx="1">
-            <a:schemeClr val="accent1"/>
-          </a:fillRef>
-          <a:effectRef idx="0">
-            <a:schemeClr val="accent1"/>
-          </a:effectRef>
-          <a:fontRef idx="minor"/>
-        </p:style>
-        <p:txBody>
-          <a:bodyPr lIns="90000" tIns="45000" rIns="90000" bIns="45000" anchor="ctr"/>
-          <a:p>
-            <a:pPr algn="ctr">
-              <a:lnSpc>
-                <a:spcPct val="100000"/>
-              </a:lnSpc>
-            </a:pPr>
-            <a:r>
-              <a:rPr lang="en-US" sz="1100" b="0" strike="noStrike" spc="-1">
-                <a:solidFill>
-                  <a:srgbClr val="111C76"/>
-                </a:solidFill>
-                <a:uFill>
-                  <a:solidFill>
-                    <a:srgbClr val="FFFFFF"/>
-                  </a:solidFill>
-                </a:uFill>
-                <a:latin typeface="Caviar Dreams"/>
-                <a:ea typeface="DejaVu Sans" panose="020B0603030804020204"/>
-              </a:rPr>
-              <a:t>Latar Belakang</a:t>
-            </a:r>
-            <a:endParaRPr lang="en-US" sz="1800" b="0" strike="noStrike" spc="-1">
-              <a:solidFill>
-                <a:srgbClr val="000000"/>
-              </a:solidFill>
-              <a:uFill>
-                <a:solidFill>
-                  <a:srgbClr val="FFFFFF"/>
-                </a:solidFill>
-              </a:uFill>
-              <a:latin typeface="Arial" panose="020B0604020202020204"/>
-            </a:endParaRPr>
-          </a:p>
-        </p:txBody>
-      </p:sp>
-      <p:sp>
-        <p:nvSpPr>
-          <p:cNvPr id="113" name="CustomShape 9"/>
-          <p:cNvSpPr/>
-          <p:nvPr/>
-        </p:nvSpPr>
-        <p:spPr>
-          <a:xfrm>
-            <a:off x="59040" y="1590120"/>
-            <a:ext cx="4329720" cy="1253880"/>
-          </a:xfrm>
-          <a:prstGeom prst="rect">
-            <a:avLst/>
-          </a:prstGeom>
-          <a:gradFill>
-            <a:gsLst>
-              <a:gs pos="0">
-                <a:srgbClr val="FFDB9E"/>
-              </a:gs>
-              <a:gs pos="50000">
-                <a:srgbClr val="FFE8C4"/>
-              </a:gs>
-              <a:gs pos="100000">
-                <a:srgbClr val="FFF2E1"/>
-              </a:gs>
-            </a:gsLst>
-            <a:lin ang="0"/>
-          </a:gradFill>
-          <a:ln>
-            <a:noFill/>
-          </a:ln>
-        </p:spPr>
-        <p:style>
-          <a:lnRef idx="0">
-            <a:srgbClr val="FFFFFF"/>
-          </a:lnRef>
-          <a:fillRef idx="0">
-            <a:srgbClr val="FFFFFF"/>
-          </a:fillRef>
-          <a:effectRef idx="0">
-            <a:srgbClr val="FFFFFF"/>
-          </a:effectRef>
-          <a:fontRef idx="minor"/>
-        </p:style>
-        <p:txBody>
-          <a:bodyPr lIns="90000" tIns="45000" rIns="90000" bIns="45000"/>
-          <a:p>
-            <a:pPr marL="186055" algn="just">
-              <a:lnSpc>
-                <a:spcPct val="170000"/>
-              </a:lnSpc>
-            </a:pPr>
-            <a:r>
-              <a:rPr lang="en-US" sz="1400" b="0" strike="noStrike" spc="-1">
-                <a:solidFill>
-                  <a:srgbClr val="000000"/>
-                </a:solidFill>
-                <a:uFill>
-                  <a:solidFill>
-                    <a:srgbClr val="FFFFFF"/>
-                  </a:solidFill>
-                </a:uFill>
-                <a:latin typeface="Caviar Dreams"/>
-                <a:ea typeface="DejaVu Sans" panose="020B0603030804020204"/>
-              </a:rPr>
-              <a:t>Jumlah pengguna internet di Indonesia dari 2017 sampai 2023 akan terus mengalami peningkatan</a:t>
-            </a:r>
-            <a:endParaRPr lang="en-US" sz="1800" b="0" strike="noStrike" spc="-1">
-              <a:solidFill>
-                <a:srgbClr val="000000"/>
-              </a:solidFill>
-              <a:uFill>
-                <a:solidFill>
-                  <a:srgbClr val="FFFFFF"/>
-                </a:solidFill>
-              </a:uFill>
-              <a:latin typeface="Arial" panose="020B0604020202020204"/>
-            </a:endParaRPr>
-          </a:p>
-        </p:txBody>
-      </p:sp>
-      <p:pic>
-        <p:nvPicPr>
-          <p:cNvPr id="114" name="Picture 113"/>
-          <p:cNvPicPr/>
-          <p:nvPr/>
-        </p:nvPicPr>
-        <p:blipFill>
-          <a:blip r:embed="rId1"/>
-          <a:stretch>
-            <a:fillRect/>
-          </a:stretch>
-        </p:blipFill>
-        <p:spPr>
-          <a:xfrm>
-            <a:off x="4480560" y="1424520"/>
-            <a:ext cx="3748680" cy="3349440"/>
-          </a:xfrm>
-          <a:prstGeom prst="rect">
-            <a:avLst/>
-          </a:prstGeom>
-          <a:ln>
-            <a:noFill/>
-          </a:ln>
-        </p:spPr>
-      </p:pic>
-    </p:spTree>
-  </p:cSld>
-  <p:clrMapOvr>
-    <a:masterClrMapping/>
-  </p:clrMapOvr>
-  <p:transition spd="slow">
-    <p:push dir="d"/>
-  </p:transition>
-  <p:timing>
-    <p:tnLst>
-      <p:par>
-        <p:cTn id="1" dur="indefinite" restart="never" nodeType="tmRoot"/>
-      </p:par>
-    </p:tnLst>
-  </p:timing>
-</p:sld>
-</file>
-
-<file path=ppt/slides/slide30.xml><?xml version="1.0" encoding="utf-8"?>
+<file path=ppt/slides/slide29.xml><?xml version="1.0" encoding="utf-8"?>
 <p:sld xmlns:a="http://schemas.openxmlformats.org/drawingml/2006/main" xmlns:r="http://schemas.openxmlformats.org/officeDocument/2006/relationships" xmlns:p="http://schemas.openxmlformats.org/presentationml/2006/main">
   <p:cSld>
     <p:bg>
@@ -38399,6 +35783,748 @@
           </a:p>
         </p:txBody>
       </p:sp>
+    </p:spTree>
+  </p:cSld>
+  <p:clrMapOvr>
+    <a:masterClrMapping/>
+  </p:clrMapOvr>
+  <p:transition spd="slow">
+    <p:push dir="d"/>
+  </p:transition>
+  <p:timing>
+    <p:tnLst>
+      <p:par>
+        <p:cTn id="1" dur="indefinite" restart="never" nodeType="tmRoot"/>
+      </p:par>
+    </p:tnLst>
+  </p:timing>
+</p:sld>
+</file>
+
+<file path=ppt/slides/slide3.xml><?xml version="1.0" encoding="utf-8"?>
+<p:sld xmlns:a="http://schemas.openxmlformats.org/drawingml/2006/main" xmlns:r="http://schemas.openxmlformats.org/officeDocument/2006/relationships" xmlns:p="http://schemas.openxmlformats.org/presentationml/2006/main">
+  <p:cSld>
+    <p:spTree>
+      <p:nvGrpSpPr>
+        <p:cNvPr id="1" name=""/>
+        <p:cNvGrpSpPr/>
+        <p:nvPr/>
+      </p:nvGrpSpPr>
+      <p:grpSpPr>
+        <a:xfrm>
+          <a:off x="0" y="0"/>
+          <a:ext cx="0" cy="0"/>
+          <a:chOff x="0" y="0"/>
+          <a:chExt cx="0" cy="0"/>
+        </a:xfrm>
+      </p:grpSpPr>
+      <p:sp>
+        <p:nvSpPr>
+          <p:cNvPr id="105" name="CustomShape 1"/>
+          <p:cNvSpPr/>
+          <p:nvPr/>
+        </p:nvSpPr>
+        <p:spPr>
+          <a:xfrm>
+            <a:off x="1250640" y="844560"/>
+            <a:ext cx="1619640" cy="510120"/>
+          </a:xfrm>
+          <a:prstGeom prst="chevron">
+            <a:avLst>
+              <a:gd name="adj" fmla="val 50000"/>
+            </a:avLst>
+          </a:prstGeom>
+          <a:solidFill>
+            <a:srgbClr val="111C76"/>
+          </a:solidFill>
+          <a:ln w="3240">
+            <a:solidFill>
+              <a:schemeClr val="bg1"/>
+            </a:solidFill>
+            <a:round/>
+          </a:ln>
+        </p:spPr>
+        <p:style>
+          <a:lnRef idx="2">
+            <a:schemeClr val="accent1">
+              <a:shade val="50000"/>
+            </a:schemeClr>
+          </a:lnRef>
+          <a:fillRef idx="1">
+            <a:schemeClr val="accent1"/>
+          </a:fillRef>
+          <a:effectRef idx="0">
+            <a:schemeClr val="accent1"/>
+          </a:effectRef>
+          <a:fontRef idx="minor"/>
+        </p:style>
+        <p:txBody>
+          <a:bodyPr lIns="90000" tIns="45000" rIns="90000" bIns="45000" anchor="ctr"/>
+          <a:p>
+            <a:pPr algn="ctr">
+              <a:lnSpc>
+                <a:spcPct val="100000"/>
+              </a:lnSpc>
+            </a:pPr>
+            <a:r>
+              <a:rPr lang="en-US" sz="1100" spc="-1">
+                <a:solidFill>
+                  <a:srgbClr val="FFFFFF"/>
+                </a:solidFill>
+                <a:uFill>
+                  <a:solidFill>
+                    <a:srgbClr val="FFFFFF"/>
+                  </a:solidFill>
+                </a:uFill>
+                <a:latin typeface="Caviar Dreams"/>
+                <a:ea typeface="DejaVu Sans" panose="020B0603030804020204"/>
+                <a:sym typeface="+mn-ea"/>
+              </a:rPr>
+              <a:t>Tinjauan Pustaka</a:t>
+            </a:r>
+            <a:endParaRPr lang="en-US" sz="1800" b="0" strike="noStrike" spc="-1">
+              <a:solidFill>
+                <a:srgbClr val="000000"/>
+              </a:solidFill>
+              <a:uFill>
+                <a:solidFill>
+                  <a:srgbClr val="FFFFFF"/>
+                </a:solidFill>
+              </a:uFill>
+              <a:latin typeface="Arial" panose="020B0604020202020204"/>
+            </a:endParaRPr>
+          </a:p>
+        </p:txBody>
+      </p:sp>
+      <p:sp>
+        <p:nvSpPr>
+          <p:cNvPr id="106" name="CustomShape 2"/>
+          <p:cNvSpPr/>
+          <p:nvPr/>
+        </p:nvSpPr>
+        <p:spPr>
+          <a:xfrm>
+            <a:off x="2614680" y="844560"/>
+            <a:ext cx="1623600" cy="510120"/>
+          </a:xfrm>
+          <a:prstGeom prst="chevron">
+            <a:avLst>
+              <a:gd name="adj" fmla="val 50000"/>
+            </a:avLst>
+          </a:prstGeom>
+          <a:solidFill>
+            <a:srgbClr val="111C76"/>
+          </a:solidFill>
+          <a:ln w="3240">
+            <a:solidFill>
+              <a:schemeClr val="bg1"/>
+            </a:solidFill>
+            <a:round/>
+          </a:ln>
+        </p:spPr>
+        <p:style>
+          <a:lnRef idx="2">
+            <a:schemeClr val="accent1">
+              <a:shade val="50000"/>
+            </a:schemeClr>
+          </a:lnRef>
+          <a:fillRef idx="1">
+            <a:schemeClr val="accent1"/>
+          </a:fillRef>
+          <a:effectRef idx="0">
+            <a:schemeClr val="accent1"/>
+          </a:effectRef>
+          <a:fontRef idx="minor"/>
+        </p:style>
+        <p:txBody>
+          <a:bodyPr lIns="90000" tIns="45000" rIns="90000" bIns="45000" anchor="ctr"/>
+          <a:p>
+            <a:pPr algn="ctr">
+              <a:lnSpc>
+                <a:spcPct val="100000"/>
+              </a:lnSpc>
+            </a:pPr>
+            <a:r>
+              <a:rPr lang="en-US" sz="1100" b="0" strike="noStrike" spc="-1">
+                <a:solidFill>
+                  <a:srgbClr val="FFFFFF"/>
+                </a:solidFill>
+                <a:uFill>
+                  <a:solidFill>
+                    <a:srgbClr val="FFFFFF"/>
+                  </a:solidFill>
+                </a:uFill>
+                <a:latin typeface="Caviar Dreams"/>
+                <a:ea typeface="DejaVu Sans" panose="020B0603030804020204"/>
+              </a:rPr>
+              <a:t>Tujuan Proyek Akhir</a:t>
+            </a:r>
+            <a:endParaRPr lang="en-US" sz="1800" b="0" strike="noStrike" spc="-1">
+              <a:solidFill>
+                <a:srgbClr val="000000"/>
+              </a:solidFill>
+              <a:uFill>
+                <a:solidFill>
+                  <a:srgbClr val="FFFFFF"/>
+                </a:solidFill>
+              </a:uFill>
+              <a:latin typeface="Arial" panose="020B0604020202020204"/>
+            </a:endParaRPr>
+          </a:p>
+        </p:txBody>
+      </p:sp>
+      <p:sp>
+        <p:nvSpPr>
+          <p:cNvPr id="107" name="CustomShape 3"/>
+          <p:cNvSpPr/>
+          <p:nvPr/>
+        </p:nvSpPr>
+        <p:spPr>
+          <a:xfrm>
+            <a:off x="3924000" y="848520"/>
+            <a:ext cx="1727640" cy="510120"/>
+          </a:xfrm>
+          <a:prstGeom prst="chevron">
+            <a:avLst>
+              <a:gd name="adj" fmla="val 50000"/>
+            </a:avLst>
+          </a:prstGeom>
+          <a:solidFill>
+            <a:srgbClr val="111C76"/>
+          </a:solidFill>
+          <a:ln w="3240">
+            <a:solidFill>
+              <a:schemeClr val="bg1"/>
+            </a:solidFill>
+            <a:round/>
+          </a:ln>
+        </p:spPr>
+        <p:style>
+          <a:lnRef idx="2">
+            <a:schemeClr val="accent1">
+              <a:shade val="50000"/>
+            </a:schemeClr>
+          </a:lnRef>
+          <a:fillRef idx="1">
+            <a:schemeClr val="accent1"/>
+          </a:fillRef>
+          <a:effectRef idx="0">
+            <a:schemeClr val="accent1"/>
+          </a:effectRef>
+          <a:fontRef idx="minor"/>
+        </p:style>
+        <p:txBody>
+          <a:bodyPr lIns="90000" tIns="45000" rIns="90000" bIns="45000" anchor="ctr"/>
+          <a:p>
+            <a:pPr algn="ctr">
+              <a:lnSpc>
+                <a:spcPct val="100000"/>
+              </a:lnSpc>
+            </a:pPr>
+            <a:r>
+              <a:rPr lang="en-US" sz="1100" spc="-1">
+                <a:solidFill>
+                  <a:srgbClr val="FFFFFF"/>
+                </a:solidFill>
+                <a:uFill>
+                  <a:solidFill>
+                    <a:srgbClr val="FFFFFF"/>
+                  </a:solidFill>
+                </a:uFill>
+                <a:latin typeface="Caviar Dreams"/>
+                <a:ea typeface="DejaVu Sans" panose="020B0603030804020204"/>
+                <a:sym typeface="+mn-ea"/>
+              </a:rPr>
+              <a:t>Metodologi</a:t>
+            </a:r>
+            <a:endParaRPr lang="en-US" sz="1800" b="0" strike="noStrike" spc="-1">
+              <a:solidFill>
+                <a:srgbClr val="000000"/>
+              </a:solidFill>
+              <a:uFill>
+                <a:solidFill>
+                  <a:srgbClr val="FFFFFF"/>
+                </a:solidFill>
+              </a:uFill>
+              <a:latin typeface="Arial" panose="020B0604020202020204"/>
+            </a:endParaRPr>
+          </a:p>
+        </p:txBody>
+      </p:sp>
+      <p:sp>
+        <p:nvSpPr>
+          <p:cNvPr id="108" name="CustomShape 4"/>
+          <p:cNvSpPr/>
+          <p:nvPr/>
+        </p:nvSpPr>
+        <p:spPr>
+          <a:xfrm>
+            <a:off x="5402160" y="851400"/>
+            <a:ext cx="1755720" cy="503280"/>
+          </a:xfrm>
+          <a:prstGeom prst="chevron">
+            <a:avLst>
+              <a:gd name="adj" fmla="val 50000"/>
+            </a:avLst>
+          </a:prstGeom>
+          <a:solidFill>
+            <a:srgbClr val="111C76"/>
+          </a:solidFill>
+          <a:ln w="3240">
+            <a:solidFill>
+              <a:schemeClr val="bg1"/>
+            </a:solidFill>
+            <a:round/>
+          </a:ln>
+        </p:spPr>
+        <p:style>
+          <a:lnRef idx="2">
+            <a:schemeClr val="accent1">
+              <a:shade val="50000"/>
+            </a:schemeClr>
+          </a:lnRef>
+          <a:fillRef idx="1">
+            <a:schemeClr val="accent1"/>
+          </a:fillRef>
+          <a:effectRef idx="0">
+            <a:schemeClr val="accent1"/>
+          </a:effectRef>
+          <a:fontRef idx="minor"/>
+        </p:style>
+        <p:txBody>
+          <a:bodyPr lIns="90000" tIns="45000" rIns="90000" bIns="45000" anchor="ctr"/>
+          <a:p>
+            <a:pPr algn="ctr">
+              <a:lnSpc>
+                <a:spcPct val="100000"/>
+              </a:lnSpc>
+            </a:pPr>
+            <a:r>
+              <a:rPr lang="en-US" altLang="en-US" sz="1100" b="0" strike="noStrike" spc="-1">
+                <a:solidFill>
+                  <a:srgbClr val="FFFFFF"/>
+                </a:solidFill>
+                <a:uFill>
+                  <a:solidFill>
+                    <a:srgbClr val="FFFFFF"/>
+                  </a:solidFill>
+                </a:uFill>
+                <a:latin typeface="Caviar Dreams"/>
+                <a:ea typeface="DejaVu Sans" panose="020B0603030804020204"/>
+              </a:rPr>
+              <a:t>Pembahasan</a:t>
+            </a:r>
+            <a:endParaRPr lang="en-US" altLang="en-US" sz="1800" b="0" strike="noStrike" spc="-1">
+              <a:solidFill>
+                <a:srgbClr val="000000"/>
+              </a:solidFill>
+              <a:uFill>
+                <a:solidFill>
+                  <a:srgbClr val="FFFFFF"/>
+                </a:solidFill>
+              </a:uFill>
+              <a:latin typeface="Arial" panose="020B0604020202020204"/>
+            </a:endParaRPr>
+          </a:p>
+        </p:txBody>
+      </p:sp>
+      <p:sp>
+        <p:nvSpPr>
+          <p:cNvPr id="109" name="CustomShape 5"/>
+          <p:cNvSpPr/>
+          <p:nvPr/>
+        </p:nvSpPr>
+        <p:spPr>
+          <a:xfrm>
+            <a:off x="4897755" y="227330"/>
+            <a:ext cx="3347720" cy="699135"/>
+          </a:xfrm>
+          <a:prstGeom prst="rect">
+            <a:avLst/>
+          </a:prstGeom>
+          <a:noFill/>
+          <a:ln>
+            <a:noFill/>
+          </a:ln>
+        </p:spPr>
+        <p:style>
+          <a:lnRef idx="0">
+            <a:srgbClr val="FFFFFF"/>
+          </a:lnRef>
+          <a:fillRef idx="0">
+            <a:srgbClr val="FFFFFF"/>
+          </a:fillRef>
+          <a:effectRef idx="0">
+            <a:srgbClr val="FFFFFF"/>
+          </a:effectRef>
+          <a:fontRef idx="minor"/>
+        </p:style>
+        <p:txBody>
+          <a:bodyPr lIns="90000" tIns="45000" rIns="90000" bIns="45000"/>
+          <a:p>
+            <a:pPr algn="ctr">
+              <a:lnSpc>
+                <a:spcPct val="100000"/>
+              </a:lnSpc>
+            </a:pPr>
+            <a:r>
+              <a:rPr lang="en-US" sz="2000" b="1" strike="noStrike" spc="-1">
+                <a:solidFill>
+                  <a:srgbClr val="1F497D"/>
+                </a:solidFill>
+                <a:uFill>
+                  <a:solidFill>
+                    <a:srgbClr val="FFFFFF"/>
+                  </a:solidFill>
+                </a:uFill>
+                <a:latin typeface="Capsuula"/>
+                <a:ea typeface="DejaVu Sans" panose="020B0603030804020204"/>
+              </a:rPr>
+              <a:t>Universitas Gadjah Mada</a:t>
+            </a:r>
+            <a:endParaRPr lang="en-US" sz="1800" b="0" strike="noStrike" spc="-1">
+              <a:solidFill>
+                <a:srgbClr val="000000"/>
+              </a:solidFill>
+              <a:uFill>
+                <a:solidFill>
+                  <a:srgbClr val="FFFFFF"/>
+                </a:solidFill>
+              </a:uFill>
+              <a:latin typeface="Arial" panose="020B0604020202020204"/>
+            </a:endParaRPr>
+          </a:p>
+        </p:txBody>
+      </p:sp>
+      <p:sp>
+        <p:nvSpPr>
+          <p:cNvPr id="110" name="CustomShape 6"/>
+          <p:cNvSpPr/>
+          <p:nvPr/>
+        </p:nvSpPr>
+        <p:spPr>
+          <a:xfrm>
+            <a:off x="6849360" y="851400"/>
+            <a:ext cx="1703880" cy="503280"/>
+          </a:xfrm>
+          <a:prstGeom prst="chevron">
+            <a:avLst>
+              <a:gd name="adj" fmla="val 50000"/>
+            </a:avLst>
+          </a:prstGeom>
+          <a:solidFill>
+            <a:srgbClr val="111C76"/>
+          </a:solidFill>
+          <a:ln w="3240">
+            <a:solidFill>
+              <a:schemeClr val="bg1"/>
+            </a:solidFill>
+            <a:round/>
+          </a:ln>
+        </p:spPr>
+        <p:style>
+          <a:lnRef idx="2">
+            <a:schemeClr val="accent1">
+              <a:shade val="50000"/>
+            </a:schemeClr>
+          </a:lnRef>
+          <a:fillRef idx="1">
+            <a:schemeClr val="accent1"/>
+          </a:fillRef>
+          <a:effectRef idx="0">
+            <a:schemeClr val="accent1"/>
+          </a:effectRef>
+          <a:fontRef idx="minor"/>
+        </p:style>
+        <p:txBody>
+          <a:bodyPr lIns="90000" tIns="45000" rIns="90000" bIns="45000" anchor="ctr"/>
+          <a:p>
+            <a:pPr algn="ctr">
+              <a:lnSpc>
+                <a:spcPct val="100000"/>
+              </a:lnSpc>
+            </a:pPr>
+            <a:r>
+              <a:rPr lang="en-US" altLang="en-US" sz="1100" b="0" strike="noStrike" spc="-1">
+                <a:solidFill>
+                  <a:srgbClr val="FFFFFF"/>
+                </a:solidFill>
+                <a:uFill>
+                  <a:solidFill>
+                    <a:srgbClr val="FFFFFF"/>
+                  </a:solidFill>
+                </a:uFill>
+                <a:latin typeface="Caviar Dreams"/>
+                <a:ea typeface="DejaVu Sans" panose="020B0603030804020204"/>
+              </a:rPr>
+              <a:t>Kesimpulan dan Saran</a:t>
+            </a:r>
+            <a:endParaRPr lang="en-US" altLang="en-US" sz="1800" b="0" strike="noStrike" spc="-1">
+              <a:solidFill>
+                <a:srgbClr val="000000"/>
+              </a:solidFill>
+              <a:uFill>
+                <a:solidFill>
+                  <a:srgbClr val="FFFFFF"/>
+                </a:solidFill>
+              </a:uFill>
+              <a:latin typeface="Arial" panose="020B0604020202020204"/>
+            </a:endParaRPr>
+          </a:p>
+        </p:txBody>
+      </p:sp>
+      <p:sp>
+        <p:nvSpPr>
+          <p:cNvPr id="111" name="CustomShape 7"/>
+          <p:cNvSpPr/>
+          <p:nvPr/>
+        </p:nvSpPr>
+        <p:spPr>
+          <a:xfrm>
+            <a:off x="20880" y="177840"/>
+            <a:ext cx="3542040" cy="394200"/>
+          </a:xfrm>
+          <a:prstGeom prst="rect">
+            <a:avLst/>
+          </a:prstGeom>
+          <a:noFill/>
+          <a:ln>
+            <a:noFill/>
+          </a:ln>
+        </p:spPr>
+        <p:style>
+          <a:lnRef idx="0">
+            <a:srgbClr val="FFFFFF"/>
+          </a:lnRef>
+          <a:fillRef idx="0">
+            <a:srgbClr val="FFFFFF"/>
+          </a:fillRef>
+          <a:effectRef idx="0">
+            <a:srgbClr val="FFFFFF"/>
+          </a:effectRef>
+          <a:fontRef idx="minor"/>
+        </p:style>
+        <p:txBody>
+          <a:bodyPr lIns="90000" tIns="45000" rIns="90000" bIns="45000"/>
+          <a:p>
+            <a:pPr>
+              <a:lnSpc>
+                <a:spcPct val="150000"/>
+              </a:lnSpc>
+            </a:pPr>
+            <a:r>
+              <a:rPr lang="en-US" altLang="en-US" sz="800" b="0" strike="noStrike" spc="-1">
+                <a:solidFill>
+                  <a:srgbClr val="1F497D"/>
+                </a:solidFill>
+                <a:uFill>
+                  <a:solidFill>
+                    <a:srgbClr val="FFFFFF"/>
+                  </a:solidFill>
+                </a:uFill>
+                <a:latin typeface="Caviar Dreams"/>
+                <a:ea typeface="DejaVu Sans" panose="020B0603030804020204"/>
+              </a:rPr>
+              <a:t>“Penerapan HTTP/2 SSE dan Websocket pada Rumah Pintar”</a:t>
+            </a:r>
+            <a:endParaRPr lang="en-US" altLang="en-US" sz="800" b="0" strike="noStrike" spc="-1">
+              <a:solidFill>
+                <a:srgbClr val="1F497D"/>
+              </a:solidFill>
+              <a:uFill>
+                <a:solidFill>
+                  <a:srgbClr val="FFFFFF"/>
+                </a:solidFill>
+              </a:uFill>
+              <a:latin typeface="Caviar Dreams"/>
+              <a:ea typeface="DejaVu Sans" panose="020B0603030804020204"/>
+            </a:endParaRPr>
+          </a:p>
+        </p:txBody>
+      </p:sp>
+      <p:sp>
+        <p:nvSpPr>
+          <p:cNvPr id="112" name="CustomShape 8"/>
+          <p:cNvSpPr/>
+          <p:nvPr/>
+        </p:nvSpPr>
+        <p:spPr>
+          <a:xfrm>
+            <a:off x="0" y="843480"/>
+            <a:ext cx="1505160" cy="510120"/>
+          </a:xfrm>
+          <a:prstGeom prst="homePlate">
+            <a:avLst>
+              <a:gd name="adj" fmla="val 50000"/>
+            </a:avLst>
+          </a:prstGeom>
+          <a:solidFill>
+            <a:srgbClr val="F9C534"/>
+          </a:solidFill>
+          <a:ln w="3240">
+            <a:solidFill>
+              <a:srgbClr val="111C76"/>
+            </a:solidFill>
+            <a:round/>
+          </a:ln>
+        </p:spPr>
+        <p:style>
+          <a:lnRef idx="2">
+            <a:schemeClr val="accent1">
+              <a:shade val="50000"/>
+            </a:schemeClr>
+          </a:lnRef>
+          <a:fillRef idx="1">
+            <a:schemeClr val="accent1"/>
+          </a:fillRef>
+          <a:effectRef idx="0">
+            <a:schemeClr val="accent1"/>
+          </a:effectRef>
+          <a:fontRef idx="minor"/>
+        </p:style>
+        <p:txBody>
+          <a:bodyPr lIns="90000" tIns="45000" rIns="90000" bIns="45000" anchor="ctr"/>
+          <a:p>
+            <a:pPr algn="ctr">
+              <a:lnSpc>
+                <a:spcPct val="100000"/>
+              </a:lnSpc>
+            </a:pPr>
+            <a:r>
+              <a:rPr lang="en-US" sz="1100" b="0" strike="noStrike" spc="-1">
+                <a:solidFill>
+                  <a:srgbClr val="111C76"/>
+                </a:solidFill>
+                <a:uFill>
+                  <a:solidFill>
+                    <a:srgbClr val="FFFFFF"/>
+                  </a:solidFill>
+                </a:uFill>
+                <a:latin typeface="Caviar Dreams"/>
+                <a:ea typeface="DejaVu Sans" panose="020B0603030804020204"/>
+              </a:rPr>
+              <a:t>Latar Belakang</a:t>
+            </a:r>
+            <a:endParaRPr lang="en-US" sz="1800" b="0" strike="noStrike" spc="-1">
+              <a:solidFill>
+                <a:srgbClr val="000000"/>
+              </a:solidFill>
+              <a:uFill>
+                <a:solidFill>
+                  <a:srgbClr val="FFFFFF"/>
+                </a:solidFill>
+              </a:uFill>
+              <a:latin typeface="Arial" panose="020B0604020202020204"/>
+            </a:endParaRPr>
+          </a:p>
+        </p:txBody>
+      </p:sp>
+      <p:sp>
+        <p:nvSpPr>
+          <p:cNvPr id="113" name="CustomShape 9"/>
+          <p:cNvSpPr/>
+          <p:nvPr/>
+        </p:nvSpPr>
+        <p:spPr>
+          <a:xfrm>
+            <a:off x="59040" y="1590120"/>
+            <a:ext cx="4329720" cy="1253880"/>
+          </a:xfrm>
+          <a:prstGeom prst="rect">
+            <a:avLst/>
+          </a:prstGeom>
+          <a:gradFill>
+            <a:gsLst>
+              <a:gs pos="0">
+                <a:srgbClr val="FFDB9E"/>
+              </a:gs>
+              <a:gs pos="50000">
+                <a:srgbClr val="FFE8C4"/>
+              </a:gs>
+              <a:gs pos="100000">
+                <a:srgbClr val="FFF2E1"/>
+              </a:gs>
+            </a:gsLst>
+            <a:lin ang="0"/>
+          </a:gradFill>
+          <a:ln>
+            <a:noFill/>
+          </a:ln>
+        </p:spPr>
+        <p:style>
+          <a:lnRef idx="0">
+            <a:srgbClr val="FFFFFF"/>
+          </a:lnRef>
+          <a:fillRef idx="0">
+            <a:srgbClr val="FFFFFF"/>
+          </a:fillRef>
+          <a:effectRef idx="0">
+            <a:srgbClr val="FFFFFF"/>
+          </a:effectRef>
+          <a:fontRef idx="minor"/>
+        </p:style>
+        <p:txBody>
+          <a:bodyPr lIns="90000" tIns="45000" rIns="90000" bIns="45000"/>
+          <a:p>
+            <a:pPr marL="186055" algn="just">
+              <a:lnSpc>
+                <a:spcPct val="170000"/>
+              </a:lnSpc>
+            </a:pPr>
+            <a:r>
+              <a:rPr lang="en-US" sz="1400" b="0" strike="noStrike" spc="-1">
+                <a:solidFill>
+                  <a:srgbClr val="000000"/>
+                </a:solidFill>
+                <a:uFill>
+                  <a:solidFill>
+                    <a:srgbClr val="FFFFFF"/>
+                  </a:solidFill>
+                </a:uFill>
+                <a:latin typeface="Caviar Dreams"/>
+                <a:ea typeface="DejaVu Sans" panose="020B0603030804020204"/>
+              </a:rPr>
+              <a:t>Jumlah pengguna internet di Indonesia dari 2017 sampai 2023 akan terus mengalami peningkatan</a:t>
+            </a:r>
+            <a:endParaRPr lang="en-US" sz="1800" b="0" strike="noStrike" spc="-1">
+              <a:solidFill>
+                <a:srgbClr val="000000"/>
+              </a:solidFill>
+              <a:uFill>
+                <a:solidFill>
+                  <a:srgbClr val="FFFFFF"/>
+                </a:solidFill>
+              </a:uFill>
+              <a:latin typeface="Arial" panose="020B0604020202020204"/>
+            </a:endParaRPr>
+          </a:p>
+        </p:txBody>
+      </p:sp>
+      <p:pic>
+        <p:nvPicPr>
+          <p:cNvPr id="114" name="Picture 113"/>
+          <p:cNvPicPr/>
+          <p:nvPr/>
+        </p:nvPicPr>
+        <p:blipFill>
+          <a:blip r:embed="rId1"/>
+          <a:stretch>
+            <a:fillRect/>
+          </a:stretch>
+        </p:blipFill>
+        <p:spPr>
+          <a:xfrm>
+            <a:off x="4480560" y="1424520"/>
+            <a:ext cx="3748680" cy="3349440"/>
+          </a:xfrm>
+          <a:prstGeom prst="rect">
+            <a:avLst/>
+          </a:prstGeom>
+          <a:ln>
+            <a:noFill/>
+          </a:ln>
+        </p:spPr>
+      </p:pic>
     </p:spTree>
   </p:cSld>
   <p:clrMapOvr>

</xml_diff>